<commit_message>
Project for ISP demo updated
</commit_message>
<xml_diff>
--- a/Powerpoint/4.SOLID_I.pptx
+++ b/Powerpoint/4.SOLID_I.pptx
@@ -5,14 +5,19 @@
     <p:sldMasterId id="2147483762" r:id="rId1"/>
   </p:sldMasterIdLst>
   <p:notesMasterIdLst>
-    <p:notesMasterId r:id="rId4"/>
+    <p:notesMasterId r:id="rId9"/>
   </p:notesMasterIdLst>
   <p:handoutMasterIdLst>
-    <p:handoutMasterId r:id="rId5"/>
+    <p:handoutMasterId r:id="rId10"/>
   </p:handoutMasterIdLst>
   <p:sldIdLst>
     <p:sldId id="269" r:id="rId2"/>
     <p:sldId id="260" r:id="rId3"/>
+    <p:sldId id="270" r:id="rId4"/>
+    <p:sldId id="271" r:id="rId5"/>
+    <p:sldId id="272" r:id="rId6"/>
+    <p:sldId id="273" r:id="rId7"/>
+    <p:sldId id="274" r:id="rId8"/>
   </p:sldIdLst>
   <p:sldSz cx="12192000" cy="6858000"/>
   <p:notesSz cx="6858000" cy="9144000"/>
@@ -227,7 +232,7 @@
           <a:p>
             <a:fld id="{CDDF240B-3CA8-4045-B7C9-8B67F6FA2B5E}" type="datetimeFigureOut">
               <a:rPr lang="en-US" smtClean="0"/>
-              <a:t>2019-03-01</a:t>
+              <a:t>2019-03-12</a:t>
             </a:fld>
             <a:endParaRPr lang="en-US"/>
           </a:p>
@@ -392,7 +397,7 @@
           <a:p>
             <a:fld id="{8DB41A92-FFF7-46B1-92E3-CDB13879911B}" type="datetimeFigureOut">
               <a:rPr lang="en-US" smtClean="0"/>
-              <a:t>2019-03-01</a:t>
+              <a:t>2019-03-12</a:t>
             </a:fld>
             <a:endParaRPr lang="en-US"/>
           </a:p>
@@ -1693,7 +1698,7 @@
           <a:p>
             <a:fld id="{679D33B1-6C88-4DB6-8F59-77EBF0001DE5}" type="datetimeFigureOut">
               <a:rPr lang="en-US" smtClean="0"/>
-              <a:t>2019-03-01</a:t>
+              <a:t>2019-03-12</a:t>
             </a:fld>
             <a:endParaRPr lang="en-US"/>
           </a:p>
@@ -2603,7 +2608,7 @@
           <a:p>
             <a:fld id="{679D33B1-6C88-4DB6-8F59-77EBF0001DE5}" type="datetimeFigureOut">
               <a:rPr lang="en-US" smtClean="0"/>
-              <a:t>2019-03-01</a:t>
+              <a:t>2019-03-12</a:t>
             </a:fld>
             <a:endParaRPr lang="en-US"/>
           </a:p>
@@ -2909,7 +2914,7 @@
           <a:p>
             <a:fld id="{679D33B1-6C88-4DB6-8F59-77EBF0001DE5}" type="datetimeFigureOut">
               <a:rPr lang="en-US" smtClean="0"/>
-              <a:t>2019-03-01</a:t>
+              <a:t>2019-03-12</a:t>
             </a:fld>
             <a:endParaRPr lang="en-US"/>
           </a:p>
@@ -3295,7 +3300,7 @@
           <a:p>
             <a:fld id="{679D33B1-6C88-4DB6-8F59-77EBF0001DE5}" type="datetimeFigureOut">
               <a:rPr lang="en-US" smtClean="0"/>
-              <a:t>2019-03-01</a:t>
+              <a:t>2019-03-12</a:t>
             </a:fld>
             <a:endParaRPr lang="en-US"/>
           </a:p>
@@ -3668,7 +3673,7 @@
           <a:p>
             <a:fld id="{679D33B1-6C88-4DB6-8F59-77EBF0001DE5}" type="datetimeFigureOut">
               <a:rPr lang="en-US" smtClean="0"/>
-              <a:t>2019-03-01</a:t>
+              <a:t>2019-03-12</a:t>
             </a:fld>
             <a:endParaRPr lang="en-US"/>
           </a:p>
@@ -4171,7 +4176,7 @@
           <a:p>
             <a:fld id="{679D33B1-6C88-4DB6-8F59-77EBF0001DE5}" type="datetimeFigureOut">
               <a:rPr lang="en-US" smtClean="0"/>
-              <a:t>2019-03-01</a:t>
+              <a:t>2019-03-12</a:t>
             </a:fld>
             <a:endParaRPr lang="en-US"/>
           </a:p>
@@ -4425,7 +4430,7 @@
           <a:p>
             <a:fld id="{679D33B1-6C88-4DB6-8F59-77EBF0001DE5}" type="datetimeFigureOut">
               <a:rPr lang="en-US" smtClean="0"/>
-              <a:t>2019-03-01</a:t>
+              <a:t>2019-03-12</a:t>
             </a:fld>
             <a:endParaRPr lang="en-US"/>
           </a:p>
@@ -4588,7 +4593,7 @@
           <a:p>
             <a:fld id="{679D33B1-6C88-4DB6-8F59-77EBF0001DE5}" type="datetimeFigureOut">
               <a:rPr lang="en-US" smtClean="0"/>
-              <a:t>2019-03-01</a:t>
+              <a:t>2019-03-12</a:t>
             </a:fld>
             <a:endParaRPr lang="en-US"/>
           </a:p>
@@ -4975,7 +4980,7 @@
           <a:p>
             <a:fld id="{679D33B1-6C88-4DB6-8F59-77EBF0001DE5}" type="datetimeFigureOut">
               <a:rPr lang="en-US" smtClean="0"/>
-              <a:t>2019-03-01</a:t>
+              <a:t>2019-03-12</a:t>
             </a:fld>
             <a:endParaRPr lang="en-US"/>
           </a:p>
@@ -5381,7 +5386,7 @@
           <a:p>
             <a:fld id="{679D33B1-6C88-4DB6-8F59-77EBF0001DE5}" type="datetimeFigureOut">
               <a:rPr lang="en-US" smtClean="0"/>
-              <a:t>2019-03-01</a:t>
+              <a:t>2019-03-12</a:t>
             </a:fld>
             <a:endParaRPr lang="en-US"/>
           </a:p>
@@ -5594,7 +5599,7 @@
           <a:p>
             <a:fld id="{679D33B1-6C88-4DB6-8F59-77EBF0001DE5}" type="datetimeFigureOut">
               <a:rPr lang="en-US" smtClean="0"/>
-              <a:t>2019-03-01</a:t>
+              <a:t>2019-03-12</a:t>
             </a:fld>
             <a:endParaRPr lang="en-US"/>
           </a:p>
@@ -6521,6 +6526,2244 @@
     <p:extLst>
       <p:ext uri="{BB962C8B-B14F-4D97-AF65-F5344CB8AC3E}">
         <p14:creationId xmlns:p14="http://schemas.microsoft.com/office/powerpoint/2010/main" val="4123811333"/>
+      </p:ext>
+    </p:extLst>
+  </p:cSld>
+  <p:clrMapOvr>
+    <a:masterClrMapping/>
+  </p:clrMapOvr>
+  <p:transition spd="slow">
+    <p:cover/>
+  </p:transition>
+</p:sld>
+</file>
+
+<file path=ppt/slides/slide3.xml><?xml version="1.0" encoding="utf-8"?>
+<p:sld xmlns:a="http://schemas.openxmlformats.org/drawingml/2006/main" xmlns:r="http://schemas.openxmlformats.org/officeDocument/2006/relationships" xmlns:p="http://schemas.openxmlformats.org/presentationml/2006/main">
+  <p:cSld>
+    <p:spTree>
+      <p:nvGrpSpPr>
+        <p:cNvPr id="1" name=""/>
+        <p:cNvGrpSpPr/>
+        <p:nvPr/>
+      </p:nvGrpSpPr>
+      <p:grpSpPr>
+        <a:xfrm>
+          <a:off x="0" y="0"/>
+          <a:ext cx="0" cy="0"/>
+          <a:chOff x="0" y="0"/>
+          <a:chExt cx="0" cy="0"/>
+        </a:xfrm>
+      </p:grpSpPr>
+      <p:sp>
+        <p:nvSpPr>
+          <p:cNvPr id="4" name="Заголовок 3">
+            <a:extLst>
+              <a:ext uri="{FF2B5EF4-FFF2-40B4-BE49-F238E27FC236}">
+                <a16:creationId xmlns:a16="http://schemas.microsoft.com/office/drawing/2014/main" id="{56B210DD-3C70-4225-BAC0-26F0709D6072}"/>
+              </a:ext>
+            </a:extLst>
+          </p:cNvPr>
+          <p:cNvSpPr>
+            <a:spLocks noGrp="1"/>
+          </p:cNvSpPr>
+          <p:nvPr>
+            <p:ph type="title"/>
+          </p:nvPr>
+        </p:nvSpPr>
+        <p:spPr/>
+        <p:txBody>
+          <a:bodyPr>
+            <a:normAutofit/>
+          </a:bodyPr>
+          <a:lstStyle/>
+          <a:p>
+            <a:r>
+              <a:rPr lang="ru-RU" b="1" dirty="0"/>
+              <a:t>Принцип разделения интерфейса</a:t>
+            </a:r>
+            <a:br>
+              <a:rPr lang="en-US" b="1" dirty="0"/>
+            </a:br>
+            <a:r>
+              <a:rPr lang="en-US" sz="3200" i="1" dirty="0"/>
+              <a:t>The Interface Segregation Principle</a:t>
+            </a:r>
+            <a:endParaRPr lang="en-US" dirty="0"/>
+          </a:p>
+        </p:txBody>
+      </p:sp>
+      <p:sp>
+        <p:nvSpPr>
+          <p:cNvPr id="3" name="TextBox 2">
+            <a:extLst>
+              <a:ext uri="{FF2B5EF4-FFF2-40B4-BE49-F238E27FC236}">
+                <a16:creationId xmlns:a16="http://schemas.microsoft.com/office/drawing/2014/main" id="{9D5961E6-AF38-4100-8B63-BD9839E777E6}"/>
+              </a:ext>
+            </a:extLst>
+          </p:cNvPr>
+          <p:cNvSpPr txBox="1"/>
+          <p:nvPr/>
+        </p:nvSpPr>
+        <p:spPr>
+          <a:xfrm>
+            <a:off x="576263" y="2233613"/>
+            <a:ext cx="9836982" cy="1877437"/>
+          </a:xfrm>
+          <a:prstGeom prst="rect">
+            <a:avLst/>
+          </a:prstGeom>
+          <a:noFill/>
+        </p:spPr>
+        <p:txBody>
+          <a:bodyPr wrap="square" rtlCol="0">
+            <a:spAutoFit/>
+          </a:bodyPr>
+          <a:lstStyle/>
+          <a:p>
+            <a:r>
+              <a:rPr lang="en-US" sz="2800" dirty="0">
+                <a:solidFill>
+                  <a:srgbClr val="FFFF00"/>
+                </a:solidFill>
+              </a:rPr>
+              <a:t>Interface </a:t>
+            </a:r>
+            <a:r>
+              <a:rPr lang="ru-RU" sz="2800" dirty="0">
+                <a:solidFill>
+                  <a:srgbClr val="FFFF00"/>
+                </a:solidFill>
+              </a:rPr>
+              <a:t>в </a:t>
+            </a:r>
+            <a:r>
+              <a:rPr lang="en-US" sz="2800" dirty="0">
+                <a:solidFill>
+                  <a:srgbClr val="FFFF00"/>
+                </a:solidFill>
+              </a:rPr>
+              <a:t>C#</a:t>
+            </a:r>
+            <a:endParaRPr lang="ru-RU" sz="2800" dirty="0">
+              <a:solidFill>
+                <a:srgbClr val="FFFF00"/>
+              </a:solidFill>
+            </a:endParaRPr>
+          </a:p>
+          <a:p>
+            <a:endParaRPr lang="ru-RU" sz="2800" dirty="0"/>
+          </a:p>
+          <a:p>
+            <a:r>
+              <a:rPr lang="ru-RU" sz="2000" dirty="0"/>
+              <a:t>Интерфейс содержит только сигнатуры </a:t>
+            </a:r>
+            <a:r>
+              <a:rPr lang="ru-RU" sz="2000" i="1" dirty="0"/>
+              <a:t>методов</a:t>
+            </a:r>
+            <a:r>
+              <a:rPr lang="ru-RU" sz="2000" dirty="0"/>
+              <a:t>, </a:t>
+            </a:r>
+            <a:r>
+              <a:rPr lang="ru-RU" sz="2000" i="1" dirty="0"/>
+              <a:t>свойств</a:t>
+            </a:r>
+            <a:r>
+              <a:rPr lang="ru-RU" sz="2000" dirty="0"/>
+              <a:t>, </a:t>
+            </a:r>
+            <a:r>
+              <a:rPr lang="ru-RU" sz="2000" i="1" dirty="0"/>
+              <a:t>событий</a:t>
+            </a:r>
+            <a:r>
+              <a:rPr lang="ru-RU" sz="2000" dirty="0"/>
+              <a:t> или </a:t>
+            </a:r>
+            <a:r>
+              <a:rPr lang="ru-RU" sz="2000" i="1" dirty="0"/>
+              <a:t>индексаторов</a:t>
+            </a:r>
+            <a:r>
+              <a:rPr lang="ru-RU" sz="2000" dirty="0"/>
+              <a:t>. Класс или структура, реализующие интерфейс, должны реализовать члены интерфейса, заданные в определении интерфейса</a:t>
+            </a:r>
+            <a:endParaRPr lang="en-US" sz="2000" dirty="0"/>
+          </a:p>
+        </p:txBody>
+      </p:sp>
+    </p:spTree>
+    <p:extLst>
+      <p:ext uri="{BB962C8B-B14F-4D97-AF65-F5344CB8AC3E}">
+        <p14:creationId xmlns:p14="http://schemas.microsoft.com/office/powerpoint/2010/main" val="840752412"/>
+      </p:ext>
+    </p:extLst>
+  </p:cSld>
+  <p:clrMapOvr>
+    <a:masterClrMapping/>
+  </p:clrMapOvr>
+  <p:transition spd="slow">
+    <p:cover/>
+  </p:transition>
+</p:sld>
+</file>
+
+<file path=ppt/slides/slide4.xml><?xml version="1.0" encoding="utf-8"?>
+<p:sld xmlns:a="http://schemas.openxmlformats.org/drawingml/2006/main" xmlns:r="http://schemas.openxmlformats.org/officeDocument/2006/relationships" xmlns:p="http://schemas.openxmlformats.org/presentationml/2006/main">
+  <p:cSld>
+    <p:spTree>
+      <p:nvGrpSpPr>
+        <p:cNvPr id="1" name=""/>
+        <p:cNvGrpSpPr/>
+        <p:nvPr/>
+      </p:nvGrpSpPr>
+      <p:grpSpPr>
+        <a:xfrm>
+          <a:off x="0" y="0"/>
+          <a:ext cx="0" cy="0"/>
+          <a:chOff x="0" y="0"/>
+          <a:chExt cx="0" cy="0"/>
+        </a:xfrm>
+      </p:grpSpPr>
+      <p:sp>
+        <p:nvSpPr>
+          <p:cNvPr id="4" name="Заголовок 3">
+            <a:extLst>
+              <a:ext uri="{FF2B5EF4-FFF2-40B4-BE49-F238E27FC236}">
+                <a16:creationId xmlns:a16="http://schemas.microsoft.com/office/drawing/2014/main" id="{56B210DD-3C70-4225-BAC0-26F0709D6072}"/>
+              </a:ext>
+            </a:extLst>
+          </p:cNvPr>
+          <p:cNvSpPr>
+            <a:spLocks noGrp="1"/>
+          </p:cNvSpPr>
+          <p:nvPr>
+            <p:ph type="title"/>
+          </p:nvPr>
+        </p:nvSpPr>
+        <p:spPr/>
+        <p:txBody>
+          <a:bodyPr>
+            <a:normAutofit/>
+          </a:bodyPr>
+          <a:lstStyle/>
+          <a:p>
+            <a:r>
+              <a:rPr lang="ru-RU" b="1" dirty="0"/>
+              <a:t>Принцип разделения интерфейса</a:t>
+            </a:r>
+            <a:br>
+              <a:rPr lang="en-US" b="1" dirty="0"/>
+            </a:br>
+            <a:r>
+              <a:rPr lang="en-US" sz="3200" i="1" dirty="0"/>
+              <a:t>The Interface Segregation Principle</a:t>
+            </a:r>
+            <a:endParaRPr lang="en-US" dirty="0"/>
+          </a:p>
+        </p:txBody>
+      </p:sp>
+      <p:sp>
+        <p:nvSpPr>
+          <p:cNvPr id="3" name="TextBox 2">
+            <a:extLst>
+              <a:ext uri="{FF2B5EF4-FFF2-40B4-BE49-F238E27FC236}">
+                <a16:creationId xmlns:a16="http://schemas.microsoft.com/office/drawing/2014/main" id="{9D5961E6-AF38-4100-8B63-BD9839E777E6}"/>
+              </a:ext>
+            </a:extLst>
+          </p:cNvPr>
+          <p:cNvSpPr txBox="1"/>
+          <p:nvPr/>
+        </p:nvSpPr>
+        <p:spPr>
+          <a:xfrm>
+            <a:off x="576263" y="2233613"/>
+            <a:ext cx="9836982" cy="523220"/>
+          </a:xfrm>
+          <a:prstGeom prst="rect">
+            <a:avLst/>
+          </a:prstGeom>
+          <a:noFill/>
+        </p:spPr>
+        <p:txBody>
+          <a:bodyPr wrap="square" rtlCol="0">
+            <a:spAutoFit/>
+          </a:bodyPr>
+          <a:lstStyle/>
+          <a:p>
+            <a:r>
+              <a:rPr lang="ru-RU" sz="2800" dirty="0">
+                <a:solidFill>
+                  <a:srgbClr val="FFFF00"/>
+                </a:solidFill>
+              </a:rPr>
+              <a:t>Пример нарушения №1</a:t>
+            </a:r>
+          </a:p>
+        </p:txBody>
+      </p:sp>
+      <p:pic>
+        <p:nvPicPr>
+          <p:cNvPr id="2" name="Рисунок 1">
+            <a:extLst>
+              <a:ext uri="{FF2B5EF4-FFF2-40B4-BE49-F238E27FC236}">
+                <a16:creationId xmlns:a16="http://schemas.microsoft.com/office/drawing/2014/main" id="{E1DE6153-A197-4DA8-9F18-F30777A49DE7}"/>
+              </a:ext>
+            </a:extLst>
+          </p:cNvPr>
+          <p:cNvPicPr>
+            <a:picLocks noChangeAspect="1"/>
+          </p:cNvPicPr>
+          <p:nvPr/>
+        </p:nvPicPr>
+        <p:blipFill>
+          <a:blip r:embed="rId2"/>
+          <a:stretch>
+            <a:fillRect/>
+          </a:stretch>
+        </p:blipFill>
+        <p:spPr>
+          <a:xfrm>
+            <a:off x="5465616" y="2865826"/>
+            <a:ext cx="4947629" cy="3558739"/>
+          </a:xfrm>
+          <a:prstGeom prst="rect">
+            <a:avLst/>
+          </a:prstGeom>
+        </p:spPr>
+      </p:pic>
+      <p:grpSp>
+        <p:nvGrpSpPr>
+          <p:cNvPr id="11" name="Группа 10">
+            <a:extLst>
+              <a:ext uri="{FF2B5EF4-FFF2-40B4-BE49-F238E27FC236}">
+                <a16:creationId xmlns:a16="http://schemas.microsoft.com/office/drawing/2014/main" id="{5A7517D9-AFE5-4197-83A4-3617D812D265}"/>
+              </a:ext>
+            </a:extLst>
+          </p:cNvPr>
+          <p:cNvGrpSpPr/>
+          <p:nvPr/>
+        </p:nvGrpSpPr>
+        <p:grpSpPr>
+          <a:xfrm>
+            <a:off x="576263" y="2865826"/>
+            <a:ext cx="4490920" cy="3558739"/>
+            <a:chOff x="576263" y="2865826"/>
+            <a:chExt cx="4490920" cy="3558739"/>
+          </a:xfrm>
+        </p:grpSpPr>
+        <p:sp>
+          <p:nvSpPr>
+            <p:cNvPr id="5" name="Прямоугольник 4">
+              <a:extLst>
+                <a:ext uri="{FF2B5EF4-FFF2-40B4-BE49-F238E27FC236}">
+                  <a16:creationId xmlns:a16="http://schemas.microsoft.com/office/drawing/2014/main" id="{EBD2903A-4A67-4E2A-BAFE-80417A9F98D1}"/>
+                </a:ext>
+              </a:extLst>
+            </p:cNvPr>
+            <p:cNvSpPr/>
+            <p:nvPr/>
+          </p:nvSpPr>
+          <p:spPr>
+            <a:xfrm>
+              <a:off x="576263" y="2865826"/>
+              <a:ext cx="4490920" cy="3558739"/>
+            </a:xfrm>
+            <a:prstGeom prst="rect">
+              <a:avLst/>
+            </a:prstGeom>
+            <a:solidFill>
+              <a:schemeClr val="accent3">
+                <a:lumMod val="75000"/>
+              </a:schemeClr>
+            </a:solidFill>
+          </p:spPr>
+          <p:style>
+            <a:lnRef idx="2">
+              <a:schemeClr val="accent1">
+                <a:shade val="50000"/>
+              </a:schemeClr>
+            </a:lnRef>
+            <a:fillRef idx="1">
+              <a:schemeClr val="accent1"/>
+            </a:fillRef>
+            <a:effectRef idx="0">
+              <a:schemeClr val="accent1"/>
+            </a:effectRef>
+            <a:fontRef idx="minor">
+              <a:schemeClr val="lt1"/>
+            </a:fontRef>
+          </p:style>
+          <p:txBody>
+            <a:bodyPr rtlCol="0" anchor="ctr"/>
+            <a:lstStyle/>
+            <a:p>
+              <a:pPr algn="ctr"/>
+              <a:endParaRPr lang="en-US" dirty="0"/>
+            </a:p>
+          </p:txBody>
+        </p:sp>
+        <p:sp>
+          <p:nvSpPr>
+            <p:cNvPr id="6" name="TextBox 5">
+              <a:extLst>
+                <a:ext uri="{FF2B5EF4-FFF2-40B4-BE49-F238E27FC236}">
+                  <a16:creationId xmlns:a16="http://schemas.microsoft.com/office/drawing/2014/main" id="{A13A6B0C-F054-4537-8B4B-6FB8EA500229}"/>
+                </a:ext>
+              </a:extLst>
+            </p:cNvPr>
+            <p:cNvSpPr txBox="1"/>
+            <p:nvPr/>
+          </p:nvSpPr>
+          <p:spPr>
+            <a:xfrm>
+              <a:off x="2270931" y="3007872"/>
+              <a:ext cx="1101584" cy="461665"/>
+            </a:xfrm>
+            <a:prstGeom prst="rect">
+              <a:avLst/>
+            </a:prstGeom>
+            <a:noFill/>
+          </p:spPr>
+          <p:txBody>
+            <a:bodyPr wrap="none" rtlCol="0">
+              <a:spAutoFit/>
+            </a:bodyPr>
+            <a:lstStyle/>
+            <a:p>
+              <a:r>
+                <a:rPr lang="en-US" sz="2400" dirty="0"/>
+                <a:t>Device</a:t>
+              </a:r>
+            </a:p>
+          </p:txBody>
+        </p:sp>
+        <p:sp>
+          <p:nvSpPr>
+            <p:cNvPr id="7" name="Прямоугольник 6">
+              <a:extLst>
+                <a:ext uri="{FF2B5EF4-FFF2-40B4-BE49-F238E27FC236}">
+                  <a16:creationId xmlns:a16="http://schemas.microsoft.com/office/drawing/2014/main" id="{76665BB6-3E7A-415D-8209-B47AF8E37890}"/>
+                </a:ext>
+              </a:extLst>
+            </p:cNvPr>
+            <p:cNvSpPr/>
+            <p:nvPr/>
+          </p:nvSpPr>
+          <p:spPr>
+            <a:xfrm>
+              <a:off x="774547" y="3858480"/>
+              <a:ext cx="1975757" cy="1001485"/>
+            </a:xfrm>
+            <a:prstGeom prst="rect">
+              <a:avLst/>
+            </a:prstGeom>
+            <a:solidFill>
+              <a:schemeClr val="accent3">
+                <a:lumMod val="60000"/>
+                <a:lumOff val="40000"/>
+              </a:schemeClr>
+            </a:solidFill>
+            <a:ln>
+              <a:noFill/>
+            </a:ln>
+          </p:spPr>
+          <p:style>
+            <a:lnRef idx="2">
+              <a:schemeClr val="accent1">
+                <a:shade val="50000"/>
+              </a:schemeClr>
+            </a:lnRef>
+            <a:fillRef idx="1">
+              <a:schemeClr val="accent1"/>
+            </a:fillRef>
+            <a:effectRef idx="0">
+              <a:schemeClr val="accent1"/>
+            </a:effectRef>
+            <a:fontRef idx="minor">
+              <a:schemeClr val="lt1"/>
+            </a:fontRef>
+          </p:style>
+          <p:txBody>
+            <a:bodyPr rtlCol="0" anchor="ctr"/>
+            <a:lstStyle/>
+            <a:p>
+              <a:pPr algn="ctr"/>
+              <a:r>
+                <a:rPr lang="en-US" dirty="0"/>
+                <a:t>Make Call</a:t>
+              </a:r>
+            </a:p>
+          </p:txBody>
+        </p:sp>
+        <p:sp>
+          <p:nvSpPr>
+            <p:cNvPr id="8" name="Прямоугольник 7">
+              <a:extLst>
+                <a:ext uri="{FF2B5EF4-FFF2-40B4-BE49-F238E27FC236}">
+                  <a16:creationId xmlns:a16="http://schemas.microsoft.com/office/drawing/2014/main" id="{C478F2AE-4263-46DA-B8ED-B9A86652D46A}"/>
+                </a:ext>
+              </a:extLst>
+            </p:cNvPr>
+            <p:cNvSpPr/>
+            <p:nvPr/>
+          </p:nvSpPr>
+          <p:spPr>
+            <a:xfrm>
+              <a:off x="2897262" y="3858479"/>
+              <a:ext cx="1975757" cy="1001485"/>
+            </a:xfrm>
+            <a:prstGeom prst="rect">
+              <a:avLst/>
+            </a:prstGeom>
+            <a:solidFill>
+              <a:schemeClr val="accent3">
+                <a:lumMod val="60000"/>
+                <a:lumOff val="40000"/>
+              </a:schemeClr>
+            </a:solidFill>
+            <a:ln>
+              <a:noFill/>
+            </a:ln>
+          </p:spPr>
+          <p:style>
+            <a:lnRef idx="2">
+              <a:schemeClr val="accent1">
+                <a:shade val="50000"/>
+              </a:schemeClr>
+            </a:lnRef>
+            <a:fillRef idx="1">
+              <a:schemeClr val="accent1"/>
+            </a:fillRef>
+            <a:effectRef idx="0">
+              <a:schemeClr val="accent1"/>
+            </a:effectRef>
+            <a:fontRef idx="minor">
+              <a:schemeClr val="lt1"/>
+            </a:fontRef>
+          </p:style>
+          <p:txBody>
+            <a:bodyPr rtlCol="0" anchor="ctr"/>
+            <a:lstStyle/>
+            <a:p>
+              <a:pPr algn="ctr"/>
+              <a:r>
+                <a:rPr lang="en-US" dirty="0"/>
+                <a:t>Send Fax</a:t>
+              </a:r>
+            </a:p>
+          </p:txBody>
+        </p:sp>
+        <p:sp>
+          <p:nvSpPr>
+            <p:cNvPr id="9" name="Прямоугольник 8">
+              <a:extLst>
+                <a:ext uri="{FF2B5EF4-FFF2-40B4-BE49-F238E27FC236}">
+                  <a16:creationId xmlns:a16="http://schemas.microsoft.com/office/drawing/2014/main" id="{19A2A3F5-EB28-4F9A-9B30-677870E78625}"/>
+                </a:ext>
+              </a:extLst>
+            </p:cNvPr>
+            <p:cNvSpPr/>
+            <p:nvPr/>
+          </p:nvSpPr>
+          <p:spPr>
+            <a:xfrm>
+              <a:off x="774546" y="5034137"/>
+              <a:ext cx="1975757" cy="1001485"/>
+            </a:xfrm>
+            <a:prstGeom prst="rect">
+              <a:avLst/>
+            </a:prstGeom>
+            <a:solidFill>
+              <a:schemeClr val="accent3">
+                <a:lumMod val="60000"/>
+                <a:lumOff val="40000"/>
+              </a:schemeClr>
+            </a:solidFill>
+            <a:ln>
+              <a:noFill/>
+            </a:ln>
+          </p:spPr>
+          <p:style>
+            <a:lnRef idx="2">
+              <a:schemeClr val="accent1">
+                <a:shade val="50000"/>
+              </a:schemeClr>
+            </a:lnRef>
+            <a:fillRef idx="1">
+              <a:schemeClr val="accent1"/>
+            </a:fillRef>
+            <a:effectRef idx="0">
+              <a:schemeClr val="accent1"/>
+            </a:effectRef>
+            <a:fontRef idx="minor">
+              <a:schemeClr val="lt1"/>
+            </a:fontRef>
+          </p:style>
+          <p:txBody>
+            <a:bodyPr rtlCol="0" anchor="ctr"/>
+            <a:lstStyle/>
+            <a:p>
+              <a:pPr algn="ctr"/>
+              <a:r>
+                <a:rPr lang="en-US" dirty="0"/>
+                <a:t>Scan Document</a:t>
+              </a:r>
+            </a:p>
+          </p:txBody>
+        </p:sp>
+        <p:sp>
+          <p:nvSpPr>
+            <p:cNvPr id="10" name="Прямоугольник 9">
+              <a:extLst>
+                <a:ext uri="{FF2B5EF4-FFF2-40B4-BE49-F238E27FC236}">
+                  <a16:creationId xmlns:a16="http://schemas.microsoft.com/office/drawing/2014/main" id="{89C5E47F-146B-45B5-BFA5-5C0238F904D2}"/>
+                </a:ext>
+              </a:extLst>
+            </p:cNvPr>
+            <p:cNvSpPr/>
+            <p:nvPr/>
+          </p:nvSpPr>
+          <p:spPr>
+            <a:xfrm>
+              <a:off x="2897261" y="5034136"/>
+              <a:ext cx="1975757" cy="1001485"/>
+            </a:xfrm>
+            <a:prstGeom prst="rect">
+              <a:avLst/>
+            </a:prstGeom>
+            <a:solidFill>
+              <a:schemeClr val="accent3">
+                <a:lumMod val="60000"/>
+                <a:lumOff val="40000"/>
+              </a:schemeClr>
+            </a:solidFill>
+            <a:ln>
+              <a:noFill/>
+            </a:ln>
+          </p:spPr>
+          <p:style>
+            <a:lnRef idx="2">
+              <a:schemeClr val="accent1">
+                <a:shade val="50000"/>
+              </a:schemeClr>
+            </a:lnRef>
+            <a:fillRef idx="1">
+              <a:schemeClr val="accent1"/>
+            </a:fillRef>
+            <a:effectRef idx="0">
+              <a:schemeClr val="accent1"/>
+            </a:effectRef>
+            <a:fontRef idx="minor">
+              <a:schemeClr val="lt1"/>
+            </a:fontRef>
+          </p:style>
+          <p:txBody>
+            <a:bodyPr rtlCol="0" anchor="ctr"/>
+            <a:lstStyle/>
+            <a:p>
+              <a:pPr algn="ctr"/>
+              <a:r>
+                <a:rPr lang="en-US" dirty="0"/>
+                <a:t>Copy Document</a:t>
+              </a:r>
+            </a:p>
+          </p:txBody>
+        </p:sp>
+      </p:grpSp>
+    </p:spTree>
+    <p:extLst>
+      <p:ext uri="{BB962C8B-B14F-4D97-AF65-F5344CB8AC3E}">
+        <p14:creationId xmlns:p14="http://schemas.microsoft.com/office/powerpoint/2010/main" val="2644830710"/>
+      </p:ext>
+    </p:extLst>
+  </p:cSld>
+  <p:clrMapOvr>
+    <a:masterClrMapping/>
+  </p:clrMapOvr>
+  <p:transition spd="slow">
+    <p:cover/>
+  </p:transition>
+  <p:timing>
+    <p:tnLst>
+      <p:par>
+        <p:cTn id="1" dur="indefinite" restart="never" nodeType="tmRoot">
+          <p:childTnLst>
+            <p:seq concurrent="1" nextAc="seek">
+              <p:cTn id="2" dur="indefinite" nodeType="mainSeq">
+                <p:childTnLst>
+                  <p:par>
+                    <p:cTn id="3" fill="hold">
+                      <p:stCondLst>
+                        <p:cond delay="indefinite"/>
+                      </p:stCondLst>
+                      <p:childTnLst>
+                        <p:par>
+                          <p:cTn id="4" fill="hold">
+                            <p:stCondLst>
+                              <p:cond delay="0"/>
+                            </p:stCondLst>
+                            <p:childTnLst>
+                              <p:par>
+                                <p:cTn id="5" presetID="53" presetClass="entr" presetSubtype="16" fill="hold" nodeType="clickEffect">
+                                  <p:stCondLst>
+                                    <p:cond delay="0"/>
+                                  </p:stCondLst>
+                                  <p:childTnLst>
+                                    <p:set>
+                                      <p:cBhvr>
+                                        <p:cTn id="6" dur="1" fill="hold">
+                                          <p:stCondLst>
+                                            <p:cond delay="0"/>
+                                          </p:stCondLst>
+                                        </p:cTn>
+                                        <p:tgtEl>
+                                          <p:spTgt spid="11"/>
+                                        </p:tgtEl>
+                                        <p:attrNameLst>
+                                          <p:attrName>style.visibility</p:attrName>
+                                        </p:attrNameLst>
+                                      </p:cBhvr>
+                                      <p:to>
+                                        <p:strVal val="visible"/>
+                                      </p:to>
+                                    </p:set>
+                                    <p:anim calcmode="lin" valueType="num">
+                                      <p:cBhvr>
+                                        <p:cTn id="7" dur="500" fill="hold"/>
+                                        <p:tgtEl>
+                                          <p:spTgt spid="11"/>
+                                        </p:tgtEl>
+                                        <p:attrNameLst>
+                                          <p:attrName>ppt_w</p:attrName>
+                                        </p:attrNameLst>
+                                      </p:cBhvr>
+                                      <p:tavLst>
+                                        <p:tav tm="0">
+                                          <p:val>
+                                            <p:fltVal val="0"/>
+                                          </p:val>
+                                        </p:tav>
+                                        <p:tav tm="100000">
+                                          <p:val>
+                                            <p:strVal val="#ppt_w"/>
+                                          </p:val>
+                                        </p:tav>
+                                      </p:tavLst>
+                                    </p:anim>
+                                    <p:anim calcmode="lin" valueType="num">
+                                      <p:cBhvr>
+                                        <p:cTn id="8" dur="500" fill="hold"/>
+                                        <p:tgtEl>
+                                          <p:spTgt spid="11"/>
+                                        </p:tgtEl>
+                                        <p:attrNameLst>
+                                          <p:attrName>ppt_h</p:attrName>
+                                        </p:attrNameLst>
+                                      </p:cBhvr>
+                                      <p:tavLst>
+                                        <p:tav tm="0">
+                                          <p:val>
+                                            <p:fltVal val="0"/>
+                                          </p:val>
+                                        </p:tav>
+                                        <p:tav tm="100000">
+                                          <p:val>
+                                            <p:strVal val="#ppt_h"/>
+                                          </p:val>
+                                        </p:tav>
+                                      </p:tavLst>
+                                    </p:anim>
+                                    <p:animEffect transition="in" filter="fade">
+                                      <p:cBhvr>
+                                        <p:cTn id="9" dur="500"/>
+                                        <p:tgtEl>
+                                          <p:spTgt spid="11"/>
+                                        </p:tgtEl>
+                                      </p:cBhvr>
+                                    </p:animEffect>
+                                  </p:childTnLst>
+                                </p:cTn>
+                              </p:par>
+                            </p:childTnLst>
+                          </p:cTn>
+                        </p:par>
+                      </p:childTnLst>
+                    </p:cTn>
+                  </p:par>
+                  <p:par>
+                    <p:cTn id="10" fill="hold">
+                      <p:stCondLst>
+                        <p:cond delay="indefinite"/>
+                      </p:stCondLst>
+                      <p:childTnLst>
+                        <p:par>
+                          <p:cTn id="11" fill="hold">
+                            <p:stCondLst>
+                              <p:cond delay="0"/>
+                            </p:stCondLst>
+                            <p:childTnLst>
+                              <p:par>
+                                <p:cTn id="12" presetID="53" presetClass="entr" presetSubtype="16" fill="hold" nodeType="clickEffect">
+                                  <p:stCondLst>
+                                    <p:cond delay="0"/>
+                                  </p:stCondLst>
+                                  <p:childTnLst>
+                                    <p:set>
+                                      <p:cBhvr>
+                                        <p:cTn id="13" dur="1" fill="hold">
+                                          <p:stCondLst>
+                                            <p:cond delay="0"/>
+                                          </p:stCondLst>
+                                        </p:cTn>
+                                        <p:tgtEl>
+                                          <p:spTgt spid="2"/>
+                                        </p:tgtEl>
+                                        <p:attrNameLst>
+                                          <p:attrName>style.visibility</p:attrName>
+                                        </p:attrNameLst>
+                                      </p:cBhvr>
+                                      <p:to>
+                                        <p:strVal val="visible"/>
+                                      </p:to>
+                                    </p:set>
+                                    <p:anim calcmode="lin" valueType="num">
+                                      <p:cBhvr>
+                                        <p:cTn id="14" dur="500" fill="hold"/>
+                                        <p:tgtEl>
+                                          <p:spTgt spid="2"/>
+                                        </p:tgtEl>
+                                        <p:attrNameLst>
+                                          <p:attrName>ppt_w</p:attrName>
+                                        </p:attrNameLst>
+                                      </p:cBhvr>
+                                      <p:tavLst>
+                                        <p:tav tm="0">
+                                          <p:val>
+                                            <p:fltVal val="0"/>
+                                          </p:val>
+                                        </p:tav>
+                                        <p:tav tm="100000">
+                                          <p:val>
+                                            <p:strVal val="#ppt_w"/>
+                                          </p:val>
+                                        </p:tav>
+                                      </p:tavLst>
+                                    </p:anim>
+                                    <p:anim calcmode="lin" valueType="num">
+                                      <p:cBhvr>
+                                        <p:cTn id="15" dur="500" fill="hold"/>
+                                        <p:tgtEl>
+                                          <p:spTgt spid="2"/>
+                                        </p:tgtEl>
+                                        <p:attrNameLst>
+                                          <p:attrName>ppt_h</p:attrName>
+                                        </p:attrNameLst>
+                                      </p:cBhvr>
+                                      <p:tavLst>
+                                        <p:tav tm="0">
+                                          <p:val>
+                                            <p:fltVal val="0"/>
+                                          </p:val>
+                                        </p:tav>
+                                        <p:tav tm="100000">
+                                          <p:val>
+                                            <p:strVal val="#ppt_h"/>
+                                          </p:val>
+                                        </p:tav>
+                                      </p:tavLst>
+                                    </p:anim>
+                                    <p:animEffect transition="in" filter="fade">
+                                      <p:cBhvr>
+                                        <p:cTn id="16" dur="500"/>
+                                        <p:tgtEl>
+                                          <p:spTgt spid="2"/>
+                                        </p:tgtEl>
+                                      </p:cBhvr>
+                                    </p:animEffect>
+                                  </p:childTnLst>
+                                </p:cTn>
+                              </p:par>
+                            </p:childTnLst>
+                          </p:cTn>
+                        </p:par>
+                      </p:childTnLst>
+                    </p:cTn>
+                  </p:par>
+                </p:childTnLst>
+              </p:cTn>
+              <p:prevCondLst>
+                <p:cond evt="onPrev" delay="0">
+                  <p:tgtEl>
+                    <p:sldTgt/>
+                  </p:tgtEl>
+                </p:cond>
+              </p:prevCondLst>
+              <p:nextCondLst>
+                <p:cond evt="onNext" delay="0">
+                  <p:tgtEl>
+                    <p:sldTgt/>
+                  </p:tgtEl>
+                </p:cond>
+              </p:nextCondLst>
+            </p:seq>
+          </p:childTnLst>
+        </p:cTn>
+      </p:par>
+    </p:tnLst>
+  </p:timing>
+</p:sld>
+</file>
+
+<file path=ppt/slides/slide5.xml><?xml version="1.0" encoding="utf-8"?>
+<p:sld xmlns:a="http://schemas.openxmlformats.org/drawingml/2006/main" xmlns:r="http://schemas.openxmlformats.org/officeDocument/2006/relationships" xmlns:p="http://schemas.openxmlformats.org/presentationml/2006/main">
+  <p:cSld>
+    <p:spTree>
+      <p:nvGrpSpPr>
+        <p:cNvPr id="1" name=""/>
+        <p:cNvGrpSpPr/>
+        <p:nvPr/>
+      </p:nvGrpSpPr>
+      <p:grpSpPr>
+        <a:xfrm>
+          <a:off x="0" y="0"/>
+          <a:ext cx="0" cy="0"/>
+          <a:chOff x="0" y="0"/>
+          <a:chExt cx="0" cy="0"/>
+        </a:xfrm>
+      </p:grpSpPr>
+      <p:sp>
+        <p:nvSpPr>
+          <p:cNvPr id="4" name="Заголовок 3">
+            <a:extLst>
+              <a:ext uri="{FF2B5EF4-FFF2-40B4-BE49-F238E27FC236}">
+                <a16:creationId xmlns:a16="http://schemas.microsoft.com/office/drawing/2014/main" id="{56B210DD-3C70-4225-BAC0-26F0709D6072}"/>
+              </a:ext>
+            </a:extLst>
+          </p:cNvPr>
+          <p:cNvSpPr>
+            <a:spLocks noGrp="1"/>
+          </p:cNvSpPr>
+          <p:nvPr>
+            <p:ph type="title"/>
+          </p:nvPr>
+        </p:nvSpPr>
+        <p:spPr/>
+        <p:txBody>
+          <a:bodyPr>
+            <a:normAutofit/>
+          </a:bodyPr>
+          <a:lstStyle/>
+          <a:p>
+            <a:r>
+              <a:rPr lang="ru-RU" b="1" dirty="0"/>
+              <a:t>Принцип разделения интерфейса</a:t>
+            </a:r>
+            <a:br>
+              <a:rPr lang="en-US" b="1" dirty="0"/>
+            </a:br>
+            <a:r>
+              <a:rPr lang="en-US" sz="3200" i="1" dirty="0"/>
+              <a:t>The Interface Segregation Principle</a:t>
+            </a:r>
+            <a:endParaRPr lang="en-US" dirty="0"/>
+          </a:p>
+        </p:txBody>
+      </p:sp>
+      <p:sp>
+        <p:nvSpPr>
+          <p:cNvPr id="3" name="TextBox 2">
+            <a:extLst>
+              <a:ext uri="{FF2B5EF4-FFF2-40B4-BE49-F238E27FC236}">
+                <a16:creationId xmlns:a16="http://schemas.microsoft.com/office/drawing/2014/main" id="{9D5961E6-AF38-4100-8B63-BD9839E777E6}"/>
+              </a:ext>
+            </a:extLst>
+          </p:cNvPr>
+          <p:cNvSpPr txBox="1"/>
+          <p:nvPr/>
+        </p:nvSpPr>
+        <p:spPr>
+          <a:xfrm>
+            <a:off x="576263" y="2233613"/>
+            <a:ext cx="9836982" cy="523220"/>
+          </a:xfrm>
+          <a:prstGeom prst="rect">
+            <a:avLst/>
+          </a:prstGeom>
+          <a:noFill/>
+        </p:spPr>
+        <p:txBody>
+          <a:bodyPr wrap="square" rtlCol="0">
+            <a:spAutoFit/>
+          </a:bodyPr>
+          <a:lstStyle/>
+          <a:p>
+            <a:r>
+              <a:rPr lang="ru-RU" sz="2800" dirty="0">
+                <a:solidFill>
+                  <a:srgbClr val="FFFF00"/>
+                </a:solidFill>
+              </a:rPr>
+              <a:t>Пример нарушения №</a:t>
+            </a:r>
+            <a:r>
+              <a:rPr lang="en-US" sz="2800" dirty="0">
+                <a:solidFill>
+                  <a:srgbClr val="FFFF00"/>
+                </a:solidFill>
+              </a:rPr>
+              <a:t>2</a:t>
+            </a:r>
+            <a:endParaRPr lang="ru-RU" sz="2800" dirty="0">
+              <a:solidFill>
+                <a:srgbClr val="FFFF00"/>
+              </a:solidFill>
+            </a:endParaRPr>
+          </a:p>
+        </p:txBody>
+      </p:sp>
+      <p:grpSp>
+        <p:nvGrpSpPr>
+          <p:cNvPr id="11" name="Группа 10">
+            <a:extLst>
+              <a:ext uri="{FF2B5EF4-FFF2-40B4-BE49-F238E27FC236}">
+                <a16:creationId xmlns:a16="http://schemas.microsoft.com/office/drawing/2014/main" id="{5A7517D9-AFE5-4197-83A4-3617D812D265}"/>
+              </a:ext>
+            </a:extLst>
+          </p:cNvPr>
+          <p:cNvGrpSpPr/>
+          <p:nvPr/>
+        </p:nvGrpSpPr>
+        <p:grpSpPr>
+          <a:xfrm>
+            <a:off x="576263" y="2865826"/>
+            <a:ext cx="4490920" cy="3558739"/>
+            <a:chOff x="576263" y="2865826"/>
+            <a:chExt cx="4490920" cy="3558739"/>
+          </a:xfrm>
+        </p:grpSpPr>
+        <p:sp>
+          <p:nvSpPr>
+            <p:cNvPr id="5" name="Прямоугольник 4">
+              <a:extLst>
+                <a:ext uri="{FF2B5EF4-FFF2-40B4-BE49-F238E27FC236}">
+                  <a16:creationId xmlns:a16="http://schemas.microsoft.com/office/drawing/2014/main" id="{EBD2903A-4A67-4E2A-BAFE-80417A9F98D1}"/>
+                </a:ext>
+              </a:extLst>
+            </p:cNvPr>
+            <p:cNvSpPr/>
+            <p:nvPr/>
+          </p:nvSpPr>
+          <p:spPr>
+            <a:xfrm>
+              <a:off x="576263" y="2865826"/>
+              <a:ext cx="4490920" cy="3558739"/>
+            </a:xfrm>
+            <a:prstGeom prst="rect">
+              <a:avLst/>
+            </a:prstGeom>
+            <a:solidFill>
+              <a:schemeClr val="accent3">
+                <a:lumMod val="75000"/>
+              </a:schemeClr>
+            </a:solidFill>
+          </p:spPr>
+          <p:style>
+            <a:lnRef idx="2">
+              <a:schemeClr val="accent1">
+                <a:shade val="50000"/>
+              </a:schemeClr>
+            </a:lnRef>
+            <a:fillRef idx="1">
+              <a:schemeClr val="accent1"/>
+            </a:fillRef>
+            <a:effectRef idx="0">
+              <a:schemeClr val="accent1"/>
+            </a:effectRef>
+            <a:fontRef idx="minor">
+              <a:schemeClr val="lt1"/>
+            </a:fontRef>
+          </p:style>
+          <p:txBody>
+            <a:bodyPr rtlCol="0" anchor="ctr"/>
+            <a:lstStyle/>
+            <a:p>
+              <a:pPr algn="ctr"/>
+              <a:endParaRPr lang="en-US" dirty="0"/>
+            </a:p>
+          </p:txBody>
+        </p:sp>
+        <p:sp>
+          <p:nvSpPr>
+            <p:cNvPr id="6" name="TextBox 5">
+              <a:extLst>
+                <a:ext uri="{FF2B5EF4-FFF2-40B4-BE49-F238E27FC236}">
+                  <a16:creationId xmlns:a16="http://schemas.microsoft.com/office/drawing/2014/main" id="{A13A6B0C-F054-4537-8B4B-6FB8EA500229}"/>
+                </a:ext>
+              </a:extLst>
+            </p:cNvPr>
+            <p:cNvSpPr txBox="1"/>
+            <p:nvPr/>
+          </p:nvSpPr>
+          <p:spPr>
+            <a:xfrm>
+              <a:off x="2270931" y="3007872"/>
+              <a:ext cx="1002197" cy="461665"/>
+            </a:xfrm>
+            <a:prstGeom prst="rect">
+              <a:avLst/>
+            </a:prstGeom>
+            <a:noFill/>
+          </p:spPr>
+          <p:txBody>
+            <a:bodyPr wrap="none" rtlCol="0">
+              <a:spAutoFit/>
+            </a:bodyPr>
+            <a:lstStyle/>
+            <a:p>
+              <a:r>
+                <a:rPr lang="en-US" sz="2400" dirty="0"/>
+                <a:t>Shape</a:t>
+              </a:r>
+            </a:p>
+          </p:txBody>
+        </p:sp>
+        <p:sp>
+          <p:nvSpPr>
+            <p:cNvPr id="7" name="Прямоугольник 6">
+              <a:extLst>
+                <a:ext uri="{FF2B5EF4-FFF2-40B4-BE49-F238E27FC236}">
+                  <a16:creationId xmlns:a16="http://schemas.microsoft.com/office/drawing/2014/main" id="{76665BB6-3E7A-415D-8209-B47AF8E37890}"/>
+                </a:ext>
+              </a:extLst>
+            </p:cNvPr>
+            <p:cNvSpPr/>
+            <p:nvPr/>
+          </p:nvSpPr>
+          <p:spPr>
+            <a:xfrm>
+              <a:off x="774547" y="3858480"/>
+              <a:ext cx="1975757" cy="1001485"/>
+            </a:xfrm>
+            <a:prstGeom prst="rect">
+              <a:avLst/>
+            </a:prstGeom>
+            <a:solidFill>
+              <a:schemeClr val="accent3">
+                <a:lumMod val="60000"/>
+                <a:lumOff val="40000"/>
+              </a:schemeClr>
+            </a:solidFill>
+            <a:ln>
+              <a:noFill/>
+            </a:ln>
+          </p:spPr>
+          <p:style>
+            <a:lnRef idx="2">
+              <a:schemeClr val="accent1">
+                <a:shade val="50000"/>
+              </a:schemeClr>
+            </a:lnRef>
+            <a:fillRef idx="1">
+              <a:schemeClr val="accent1"/>
+            </a:fillRef>
+            <a:effectRef idx="0">
+              <a:schemeClr val="accent1"/>
+            </a:effectRef>
+            <a:fontRef idx="minor">
+              <a:schemeClr val="lt1"/>
+            </a:fontRef>
+          </p:style>
+          <p:txBody>
+            <a:bodyPr rtlCol="0" anchor="ctr"/>
+            <a:lstStyle/>
+            <a:p>
+              <a:pPr algn="ctr"/>
+              <a:r>
+                <a:rPr lang="en-US" dirty="0"/>
+                <a:t>Draw Circle</a:t>
+              </a:r>
+            </a:p>
+          </p:txBody>
+        </p:sp>
+        <p:sp>
+          <p:nvSpPr>
+            <p:cNvPr id="8" name="Прямоугольник 7">
+              <a:extLst>
+                <a:ext uri="{FF2B5EF4-FFF2-40B4-BE49-F238E27FC236}">
+                  <a16:creationId xmlns:a16="http://schemas.microsoft.com/office/drawing/2014/main" id="{C478F2AE-4263-46DA-B8ED-B9A86652D46A}"/>
+                </a:ext>
+              </a:extLst>
+            </p:cNvPr>
+            <p:cNvSpPr/>
+            <p:nvPr/>
+          </p:nvSpPr>
+          <p:spPr>
+            <a:xfrm>
+              <a:off x="2897262" y="3858479"/>
+              <a:ext cx="1975757" cy="1001485"/>
+            </a:xfrm>
+            <a:prstGeom prst="rect">
+              <a:avLst/>
+            </a:prstGeom>
+            <a:solidFill>
+              <a:schemeClr val="accent3">
+                <a:lumMod val="60000"/>
+                <a:lumOff val="40000"/>
+              </a:schemeClr>
+            </a:solidFill>
+            <a:ln>
+              <a:noFill/>
+            </a:ln>
+          </p:spPr>
+          <p:style>
+            <a:lnRef idx="2">
+              <a:schemeClr val="accent1">
+                <a:shade val="50000"/>
+              </a:schemeClr>
+            </a:lnRef>
+            <a:fillRef idx="1">
+              <a:schemeClr val="accent1"/>
+            </a:fillRef>
+            <a:effectRef idx="0">
+              <a:schemeClr val="accent1"/>
+            </a:effectRef>
+            <a:fontRef idx="minor">
+              <a:schemeClr val="lt1"/>
+            </a:fontRef>
+          </p:style>
+          <p:txBody>
+            <a:bodyPr rtlCol="0" anchor="ctr"/>
+            <a:lstStyle/>
+            <a:p>
+              <a:pPr algn="ctr"/>
+              <a:r>
+                <a:rPr lang="en-US" dirty="0"/>
+                <a:t>Draw Square</a:t>
+              </a:r>
+            </a:p>
+          </p:txBody>
+        </p:sp>
+        <p:sp>
+          <p:nvSpPr>
+            <p:cNvPr id="9" name="Прямоугольник 8">
+              <a:extLst>
+                <a:ext uri="{FF2B5EF4-FFF2-40B4-BE49-F238E27FC236}">
+                  <a16:creationId xmlns:a16="http://schemas.microsoft.com/office/drawing/2014/main" id="{19A2A3F5-EB28-4F9A-9B30-677870E78625}"/>
+                </a:ext>
+              </a:extLst>
+            </p:cNvPr>
+            <p:cNvSpPr/>
+            <p:nvPr/>
+          </p:nvSpPr>
+          <p:spPr>
+            <a:xfrm>
+              <a:off x="774546" y="5034137"/>
+              <a:ext cx="1975757" cy="1001485"/>
+            </a:xfrm>
+            <a:prstGeom prst="rect">
+              <a:avLst/>
+            </a:prstGeom>
+            <a:solidFill>
+              <a:schemeClr val="accent3">
+                <a:lumMod val="60000"/>
+                <a:lumOff val="40000"/>
+              </a:schemeClr>
+            </a:solidFill>
+            <a:ln>
+              <a:noFill/>
+            </a:ln>
+          </p:spPr>
+          <p:style>
+            <a:lnRef idx="2">
+              <a:schemeClr val="accent1">
+                <a:shade val="50000"/>
+              </a:schemeClr>
+            </a:lnRef>
+            <a:fillRef idx="1">
+              <a:schemeClr val="accent1"/>
+            </a:fillRef>
+            <a:effectRef idx="0">
+              <a:schemeClr val="accent1"/>
+            </a:effectRef>
+            <a:fontRef idx="minor">
+              <a:schemeClr val="lt1"/>
+            </a:fontRef>
+          </p:style>
+          <p:txBody>
+            <a:bodyPr rtlCol="0" anchor="ctr"/>
+            <a:lstStyle/>
+            <a:p>
+              <a:pPr algn="ctr"/>
+              <a:r>
+                <a:rPr lang="en-US" dirty="0"/>
+                <a:t>Draw Rectangle</a:t>
+              </a:r>
+            </a:p>
+          </p:txBody>
+        </p:sp>
+        <p:sp>
+          <p:nvSpPr>
+            <p:cNvPr id="10" name="Прямоугольник 9">
+              <a:extLst>
+                <a:ext uri="{FF2B5EF4-FFF2-40B4-BE49-F238E27FC236}">
+                  <a16:creationId xmlns:a16="http://schemas.microsoft.com/office/drawing/2014/main" id="{89C5E47F-146B-45B5-BFA5-5C0238F904D2}"/>
+                </a:ext>
+              </a:extLst>
+            </p:cNvPr>
+            <p:cNvSpPr/>
+            <p:nvPr/>
+          </p:nvSpPr>
+          <p:spPr>
+            <a:xfrm>
+              <a:off x="2897261" y="5034136"/>
+              <a:ext cx="1975757" cy="1001485"/>
+            </a:xfrm>
+            <a:prstGeom prst="rect">
+              <a:avLst/>
+            </a:prstGeom>
+            <a:solidFill>
+              <a:schemeClr val="accent3">
+                <a:lumMod val="60000"/>
+                <a:lumOff val="40000"/>
+              </a:schemeClr>
+            </a:solidFill>
+            <a:ln>
+              <a:noFill/>
+            </a:ln>
+          </p:spPr>
+          <p:style>
+            <a:lnRef idx="2">
+              <a:schemeClr val="accent1">
+                <a:shade val="50000"/>
+              </a:schemeClr>
+            </a:lnRef>
+            <a:fillRef idx="1">
+              <a:schemeClr val="accent1"/>
+            </a:fillRef>
+            <a:effectRef idx="0">
+              <a:schemeClr val="accent1"/>
+            </a:effectRef>
+            <a:fontRef idx="minor">
+              <a:schemeClr val="lt1"/>
+            </a:fontRef>
+          </p:style>
+          <p:txBody>
+            <a:bodyPr rtlCol="0" anchor="ctr"/>
+            <a:lstStyle/>
+            <a:p>
+              <a:pPr algn="ctr"/>
+              <a:r>
+                <a:rPr lang="en-US" dirty="0"/>
+                <a:t>Draw Triangle</a:t>
+              </a:r>
+            </a:p>
+          </p:txBody>
+        </p:sp>
+      </p:grpSp>
+      <p:pic>
+        <p:nvPicPr>
+          <p:cNvPr id="20" name="Рисунок 19">
+            <a:extLst>
+              <a:ext uri="{FF2B5EF4-FFF2-40B4-BE49-F238E27FC236}">
+                <a16:creationId xmlns:a16="http://schemas.microsoft.com/office/drawing/2014/main" id="{51A39472-26BA-48D7-AC7A-BD7F56A56D0D}"/>
+              </a:ext>
+            </a:extLst>
+          </p:cNvPr>
+          <p:cNvPicPr>
+            <a:picLocks noChangeAspect="1"/>
+          </p:cNvPicPr>
+          <p:nvPr/>
+        </p:nvPicPr>
+        <p:blipFill>
+          <a:blip r:embed="rId2"/>
+          <a:stretch>
+            <a:fillRect/>
+          </a:stretch>
+        </p:blipFill>
+        <p:spPr>
+          <a:xfrm>
+            <a:off x="5537284" y="2850600"/>
+            <a:ext cx="4815456" cy="3590162"/>
+          </a:xfrm>
+          <a:prstGeom prst="rect">
+            <a:avLst/>
+          </a:prstGeom>
+        </p:spPr>
+      </p:pic>
+    </p:spTree>
+    <p:extLst>
+      <p:ext uri="{BB962C8B-B14F-4D97-AF65-F5344CB8AC3E}">
+        <p14:creationId xmlns:p14="http://schemas.microsoft.com/office/powerpoint/2010/main" val="1704391494"/>
+      </p:ext>
+    </p:extLst>
+  </p:cSld>
+  <p:clrMapOvr>
+    <a:masterClrMapping/>
+  </p:clrMapOvr>
+  <p:transition spd="slow">
+    <p:cover/>
+  </p:transition>
+  <p:timing>
+    <p:tnLst>
+      <p:par>
+        <p:cTn id="1" dur="indefinite" restart="never" nodeType="tmRoot">
+          <p:childTnLst>
+            <p:seq concurrent="1" nextAc="seek">
+              <p:cTn id="2" dur="indefinite" nodeType="mainSeq">
+                <p:childTnLst>
+                  <p:par>
+                    <p:cTn id="3" fill="hold">
+                      <p:stCondLst>
+                        <p:cond delay="indefinite"/>
+                      </p:stCondLst>
+                      <p:childTnLst>
+                        <p:par>
+                          <p:cTn id="4" fill="hold">
+                            <p:stCondLst>
+                              <p:cond delay="0"/>
+                            </p:stCondLst>
+                            <p:childTnLst>
+                              <p:par>
+                                <p:cTn id="5" presetID="53" presetClass="entr" presetSubtype="16" fill="hold" nodeType="clickEffect">
+                                  <p:stCondLst>
+                                    <p:cond delay="0"/>
+                                  </p:stCondLst>
+                                  <p:childTnLst>
+                                    <p:set>
+                                      <p:cBhvr>
+                                        <p:cTn id="6" dur="1" fill="hold">
+                                          <p:stCondLst>
+                                            <p:cond delay="0"/>
+                                          </p:stCondLst>
+                                        </p:cTn>
+                                        <p:tgtEl>
+                                          <p:spTgt spid="11"/>
+                                        </p:tgtEl>
+                                        <p:attrNameLst>
+                                          <p:attrName>style.visibility</p:attrName>
+                                        </p:attrNameLst>
+                                      </p:cBhvr>
+                                      <p:to>
+                                        <p:strVal val="visible"/>
+                                      </p:to>
+                                    </p:set>
+                                    <p:anim calcmode="lin" valueType="num">
+                                      <p:cBhvr>
+                                        <p:cTn id="7" dur="500" fill="hold"/>
+                                        <p:tgtEl>
+                                          <p:spTgt spid="11"/>
+                                        </p:tgtEl>
+                                        <p:attrNameLst>
+                                          <p:attrName>ppt_w</p:attrName>
+                                        </p:attrNameLst>
+                                      </p:cBhvr>
+                                      <p:tavLst>
+                                        <p:tav tm="0">
+                                          <p:val>
+                                            <p:fltVal val="0"/>
+                                          </p:val>
+                                        </p:tav>
+                                        <p:tav tm="100000">
+                                          <p:val>
+                                            <p:strVal val="#ppt_w"/>
+                                          </p:val>
+                                        </p:tav>
+                                      </p:tavLst>
+                                    </p:anim>
+                                    <p:anim calcmode="lin" valueType="num">
+                                      <p:cBhvr>
+                                        <p:cTn id="8" dur="500" fill="hold"/>
+                                        <p:tgtEl>
+                                          <p:spTgt spid="11"/>
+                                        </p:tgtEl>
+                                        <p:attrNameLst>
+                                          <p:attrName>ppt_h</p:attrName>
+                                        </p:attrNameLst>
+                                      </p:cBhvr>
+                                      <p:tavLst>
+                                        <p:tav tm="0">
+                                          <p:val>
+                                            <p:fltVal val="0"/>
+                                          </p:val>
+                                        </p:tav>
+                                        <p:tav tm="100000">
+                                          <p:val>
+                                            <p:strVal val="#ppt_h"/>
+                                          </p:val>
+                                        </p:tav>
+                                      </p:tavLst>
+                                    </p:anim>
+                                    <p:animEffect transition="in" filter="fade">
+                                      <p:cBhvr>
+                                        <p:cTn id="9" dur="500"/>
+                                        <p:tgtEl>
+                                          <p:spTgt spid="11"/>
+                                        </p:tgtEl>
+                                      </p:cBhvr>
+                                    </p:animEffect>
+                                  </p:childTnLst>
+                                </p:cTn>
+                              </p:par>
+                            </p:childTnLst>
+                          </p:cTn>
+                        </p:par>
+                      </p:childTnLst>
+                    </p:cTn>
+                  </p:par>
+                  <p:par>
+                    <p:cTn id="10" fill="hold">
+                      <p:stCondLst>
+                        <p:cond delay="indefinite"/>
+                      </p:stCondLst>
+                      <p:childTnLst>
+                        <p:par>
+                          <p:cTn id="11" fill="hold">
+                            <p:stCondLst>
+                              <p:cond delay="0"/>
+                            </p:stCondLst>
+                            <p:childTnLst>
+                              <p:par>
+                                <p:cTn id="12" presetID="53" presetClass="entr" presetSubtype="16" fill="hold" nodeType="clickEffect">
+                                  <p:stCondLst>
+                                    <p:cond delay="0"/>
+                                  </p:stCondLst>
+                                  <p:childTnLst>
+                                    <p:set>
+                                      <p:cBhvr>
+                                        <p:cTn id="13" dur="1" fill="hold">
+                                          <p:stCondLst>
+                                            <p:cond delay="0"/>
+                                          </p:stCondLst>
+                                        </p:cTn>
+                                        <p:tgtEl>
+                                          <p:spTgt spid="20"/>
+                                        </p:tgtEl>
+                                        <p:attrNameLst>
+                                          <p:attrName>style.visibility</p:attrName>
+                                        </p:attrNameLst>
+                                      </p:cBhvr>
+                                      <p:to>
+                                        <p:strVal val="visible"/>
+                                      </p:to>
+                                    </p:set>
+                                    <p:anim calcmode="lin" valueType="num">
+                                      <p:cBhvr>
+                                        <p:cTn id="14" dur="500" fill="hold"/>
+                                        <p:tgtEl>
+                                          <p:spTgt spid="20"/>
+                                        </p:tgtEl>
+                                        <p:attrNameLst>
+                                          <p:attrName>ppt_w</p:attrName>
+                                        </p:attrNameLst>
+                                      </p:cBhvr>
+                                      <p:tavLst>
+                                        <p:tav tm="0">
+                                          <p:val>
+                                            <p:fltVal val="0"/>
+                                          </p:val>
+                                        </p:tav>
+                                        <p:tav tm="100000">
+                                          <p:val>
+                                            <p:strVal val="#ppt_w"/>
+                                          </p:val>
+                                        </p:tav>
+                                      </p:tavLst>
+                                    </p:anim>
+                                    <p:anim calcmode="lin" valueType="num">
+                                      <p:cBhvr>
+                                        <p:cTn id="15" dur="500" fill="hold"/>
+                                        <p:tgtEl>
+                                          <p:spTgt spid="20"/>
+                                        </p:tgtEl>
+                                        <p:attrNameLst>
+                                          <p:attrName>ppt_h</p:attrName>
+                                        </p:attrNameLst>
+                                      </p:cBhvr>
+                                      <p:tavLst>
+                                        <p:tav tm="0">
+                                          <p:val>
+                                            <p:fltVal val="0"/>
+                                          </p:val>
+                                        </p:tav>
+                                        <p:tav tm="100000">
+                                          <p:val>
+                                            <p:strVal val="#ppt_h"/>
+                                          </p:val>
+                                        </p:tav>
+                                      </p:tavLst>
+                                    </p:anim>
+                                    <p:animEffect transition="in" filter="fade">
+                                      <p:cBhvr>
+                                        <p:cTn id="16" dur="500"/>
+                                        <p:tgtEl>
+                                          <p:spTgt spid="20"/>
+                                        </p:tgtEl>
+                                      </p:cBhvr>
+                                    </p:animEffect>
+                                  </p:childTnLst>
+                                </p:cTn>
+                              </p:par>
+                            </p:childTnLst>
+                          </p:cTn>
+                        </p:par>
+                      </p:childTnLst>
+                    </p:cTn>
+                  </p:par>
+                </p:childTnLst>
+              </p:cTn>
+              <p:prevCondLst>
+                <p:cond evt="onPrev" delay="0">
+                  <p:tgtEl>
+                    <p:sldTgt/>
+                  </p:tgtEl>
+                </p:cond>
+              </p:prevCondLst>
+              <p:nextCondLst>
+                <p:cond evt="onNext" delay="0">
+                  <p:tgtEl>
+                    <p:sldTgt/>
+                  </p:tgtEl>
+                </p:cond>
+              </p:nextCondLst>
+            </p:seq>
+          </p:childTnLst>
+        </p:cTn>
+      </p:par>
+    </p:tnLst>
+  </p:timing>
+</p:sld>
+</file>
+
+<file path=ppt/slides/slide6.xml><?xml version="1.0" encoding="utf-8"?>
+<p:sld xmlns:a="http://schemas.openxmlformats.org/drawingml/2006/main" xmlns:r="http://schemas.openxmlformats.org/officeDocument/2006/relationships" xmlns:p="http://schemas.openxmlformats.org/presentationml/2006/main">
+  <p:cSld>
+    <p:spTree>
+      <p:nvGrpSpPr>
+        <p:cNvPr id="1" name=""/>
+        <p:cNvGrpSpPr/>
+        <p:nvPr/>
+      </p:nvGrpSpPr>
+      <p:grpSpPr>
+        <a:xfrm>
+          <a:off x="0" y="0"/>
+          <a:ext cx="0" cy="0"/>
+          <a:chOff x="0" y="0"/>
+          <a:chExt cx="0" cy="0"/>
+        </a:xfrm>
+      </p:grpSpPr>
+      <p:sp>
+        <p:nvSpPr>
+          <p:cNvPr id="4" name="Заголовок 3">
+            <a:extLst>
+              <a:ext uri="{FF2B5EF4-FFF2-40B4-BE49-F238E27FC236}">
+                <a16:creationId xmlns:a16="http://schemas.microsoft.com/office/drawing/2014/main" id="{56B210DD-3C70-4225-BAC0-26F0709D6072}"/>
+              </a:ext>
+            </a:extLst>
+          </p:cNvPr>
+          <p:cNvSpPr>
+            <a:spLocks noGrp="1"/>
+          </p:cNvSpPr>
+          <p:nvPr>
+            <p:ph type="title"/>
+          </p:nvPr>
+        </p:nvSpPr>
+        <p:spPr/>
+        <p:txBody>
+          <a:bodyPr>
+            <a:normAutofit/>
+          </a:bodyPr>
+          <a:lstStyle/>
+          <a:p>
+            <a:r>
+              <a:rPr lang="ru-RU" b="1" dirty="0"/>
+              <a:t>Принцип разделения интерфейса</a:t>
+            </a:r>
+            <a:br>
+              <a:rPr lang="en-US" b="1" dirty="0"/>
+            </a:br>
+            <a:r>
+              <a:rPr lang="en-US" sz="3200" i="1" dirty="0"/>
+              <a:t>The Interface Segregation Principle</a:t>
+            </a:r>
+            <a:endParaRPr lang="en-US" dirty="0"/>
+          </a:p>
+        </p:txBody>
+      </p:sp>
+      <p:sp>
+        <p:nvSpPr>
+          <p:cNvPr id="3" name="TextBox 2">
+            <a:extLst>
+              <a:ext uri="{FF2B5EF4-FFF2-40B4-BE49-F238E27FC236}">
+                <a16:creationId xmlns:a16="http://schemas.microsoft.com/office/drawing/2014/main" id="{9D5961E6-AF38-4100-8B63-BD9839E777E6}"/>
+              </a:ext>
+            </a:extLst>
+          </p:cNvPr>
+          <p:cNvSpPr txBox="1"/>
+          <p:nvPr/>
+        </p:nvSpPr>
+        <p:spPr>
+          <a:xfrm>
+            <a:off x="576263" y="2233613"/>
+            <a:ext cx="9836982" cy="1261884"/>
+          </a:xfrm>
+          <a:prstGeom prst="rect">
+            <a:avLst/>
+          </a:prstGeom>
+          <a:noFill/>
+        </p:spPr>
+        <p:txBody>
+          <a:bodyPr wrap="square" rtlCol="0">
+            <a:spAutoFit/>
+          </a:bodyPr>
+          <a:lstStyle/>
+          <a:p>
+            <a:r>
+              <a:rPr lang="ru-RU" sz="2800" dirty="0">
+                <a:solidFill>
+                  <a:srgbClr val="FFFF00"/>
+                </a:solidFill>
+              </a:rPr>
+              <a:t>Типы интерфейсов</a:t>
+            </a:r>
+            <a:endParaRPr lang="en-US" sz="2800" dirty="0">
+              <a:solidFill>
+                <a:srgbClr val="FFFF00"/>
+              </a:solidFill>
+            </a:endParaRPr>
+          </a:p>
+          <a:p>
+            <a:endParaRPr lang="en-US" sz="2800" dirty="0">
+              <a:solidFill>
+                <a:srgbClr val="FFFF00"/>
+              </a:solidFill>
+            </a:endParaRPr>
+          </a:p>
+          <a:p>
+            <a:r>
+              <a:rPr lang="ru-RU" sz="2000" dirty="0"/>
+              <a:t>Интерфейсы по типу использования можно подразделить на следующие типы</a:t>
+            </a:r>
+            <a:r>
+              <a:rPr lang="en-US" sz="2000" dirty="0"/>
+              <a:t>:</a:t>
+            </a:r>
+            <a:endParaRPr lang="ru-RU" sz="2000" dirty="0"/>
+          </a:p>
+        </p:txBody>
+      </p:sp>
+      <p:sp>
+        <p:nvSpPr>
+          <p:cNvPr id="12" name="Прямоугольник: скругленные углы 11">
+            <a:extLst>
+              <a:ext uri="{FF2B5EF4-FFF2-40B4-BE49-F238E27FC236}">
+                <a16:creationId xmlns:a16="http://schemas.microsoft.com/office/drawing/2014/main" id="{75C7402F-5914-441F-8C4C-44719809A743}"/>
+              </a:ext>
+            </a:extLst>
+          </p:cNvPr>
+          <p:cNvSpPr/>
+          <p:nvPr/>
+        </p:nvSpPr>
+        <p:spPr>
+          <a:xfrm>
+            <a:off x="1202869" y="4202721"/>
+            <a:ext cx="4027716" cy="1882667"/>
+          </a:xfrm>
+          <a:prstGeom prst="roundRect">
+            <a:avLst/>
+          </a:prstGeom>
+          <a:gradFill>
+            <a:gsLst>
+              <a:gs pos="100000">
+                <a:srgbClr val="FF710D"/>
+              </a:gs>
+              <a:gs pos="78000">
+                <a:schemeClr val="bg2">
+                  <a:shade val="100000"/>
+                  <a:hueMod val="100000"/>
+                  <a:satMod val="110000"/>
+                  <a:lumMod val="130000"/>
+                </a:schemeClr>
+              </a:gs>
+              <a:gs pos="0">
+                <a:schemeClr val="bg2">
+                  <a:shade val="78000"/>
+                  <a:hueMod val="44000"/>
+                  <a:satMod val="200000"/>
+                  <a:lumMod val="69000"/>
+                </a:schemeClr>
+              </a:gs>
+            </a:gsLst>
+            <a:lin ang="2520000" scaled="0"/>
+          </a:gradFill>
+          <a:ln>
+            <a:solidFill>
+              <a:schemeClr val="tx1"/>
+            </a:solidFill>
+          </a:ln>
+        </p:spPr>
+        <p:style>
+          <a:lnRef idx="2">
+            <a:schemeClr val="accent1">
+              <a:shade val="50000"/>
+            </a:schemeClr>
+          </a:lnRef>
+          <a:fillRef idx="1">
+            <a:schemeClr val="accent1"/>
+          </a:fillRef>
+          <a:effectRef idx="0">
+            <a:schemeClr val="accent1"/>
+          </a:effectRef>
+          <a:fontRef idx="minor">
+            <a:schemeClr val="lt1"/>
+          </a:fontRef>
+        </p:style>
+        <p:txBody>
+          <a:bodyPr rtlCol="0" anchor="ctr"/>
+          <a:lstStyle/>
+          <a:p>
+            <a:pPr algn="ctr"/>
+            <a:r>
+              <a:rPr lang="ru-RU"/>
+              <a:t>Маркер</a:t>
+            </a:r>
+            <a:endParaRPr lang="en-US" dirty="0"/>
+          </a:p>
+        </p:txBody>
+      </p:sp>
+      <p:sp>
+        <p:nvSpPr>
+          <p:cNvPr id="14" name="Прямоугольник: скругленные углы 13">
+            <a:extLst>
+              <a:ext uri="{FF2B5EF4-FFF2-40B4-BE49-F238E27FC236}">
+                <a16:creationId xmlns:a16="http://schemas.microsoft.com/office/drawing/2014/main" id="{4BA7D071-31D7-4041-A8FC-131E6097EE8E}"/>
+              </a:ext>
+            </a:extLst>
+          </p:cNvPr>
+          <p:cNvSpPr/>
+          <p:nvPr/>
+        </p:nvSpPr>
+        <p:spPr>
+          <a:xfrm>
+            <a:off x="5524503" y="4211219"/>
+            <a:ext cx="4027716" cy="1882667"/>
+          </a:xfrm>
+          <a:prstGeom prst="roundRect">
+            <a:avLst/>
+          </a:prstGeom>
+          <a:gradFill>
+            <a:gsLst>
+              <a:gs pos="100000">
+                <a:srgbClr val="FF710D"/>
+              </a:gs>
+              <a:gs pos="78000">
+                <a:schemeClr val="bg2">
+                  <a:shade val="100000"/>
+                  <a:hueMod val="100000"/>
+                  <a:satMod val="110000"/>
+                  <a:lumMod val="130000"/>
+                </a:schemeClr>
+              </a:gs>
+              <a:gs pos="0">
+                <a:schemeClr val="bg2">
+                  <a:shade val="78000"/>
+                  <a:hueMod val="44000"/>
+                  <a:satMod val="200000"/>
+                  <a:lumMod val="69000"/>
+                </a:schemeClr>
+              </a:gs>
+            </a:gsLst>
+            <a:lin ang="2520000" scaled="0"/>
+          </a:gradFill>
+          <a:ln>
+            <a:solidFill>
+              <a:schemeClr val="tx1"/>
+            </a:solidFill>
+          </a:ln>
+        </p:spPr>
+        <p:style>
+          <a:lnRef idx="2">
+            <a:schemeClr val="accent1">
+              <a:shade val="50000"/>
+            </a:schemeClr>
+          </a:lnRef>
+          <a:fillRef idx="1">
+            <a:schemeClr val="accent1"/>
+          </a:fillRef>
+          <a:effectRef idx="0">
+            <a:schemeClr val="accent1"/>
+          </a:effectRef>
+          <a:fontRef idx="minor">
+            <a:schemeClr val="lt1"/>
+          </a:fontRef>
+        </p:style>
+        <p:txBody>
+          <a:bodyPr rtlCol="0" anchor="ctr"/>
+          <a:lstStyle/>
+          <a:p>
+            <a:pPr algn="ctr"/>
+            <a:r>
+              <a:rPr lang="en-US" dirty="0"/>
+              <a:t>Can Do</a:t>
+            </a:r>
+          </a:p>
+        </p:txBody>
+      </p:sp>
+    </p:spTree>
+    <p:extLst>
+      <p:ext uri="{BB962C8B-B14F-4D97-AF65-F5344CB8AC3E}">
+        <p14:creationId xmlns:p14="http://schemas.microsoft.com/office/powerpoint/2010/main" val="2323542190"/>
+      </p:ext>
+    </p:extLst>
+  </p:cSld>
+  <p:clrMapOvr>
+    <a:masterClrMapping/>
+  </p:clrMapOvr>
+  <p:transition spd="slow">
+    <p:cover/>
+  </p:transition>
+  <p:timing>
+    <p:tnLst>
+      <p:par>
+        <p:cTn id="1" dur="indefinite" restart="never" nodeType="tmRoot">
+          <p:childTnLst>
+            <p:seq concurrent="1" nextAc="seek">
+              <p:cTn id="2" dur="indefinite" nodeType="mainSeq">
+                <p:childTnLst>
+                  <p:par>
+                    <p:cTn id="3" fill="hold">
+                      <p:stCondLst>
+                        <p:cond delay="indefinite"/>
+                      </p:stCondLst>
+                      <p:childTnLst>
+                        <p:par>
+                          <p:cTn id="4" fill="hold">
+                            <p:stCondLst>
+                              <p:cond delay="0"/>
+                            </p:stCondLst>
+                            <p:childTnLst>
+                              <p:par>
+                                <p:cTn id="5" presetID="53" presetClass="entr" presetSubtype="16" fill="hold" grpId="0" nodeType="clickEffect">
+                                  <p:stCondLst>
+                                    <p:cond delay="0"/>
+                                  </p:stCondLst>
+                                  <p:childTnLst>
+                                    <p:set>
+                                      <p:cBhvr>
+                                        <p:cTn id="6" dur="1" fill="hold">
+                                          <p:stCondLst>
+                                            <p:cond delay="0"/>
+                                          </p:stCondLst>
+                                        </p:cTn>
+                                        <p:tgtEl>
+                                          <p:spTgt spid="12"/>
+                                        </p:tgtEl>
+                                        <p:attrNameLst>
+                                          <p:attrName>style.visibility</p:attrName>
+                                        </p:attrNameLst>
+                                      </p:cBhvr>
+                                      <p:to>
+                                        <p:strVal val="visible"/>
+                                      </p:to>
+                                    </p:set>
+                                    <p:anim calcmode="lin" valueType="num">
+                                      <p:cBhvr>
+                                        <p:cTn id="7" dur="500" fill="hold"/>
+                                        <p:tgtEl>
+                                          <p:spTgt spid="12"/>
+                                        </p:tgtEl>
+                                        <p:attrNameLst>
+                                          <p:attrName>ppt_w</p:attrName>
+                                        </p:attrNameLst>
+                                      </p:cBhvr>
+                                      <p:tavLst>
+                                        <p:tav tm="0">
+                                          <p:val>
+                                            <p:fltVal val="0"/>
+                                          </p:val>
+                                        </p:tav>
+                                        <p:tav tm="100000">
+                                          <p:val>
+                                            <p:strVal val="#ppt_w"/>
+                                          </p:val>
+                                        </p:tav>
+                                      </p:tavLst>
+                                    </p:anim>
+                                    <p:anim calcmode="lin" valueType="num">
+                                      <p:cBhvr>
+                                        <p:cTn id="8" dur="500" fill="hold"/>
+                                        <p:tgtEl>
+                                          <p:spTgt spid="12"/>
+                                        </p:tgtEl>
+                                        <p:attrNameLst>
+                                          <p:attrName>ppt_h</p:attrName>
+                                        </p:attrNameLst>
+                                      </p:cBhvr>
+                                      <p:tavLst>
+                                        <p:tav tm="0">
+                                          <p:val>
+                                            <p:fltVal val="0"/>
+                                          </p:val>
+                                        </p:tav>
+                                        <p:tav tm="100000">
+                                          <p:val>
+                                            <p:strVal val="#ppt_h"/>
+                                          </p:val>
+                                        </p:tav>
+                                      </p:tavLst>
+                                    </p:anim>
+                                    <p:animEffect transition="in" filter="fade">
+                                      <p:cBhvr>
+                                        <p:cTn id="9" dur="500"/>
+                                        <p:tgtEl>
+                                          <p:spTgt spid="12"/>
+                                        </p:tgtEl>
+                                      </p:cBhvr>
+                                    </p:animEffect>
+                                  </p:childTnLst>
+                                </p:cTn>
+                              </p:par>
+                            </p:childTnLst>
+                          </p:cTn>
+                        </p:par>
+                      </p:childTnLst>
+                    </p:cTn>
+                  </p:par>
+                  <p:par>
+                    <p:cTn id="10" fill="hold">
+                      <p:stCondLst>
+                        <p:cond delay="indefinite"/>
+                      </p:stCondLst>
+                      <p:childTnLst>
+                        <p:par>
+                          <p:cTn id="11" fill="hold">
+                            <p:stCondLst>
+                              <p:cond delay="0"/>
+                            </p:stCondLst>
+                            <p:childTnLst>
+                              <p:par>
+                                <p:cTn id="12" presetID="53" presetClass="entr" presetSubtype="16" fill="hold" grpId="0" nodeType="clickEffect">
+                                  <p:stCondLst>
+                                    <p:cond delay="0"/>
+                                  </p:stCondLst>
+                                  <p:childTnLst>
+                                    <p:set>
+                                      <p:cBhvr>
+                                        <p:cTn id="13" dur="1" fill="hold">
+                                          <p:stCondLst>
+                                            <p:cond delay="0"/>
+                                          </p:stCondLst>
+                                        </p:cTn>
+                                        <p:tgtEl>
+                                          <p:spTgt spid="14"/>
+                                        </p:tgtEl>
+                                        <p:attrNameLst>
+                                          <p:attrName>style.visibility</p:attrName>
+                                        </p:attrNameLst>
+                                      </p:cBhvr>
+                                      <p:to>
+                                        <p:strVal val="visible"/>
+                                      </p:to>
+                                    </p:set>
+                                    <p:anim calcmode="lin" valueType="num">
+                                      <p:cBhvr>
+                                        <p:cTn id="14" dur="500" fill="hold"/>
+                                        <p:tgtEl>
+                                          <p:spTgt spid="14"/>
+                                        </p:tgtEl>
+                                        <p:attrNameLst>
+                                          <p:attrName>ppt_w</p:attrName>
+                                        </p:attrNameLst>
+                                      </p:cBhvr>
+                                      <p:tavLst>
+                                        <p:tav tm="0">
+                                          <p:val>
+                                            <p:fltVal val="0"/>
+                                          </p:val>
+                                        </p:tav>
+                                        <p:tav tm="100000">
+                                          <p:val>
+                                            <p:strVal val="#ppt_w"/>
+                                          </p:val>
+                                        </p:tav>
+                                      </p:tavLst>
+                                    </p:anim>
+                                    <p:anim calcmode="lin" valueType="num">
+                                      <p:cBhvr>
+                                        <p:cTn id="15" dur="500" fill="hold"/>
+                                        <p:tgtEl>
+                                          <p:spTgt spid="14"/>
+                                        </p:tgtEl>
+                                        <p:attrNameLst>
+                                          <p:attrName>ppt_h</p:attrName>
+                                        </p:attrNameLst>
+                                      </p:cBhvr>
+                                      <p:tavLst>
+                                        <p:tav tm="0">
+                                          <p:val>
+                                            <p:fltVal val="0"/>
+                                          </p:val>
+                                        </p:tav>
+                                        <p:tav tm="100000">
+                                          <p:val>
+                                            <p:strVal val="#ppt_h"/>
+                                          </p:val>
+                                        </p:tav>
+                                      </p:tavLst>
+                                    </p:anim>
+                                    <p:animEffect transition="in" filter="fade">
+                                      <p:cBhvr>
+                                        <p:cTn id="16" dur="500"/>
+                                        <p:tgtEl>
+                                          <p:spTgt spid="14"/>
+                                        </p:tgtEl>
+                                      </p:cBhvr>
+                                    </p:animEffect>
+                                  </p:childTnLst>
+                                </p:cTn>
+                              </p:par>
+                            </p:childTnLst>
+                          </p:cTn>
+                        </p:par>
+                      </p:childTnLst>
+                    </p:cTn>
+                  </p:par>
+                </p:childTnLst>
+              </p:cTn>
+              <p:prevCondLst>
+                <p:cond evt="onPrev" delay="0">
+                  <p:tgtEl>
+                    <p:sldTgt/>
+                  </p:tgtEl>
+                </p:cond>
+              </p:prevCondLst>
+              <p:nextCondLst>
+                <p:cond evt="onNext" delay="0">
+                  <p:tgtEl>
+                    <p:sldTgt/>
+                  </p:tgtEl>
+                </p:cond>
+              </p:nextCondLst>
+            </p:seq>
+          </p:childTnLst>
+        </p:cTn>
+      </p:par>
+    </p:tnLst>
+    <p:bldLst>
+      <p:bldP spid="12" grpId="0" animBg="1"/>
+      <p:bldP spid="14" grpId="0" animBg="1"/>
+    </p:bldLst>
+  </p:timing>
+</p:sld>
+</file>
+
+<file path=ppt/slides/slide7.xml><?xml version="1.0" encoding="utf-8"?>
+<p:sld xmlns:a="http://schemas.openxmlformats.org/drawingml/2006/main" xmlns:r="http://schemas.openxmlformats.org/officeDocument/2006/relationships" xmlns:p="http://schemas.openxmlformats.org/presentationml/2006/main">
+  <p:cSld>
+    <p:spTree>
+      <p:nvGrpSpPr>
+        <p:cNvPr id="1" name=""/>
+        <p:cNvGrpSpPr/>
+        <p:nvPr/>
+      </p:nvGrpSpPr>
+      <p:grpSpPr>
+        <a:xfrm>
+          <a:off x="0" y="0"/>
+          <a:ext cx="0" cy="0"/>
+          <a:chOff x="0" y="0"/>
+          <a:chExt cx="0" cy="0"/>
+        </a:xfrm>
+      </p:grpSpPr>
+      <p:sp>
+        <p:nvSpPr>
+          <p:cNvPr id="4" name="Заголовок 3">
+            <a:extLst>
+              <a:ext uri="{FF2B5EF4-FFF2-40B4-BE49-F238E27FC236}">
+                <a16:creationId xmlns:a16="http://schemas.microsoft.com/office/drawing/2014/main" id="{56B210DD-3C70-4225-BAC0-26F0709D6072}"/>
+              </a:ext>
+            </a:extLst>
+          </p:cNvPr>
+          <p:cNvSpPr>
+            <a:spLocks noGrp="1"/>
+          </p:cNvSpPr>
+          <p:nvPr>
+            <p:ph type="title"/>
+          </p:nvPr>
+        </p:nvSpPr>
+        <p:spPr/>
+        <p:txBody>
+          <a:bodyPr>
+            <a:normAutofit/>
+          </a:bodyPr>
+          <a:lstStyle/>
+          <a:p>
+            <a:r>
+              <a:rPr lang="ru-RU" b="1" dirty="0"/>
+              <a:t>Принцип разделения интерфейса</a:t>
+            </a:r>
+            <a:br>
+              <a:rPr lang="en-US" b="1" dirty="0"/>
+            </a:br>
+            <a:r>
+              <a:rPr lang="en-US" sz="3200" i="1" dirty="0"/>
+              <a:t>The Interface Segregation Principle</a:t>
+            </a:r>
+            <a:endParaRPr lang="en-US" dirty="0"/>
+          </a:p>
+        </p:txBody>
+      </p:sp>
+      <p:sp>
+        <p:nvSpPr>
+          <p:cNvPr id="3" name="TextBox 2">
+            <a:extLst>
+              <a:ext uri="{FF2B5EF4-FFF2-40B4-BE49-F238E27FC236}">
+                <a16:creationId xmlns:a16="http://schemas.microsoft.com/office/drawing/2014/main" id="{9D5961E6-AF38-4100-8B63-BD9839E777E6}"/>
+              </a:ext>
+            </a:extLst>
+          </p:cNvPr>
+          <p:cNvSpPr txBox="1"/>
+          <p:nvPr/>
+        </p:nvSpPr>
+        <p:spPr>
+          <a:xfrm>
+            <a:off x="568760" y="3226300"/>
+            <a:ext cx="9836982" cy="769441"/>
+          </a:xfrm>
+          <a:prstGeom prst="rect">
+            <a:avLst/>
+          </a:prstGeom>
+          <a:noFill/>
+        </p:spPr>
+        <p:txBody>
+          <a:bodyPr wrap="square" rtlCol="0">
+            <a:spAutoFit/>
+          </a:bodyPr>
+          <a:lstStyle/>
+          <a:p>
+            <a:pPr algn="ctr"/>
+            <a:r>
+              <a:rPr lang="ru-RU" sz="4400" dirty="0">
+                <a:solidFill>
+                  <a:srgbClr val="FFFF00"/>
+                </a:solidFill>
+              </a:rPr>
+              <a:t>Демонстрация</a:t>
+            </a:r>
+            <a:endParaRPr lang="en-US" sz="4400" dirty="0">
+              <a:solidFill>
+                <a:srgbClr val="FFFF00"/>
+              </a:solidFill>
+            </a:endParaRPr>
+          </a:p>
+        </p:txBody>
+      </p:sp>
+    </p:spTree>
+    <p:extLst>
+      <p:ext uri="{BB962C8B-B14F-4D97-AF65-F5344CB8AC3E}">
+        <p14:creationId xmlns:p14="http://schemas.microsoft.com/office/powerpoint/2010/main" val="3230918097"/>
       </p:ext>
     </p:extLst>
   </p:cSld>

</xml_diff>

<commit_message>
The fourth video completed
</commit_message>
<xml_diff>
--- a/Powerpoint/4.SOLID_I.pptx
+++ b/Powerpoint/4.SOLID_I.pptx
@@ -5,10 +5,10 @@
     <p:sldMasterId id="2147483762" r:id="rId1"/>
   </p:sldMasterIdLst>
   <p:notesMasterIdLst>
-    <p:notesMasterId r:id="rId9"/>
+    <p:notesMasterId r:id="rId15"/>
   </p:notesMasterIdLst>
   <p:handoutMasterIdLst>
-    <p:handoutMasterId r:id="rId10"/>
+    <p:handoutMasterId r:id="rId16"/>
   </p:handoutMasterIdLst>
   <p:sldIdLst>
     <p:sldId id="269" r:id="rId2"/>
@@ -16,8 +16,14 @@
     <p:sldId id="270" r:id="rId4"/>
     <p:sldId id="271" r:id="rId5"/>
     <p:sldId id="272" r:id="rId6"/>
-    <p:sldId id="273" r:id="rId7"/>
-    <p:sldId id="274" r:id="rId8"/>
+    <p:sldId id="274" r:id="rId7"/>
+    <p:sldId id="273" r:id="rId8"/>
+    <p:sldId id="275" r:id="rId9"/>
+    <p:sldId id="276" r:id="rId10"/>
+    <p:sldId id="277" r:id="rId11"/>
+    <p:sldId id="278" r:id="rId12"/>
+    <p:sldId id="279" r:id="rId13"/>
+    <p:sldId id="280" r:id="rId14"/>
   </p:sldIdLst>
   <p:sldSz cx="12192000" cy="6858000"/>
   <p:notesSz cx="6858000" cy="9144000"/>
@@ -232,7 +238,7 @@
           <a:p>
             <a:fld id="{CDDF240B-3CA8-4045-B7C9-8B67F6FA2B5E}" type="datetimeFigureOut">
               <a:rPr lang="en-US" smtClean="0"/>
-              <a:t>2019-03-12</a:t>
+              <a:t>2019-03-13</a:t>
             </a:fld>
             <a:endParaRPr lang="en-US"/>
           </a:p>
@@ -397,7 +403,7 @@
           <a:p>
             <a:fld id="{8DB41A92-FFF7-46B1-92E3-CDB13879911B}" type="datetimeFigureOut">
               <a:rPr lang="en-US" smtClean="0"/>
-              <a:t>2019-03-12</a:t>
+              <a:t>2019-03-13</a:t>
             </a:fld>
             <a:endParaRPr lang="en-US"/>
           </a:p>
@@ -1698,7 +1704,7 @@
           <a:p>
             <a:fld id="{679D33B1-6C88-4DB6-8F59-77EBF0001DE5}" type="datetimeFigureOut">
               <a:rPr lang="en-US" smtClean="0"/>
-              <a:t>2019-03-12</a:t>
+              <a:t>2019-03-13</a:t>
             </a:fld>
             <a:endParaRPr lang="en-US"/>
           </a:p>
@@ -2608,7 +2614,7 @@
           <a:p>
             <a:fld id="{679D33B1-6C88-4DB6-8F59-77EBF0001DE5}" type="datetimeFigureOut">
               <a:rPr lang="en-US" smtClean="0"/>
-              <a:t>2019-03-12</a:t>
+              <a:t>2019-03-13</a:t>
             </a:fld>
             <a:endParaRPr lang="en-US"/>
           </a:p>
@@ -2914,7 +2920,7 @@
           <a:p>
             <a:fld id="{679D33B1-6C88-4DB6-8F59-77EBF0001DE5}" type="datetimeFigureOut">
               <a:rPr lang="en-US" smtClean="0"/>
-              <a:t>2019-03-12</a:t>
+              <a:t>2019-03-13</a:t>
             </a:fld>
             <a:endParaRPr lang="en-US"/>
           </a:p>
@@ -3300,7 +3306,7 @@
           <a:p>
             <a:fld id="{679D33B1-6C88-4DB6-8F59-77EBF0001DE5}" type="datetimeFigureOut">
               <a:rPr lang="en-US" smtClean="0"/>
-              <a:t>2019-03-12</a:t>
+              <a:t>2019-03-13</a:t>
             </a:fld>
             <a:endParaRPr lang="en-US"/>
           </a:p>
@@ -3673,7 +3679,7 @@
           <a:p>
             <a:fld id="{679D33B1-6C88-4DB6-8F59-77EBF0001DE5}" type="datetimeFigureOut">
               <a:rPr lang="en-US" smtClean="0"/>
-              <a:t>2019-03-12</a:t>
+              <a:t>2019-03-13</a:t>
             </a:fld>
             <a:endParaRPr lang="en-US"/>
           </a:p>
@@ -4176,7 +4182,7 @@
           <a:p>
             <a:fld id="{679D33B1-6C88-4DB6-8F59-77EBF0001DE5}" type="datetimeFigureOut">
               <a:rPr lang="en-US" smtClean="0"/>
-              <a:t>2019-03-12</a:t>
+              <a:t>2019-03-13</a:t>
             </a:fld>
             <a:endParaRPr lang="en-US"/>
           </a:p>
@@ -4430,7 +4436,7 @@
           <a:p>
             <a:fld id="{679D33B1-6C88-4DB6-8F59-77EBF0001DE5}" type="datetimeFigureOut">
               <a:rPr lang="en-US" smtClean="0"/>
-              <a:t>2019-03-12</a:t>
+              <a:t>2019-03-13</a:t>
             </a:fld>
             <a:endParaRPr lang="en-US"/>
           </a:p>
@@ -4593,7 +4599,7 @@
           <a:p>
             <a:fld id="{679D33B1-6C88-4DB6-8F59-77EBF0001DE5}" type="datetimeFigureOut">
               <a:rPr lang="en-US" smtClean="0"/>
-              <a:t>2019-03-12</a:t>
+              <a:t>2019-03-13</a:t>
             </a:fld>
             <a:endParaRPr lang="en-US"/>
           </a:p>
@@ -4980,7 +4986,7 @@
           <a:p>
             <a:fld id="{679D33B1-6C88-4DB6-8F59-77EBF0001DE5}" type="datetimeFigureOut">
               <a:rPr lang="en-US" smtClean="0"/>
-              <a:t>2019-03-12</a:t>
+              <a:t>2019-03-13</a:t>
             </a:fld>
             <a:endParaRPr lang="en-US"/>
           </a:p>
@@ -5386,7 +5392,7 @@
           <a:p>
             <a:fld id="{679D33B1-6C88-4DB6-8F59-77EBF0001DE5}" type="datetimeFigureOut">
               <a:rPr lang="en-US" smtClean="0"/>
-              <a:t>2019-03-12</a:t>
+              <a:t>2019-03-13</a:t>
             </a:fld>
             <a:endParaRPr lang="en-US"/>
           </a:p>
@@ -5599,7 +5605,7 @@
           <a:p>
             <a:fld id="{679D33B1-6C88-4DB6-8F59-77EBF0001DE5}" type="datetimeFigureOut">
               <a:rPr lang="en-US" smtClean="0"/>
-              <a:t>2019-03-12</a:t>
+              <a:t>2019-03-13</a:t>
             </a:fld>
             <a:endParaRPr lang="en-US"/>
           </a:p>
@@ -6391,6 +6397,1984 @@
       <p:bldP spid="3" grpId="0" build="p"/>
     </p:bldLst>
   </p:timing>
+</p:sld>
+</file>
+
+<file path=ppt/slides/slide10.xml><?xml version="1.0" encoding="utf-8"?>
+<p:sld xmlns:a="http://schemas.openxmlformats.org/drawingml/2006/main" xmlns:r="http://schemas.openxmlformats.org/officeDocument/2006/relationships" xmlns:p="http://schemas.openxmlformats.org/presentationml/2006/main">
+  <p:cSld>
+    <p:spTree>
+      <p:nvGrpSpPr>
+        <p:cNvPr id="1" name=""/>
+        <p:cNvGrpSpPr/>
+        <p:nvPr/>
+      </p:nvGrpSpPr>
+      <p:grpSpPr>
+        <a:xfrm>
+          <a:off x="0" y="0"/>
+          <a:ext cx="0" cy="0"/>
+          <a:chOff x="0" y="0"/>
+          <a:chExt cx="0" cy="0"/>
+        </a:xfrm>
+      </p:grpSpPr>
+      <p:sp>
+        <p:nvSpPr>
+          <p:cNvPr id="4" name="Заголовок 3">
+            <a:extLst>
+              <a:ext uri="{FF2B5EF4-FFF2-40B4-BE49-F238E27FC236}">
+                <a16:creationId xmlns:a16="http://schemas.microsoft.com/office/drawing/2014/main" id="{56B210DD-3C70-4225-BAC0-26F0709D6072}"/>
+              </a:ext>
+            </a:extLst>
+          </p:cNvPr>
+          <p:cNvSpPr>
+            <a:spLocks noGrp="1"/>
+          </p:cNvSpPr>
+          <p:nvPr>
+            <p:ph type="title"/>
+          </p:nvPr>
+        </p:nvSpPr>
+        <p:spPr/>
+        <p:txBody>
+          <a:bodyPr>
+            <a:normAutofit/>
+          </a:bodyPr>
+          <a:lstStyle/>
+          <a:p>
+            <a:r>
+              <a:rPr lang="ru-RU" b="1" dirty="0"/>
+              <a:t>Принцип разделения интерфейса</a:t>
+            </a:r>
+            <a:br>
+              <a:rPr lang="en-US" b="1" dirty="0"/>
+            </a:br>
+            <a:r>
+              <a:rPr lang="en-US" sz="3200" i="1" dirty="0"/>
+              <a:t>The Interface Segregation Principle</a:t>
+            </a:r>
+            <a:endParaRPr lang="en-US" dirty="0"/>
+          </a:p>
+        </p:txBody>
+      </p:sp>
+      <p:sp>
+        <p:nvSpPr>
+          <p:cNvPr id="5" name="TextBox 4">
+            <a:extLst>
+              <a:ext uri="{FF2B5EF4-FFF2-40B4-BE49-F238E27FC236}">
+                <a16:creationId xmlns:a16="http://schemas.microsoft.com/office/drawing/2014/main" id="{D489B25B-9262-482B-B152-3465DADD2017}"/>
+              </a:ext>
+            </a:extLst>
+          </p:cNvPr>
+          <p:cNvSpPr txBox="1"/>
+          <p:nvPr/>
+        </p:nvSpPr>
+        <p:spPr>
+          <a:xfrm>
+            <a:off x="576263" y="2233613"/>
+            <a:ext cx="9836982" cy="1569660"/>
+          </a:xfrm>
+          <a:prstGeom prst="rect">
+            <a:avLst/>
+          </a:prstGeom>
+          <a:noFill/>
+        </p:spPr>
+        <p:txBody>
+          <a:bodyPr wrap="square" rtlCol="0">
+            <a:spAutoFit/>
+          </a:bodyPr>
+          <a:lstStyle/>
+          <a:p>
+            <a:r>
+              <a:rPr lang="ru-RU" sz="2800" dirty="0">
+                <a:solidFill>
+                  <a:srgbClr val="FFFF00"/>
+                </a:solidFill>
+              </a:rPr>
+              <a:t>Вопрос «на засыпку»</a:t>
+            </a:r>
+          </a:p>
+          <a:p>
+            <a:endParaRPr lang="ru-RU" sz="2800" dirty="0">
+              <a:solidFill>
+                <a:srgbClr val="FFFF00"/>
+              </a:solidFill>
+            </a:endParaRPr>
+          </a:p>
+          <a:p>
+            <a:r>
+              <a:rPr lang="ru-RU" sz="2000" dirty="0"/>
+              <a:t>Если бы вас спросили, а может ли </a:t>
+            </a:r>
+            <a:r>
+              <a:rPr lang="en-US" sz="2000" dirty="0"/>
+              <a:t>interface </a:t>
+            </a:r>
+            <a:r>
+              <a:rPr lang="ru-RU" sz="2000" dirty="0"/>
+              <a:t>иметь реализацию, то что бы вы ответили?</a:t>
+            </a:r>
+            <a:endParaRPr lang="en-US" sz="2000" dirty="0"/>
+          </a:p>
+        </p:txBody>
+      </p:sp>
+      <p:pic>
+        <p:nvPicPr>
+          <p:cNvPr id="28" name="Рисунок 27" descr="Галочка">
+            <a:extLst>
+              <a:ext uri="{FF2B5EF4-FFF2-40B4-BE49-F238E27FC236}">
+                <a16:creationId xmlns:a16="http://schemas.microsoft.com/office/drawing/2014/main" id="{3A46C072-766D-48E8-8F14-A61196DA3AB3}"/>
+              </a:ext>
+            </a:extLst>
+          </p:cNvPr>
+          <p:cNvPicPr>
+            <a:picLocks noChangeAspect="1"/>
+          </p:cNvPicPr>
+          <p:nvPr/>
+        </p:nvPicPr>
+        <p:blipFill>
+          <a:blip r:embed="rId2">
+            <a:extLst>
+              <a:ext uri="{28A0092B-C50C-407E-A947-70E740481C1C}">
+                <a14:useLocalDpi xmlns:a14="http://schemas.microsoft.com/office/drawing/2010/main" val="0"/>
+              </a:ext>
+              <a:ext uri="{96DAC541-7B7A-43D3-8B79-37D633B846F1}">
+                <asvg:svgBlip xmlns:asvg="http://schemas.microsoft.com/office/drawing/2016/SVG/main" r:embed="rId3"/>
+              </a:ext>
+            </a:extLst>
+          </a:blip>
+          <a:stretch>
+            <a:fillRect/>
+          </a:stretch>
+        </p:blipFill>
+        <p:spPr>
+          <a:xfrm>
+            <a:off x="3117272" y="3852569"/>
+            <a:ext cx="1554480" cy="1554480"/>
+          </a:xfrm>
+          <a:prstGeom prst="rect">
+            <a:avLst/>
+          </a:prstGeom>
+        </p:spPr>
+      </p:pic>
+      <p:pic>
+        <p:nvPicPr>
+          <p:cNvPr id="30" name="Рисунок 29" descr="Закрыть">
+            <a:extLst>
+              <a:ext uri="{FF2B5EF4-FFF2-40B4-BE49-F238E27FC236}">
+                <a16:creationId xmlns:a16="http://schemas.microsoft.com/office/drawing/2014/main" id="{1D683354-5B0E-4FB3-897E-FF2901BCF9AF}"/>
+              </a:ext>
+            </a:extLst>
+          </p:cNvPr>
+          <p:cNvPicPr>
+            <a:picLocks noChangeAspect="1"/>
+          </p:cNvPicPr>
+          <p:nvPr/>
+        </p:nvPicPr>
+        <p:blipFill>
+          <a:blip r:embed="rId4">
+            <a:extLst>
+              <a:ext uri="{28A0092B-C50C-407E-A947-70E740481C1C}">
+                <a14:useLocalDpi xmlns:a14="http://schemas.microsoft.com/office/drawing/2010/main" val="0"/>
+              </a:ext>
+              <a:ext uri="{96DAC541-7B7A-43D3-8B79-37D633B846F1}">
+                <asvg:svgBlip xmlns:asvg="http://schemas.microsoft.com/office/drawing/2016/SVG/main" r:embed="rId5"/>
+              </a:ext>
+            </a:extLst>
+          </a:blip>
+          <a:stretch>
+            <a:fillRect/>
+          </a:stretch>
+        </p:blipFill>
+        <p:spPr>
+          <a:xfrm>
+            <a:off x="6232144" y="3867749"/>
+            <a:ext cx="1554480" cy="1554480"/>
+          </a:xfrm>
+          <a:prstGeom prst="rect">
+            <a:avLst/>
+          </a:prstGeom>
+        </p:spPr>
+      </p:pic>
+    </p:spTree>
+    <p:extLst>
+      <p:ext uri="{BB962C8B-B14F-4D97-AF65-F5344CB8AC3E}">
+        <p14:creationId xmlns:p14="http://schemas.microsoft.com/office/powerpoint/2010/main" val="4232423236"/>
+      </p:ext>
+    </p:extLst>
+  </p:cSld>
+  <p:clrMapOvr>
+    <a:masterClrMapping/>
+  </p:clrMapOvr>
+  <p:transition spd="slow">
+    <p:cover/>
+  </p:transition>
+  <p:timing>
+    <p:tnLst>
+      <p:par>
+        <p:cTn id="1" dur="indefinite" restart="never" nodeType="tmRoot">
+          <p:childTnLst>
+            <p:seq concurrent="1" nextAc="seek">
+              <p:cTn id="2" dur="indefinite" nodeType="mainSeq">
+                <p:childTnLst>
+                  <p:par>
+                    <p:cTn id="3" fill="hold">
+                      <p:stCondLst>
+                        <p:cond delay="indefinite"/>
+                      </p:stCondLst>
+                      <p:childTnLst>
+                        <p:par>
+                          <p:cTn id="4" fill="hold">
+                            <p:stCondLst>
+                              <p:cond delay="0"/>
+                            </p:stCondLst>
+                            <p:childTnLst>
+                              <p:par>
+                                <p:cTn id="5" presetID="53" presetClass="entr" presetSubtype="16" fill="hold" nodeType="clickEffect">
+                                  <p:stCondLst>
+                                    <p:cond delay="0"/>
+                                  </p:stCondLst>
+                                  <p:childTnLst>
+                                    <p:set>
+                                      <p:cBhvr>
+                                        <p:cTn id="6" dur="1" fill="hold">
+                                          <p:stCondLst>
+                                            <p:cond delay="0"/>
+                                          </p:stCondLst>
+                                        </p:cTn>
+                                        <p:tgtEl>
+                                          <p:spTgt spid="28"/>
+                                        </p:tgtEl>
+                                        <p:attrNameLst>
+                                          <p:attrName>style.visibility</p:attrName>
+                                        </p:attrNameLst>
+                                      </p:cBhvr>
+                                      <p:to>
+                                        <p:strVal val="visible"/>
+                                      </p:to>
+                                    </p:set>
+                                    <p:anim calcmode="lin" valueType="num">
+                                      <p:cBhvr>
+                                        <p:cTn id="7" dur="500" fill="hold"/>
+                                        <p:tgtEl>
+                                          <p:spTgt spid="28"/>
+                                        </p:tgtEl>
+                                        <p:attrNameLst>
+                                          <p:attrName>ppt_w</p:attrName>
+                                        </p:attrNameLst>
+                                      </p:cBhvr>
+                                      <p:tavLst>
+                                        <p:tav tm="0">
+                                          <p:val>
+                                            <p:fltVal val="0"/>
+                                          </p:val>
+                                        </p:tav>
+                                        <p:tav tm="100000">
+                                          <p:val>
+                                            <p:strVal val="#ppt_w"/>
+                                          </p:val>
+                                        </p:tav>
+                                      </p:tavLst>
+                                    </p:anim>
+                                    <p:anim calcmode="lin" valueType="num">
+                                      <p:cBhvr>
+                                        <p:cTn id="8" dur="500" fill="hold"/>
+                                        <p:tgtEl>
+                                          <p:spTgt spid="28"/>
+                                        </p:tgtEl>
+                                        <p:attrNameLst>
+                                          <p:attrName>ppt_h</p:attrName>
+                                        </p:attrNameLst>
+                                      </p:cBhvr>
+                                      <p:tavLst>
+                                        <p:tav tm="0">
+                                          <p:val>
+                                            <p:fltVal val="0"/>
+                                          </p:val>
+                                        </p:tav>
+                                        <p:tav tm="100000">
+                                          <p:val>
+                                            <p:strVal val="#ppt_h"/>
+                                          </p:val>
+                                        </p:tav>
+                                      </p:tavLst>
+                                    </p:anim>
+                                    <p:animEffect transition="in" filter="fade">
+                                      <p:cBhvr>
+                                        <p:cTn id="9" dur="500"/>
+                                        <p:tgtEl>
+                                          <p:spTgt spid="28"/>
+                                        </p:tgtEl>
+                                      </p:cBhvr>
+                                    </p:animEffect>
+                                  </p:childTnLst>
+                                </p:cTn>
+                              </p:par>
+                            </p:childTnLst>
+                          </p:cTn>
+                        </p:par>
+                      </p:childTnLst>
+                    </p:cTn>
+                  </p:par>
+                  <p:par>
+                    <p:cTn id="10" fill="hold">
+                      <p:stCondLst>
+                        <p:cond delay="indefinite"/>
+                      </p:stCondLst>
+                      <p:childTnLst>
+                        <p:par>
+                          <p:cTn id="11" fill="hold">
+                            <p:stCondLst>
+                              <p:cond delay="0"/>
+                            </p:stCondLst>
+                            <p:childTnLst>
+                              <p:par>
+                                <p:cTn id="12" presetID="53" presetClass="entr" presetSubtype="16" fill="hold" nodeType="clickEffect">
+                                  <p:stCondLst>
+                                    <p:cond delay="0"/>
+                                  </p:stCondLst>
+                                  <p:childTnLst>
+                                    <p:set>
+                                      <p:cBhvr>
+                                        <p:cTn id="13" dur="1" fill="hold">
+                                          <p:stCondLst>
+                                            <p:cond delay="0"/>
+                                          </p:stCondLst>
+                                        </p:cTn>
+                                        <p:tgtEl>
+                                          <p:spTgt spid="30"/>
+                                        </p:tgtEl>
+                                        <p:attrNameLst>
+                                          <p:attrName>style.visibility</p:attrName>
+                                        </p:attrNameLst>
+                                      </p:cBhvr>
+                                      <p:to>
+                                        <p:strVal val="visible"/>
+                                      </p:to>
+                                    </p:set>
+                                    <p:anim calcmode="lin" valueType="num">
+                                      <p:cBhvr>
+                                        <p:cTn id="14" dur="500" fill="hold"/>
+                                        <p:tgtEl>
+                                          <p:spTgt spid="30"/>
+                                        </p:tgtEl>
+                                        <p:attrNameLst>
+                                          <p:attrName>ppt_w</p:attrName>
+                                        </p:attrNameLst>
+                                      </p:cBhvr>
+                                      <p:tavLst>
+                                        <p:tav tm="0">
+                                          <p:val>
+                                            <p:fltVal val="0"/>
+                                          </p:val>
+                                        </p:tav>
+                                        <p:tav tm="100000">
+                                          <p:val>
+                                            <p:strVal val="#ppt_w"/>
+                                          </p:val>
+                                        </p:tav>
+                                      </p:tavLst>
+                                    </p:anim>
+                                    <p:anim calcmode="lin" valueType="num">
+                                      <p:cBhvr>
+                                        <p:cTn id="15" dur="500" fill="hold"/>
+                                        <p:tgtEl>
+                                          <p:spTgt spid="30"/>
+                                        </p:tgtEl>
+                                        <p:attrNameLst>
+                                          <p:attrName>ppt_h</p:attrName>
+                                        </p:attrNameLst>
+                                      </p:cBhvr>
+                                      <p:tavLst>
+                                        <p:tav tm="0">
+                                          <p:val>
+                                            <p:fltVal val="0"/>
+                                          </p:val>
+                                        </p:tav>
+                                        <p:tav tm="100000">
+                                          <p:val>
+                                            <p:strVal val="#ppt_h"/>
+                                          </p:val>
+                                        </p:tav>
+                                      </p:tavLst>
+                                    </p:anim>
+                                    <p:animEffect transition="in" filter="fade">
+                                      <p:cBhvr>
+                                        <p:cTn id="16" dur="500"/>
+                                        <p:tgtEl>
+                                          <p:spTgt spid="30"/>
+                                        </p:tgtEl>
+                                      </p:cBhvr>
+                                    </p:animEffect>
+                                  </p:childTnLst>
+                                </p:cTn>
+                              </p:par>
+                            </p:childTnLst>
+                          </p:cTn>
+                        </p:par>
+                      </p:childTnLst>
+                    </p:cTn>
+                  </p:par>
+                  <p:par>
+                    <p:cTn id="17" fill="hold">
+                      <p:stCondLst>
+                        <p:cond delay="indefinite"/>
+                      </p:stCondLst>
+                      <p:childTnLst>
+                        <p:par>
+                          <p:cTn id="18" fill="hold">
+                            <p:stCondLst>
+                              <p:cond delay="0"/>
+                            </p:stCondLst>
+                            <p:childTnLst>
+                              <p:par>
+                                <p:cTn id="19" presetID="27" presetClass="emph" presetSubtype="0" fill="remove" nodeType="clickEffect">
+                                  <p:stCondLst>
+                                    <p:cond delay="0"/>
+                                  </p:stCondLst>
+                                  <p:childTnLst>
+                                    <p:animClr clrSpc="rgb" dir="cw">
+                                      <p:cBhvr override="childStyle">
+                                        <p:cTn id="20" dur="250" autoRev="1" fill="remove"/>
+                                        <p:tgtEl>
+                                          <p:spTgt spid="28"/>
+                                        </p:tgtEl>
+                                        <p:attrNameLst>
+                                          <p:attrName>style.color</p:attrName>
+                                        </p:attrNameLst>
+                                      </p:cBhvr>
+                                      <p:to>
+                                        <a:schemeClr val="bg1"/>
+                                      </p:to>
+                                    </p:animClr>
+                                    <p:animClr clrSpc="rgb" dir="cw">
+                                      <p:cBhvr>
+                                        <p:cTn id="21" dur="250" autoRev="1" fill="remove"/>
+                                        <p:tgtEl>
+                                          <p:spTgt spid="28"/>
+                                        </p:tgtEl>
+                                        <p:attrNameLst>
+                                          <p:attrName>fillcolor</p:attrName>
+                                        </p:attrNameLst>
+                                      </p:cBhvr>
+                                      <p:to>
+                                        <a:schemeClr val="bg1"/>
+                                      </p:to>
+                                    </p:animClr>
+                                    <p:set>
+                                      <p:cBhvr>
+                                        <p:cTn id="22" dur="250" autoRev="1" fill="remove"/>
+                                        <p:tgtEl>
+                                          <p:spTgt spid="28"/>
+                                        </p:tgtEl>
+                                        <p:attrNameLst>
+                                          <p:attrName>fill.type</p:attrName>
+                                        </p:attrNameLst>
+                                      </p:cBhvr>
+                                      <p:to>
+                                        <p:strVal val="solid"/>
+                                      </p:to>
+                                    </p:set>
+                                    <p:set>
+                                      <p:cBhvr>
+                                        <p:cTn id="23" dur="250" autoRev="1" fill="remove"/>
+                                        <p:tgtEl>
+                                          <p:spTgt spid="28"/>
+                                        </p:tgtEl>
+                                        <p:attrNameLst>
+                                          <p:attrName>fill.on</p:attrName>
+                                        </p:attrNameLst>
+                                      </p:cBhvr>
+                                      <p:to>
+                                        <p:strVal val="true"/>
+                                      </p:to>
+                                    </p:set>
+                                  </p:childTnLst>
+                                </p:cTn>
+                              </p:par>
+                            </p:childTnLst>
+                          </p:cTn>
+                        </p:par>
+                        <p:par>
+                          <p:cTn id="24" fill="hold">
+                            <p:stCondLst>
+                              <p:cond delay="500"/>
+                            </p:stCondLst>
+                            <p:childTnLst>
+                              <p:par>
+                                <p:cTn id="25" presetID="9" presetClass="emph" presetSubtype="0" nodeType="afterEffect">
+                                  <p:stCondLst>
+                                    <p:cond delay="0"/>
+                                  </p:stCondLst>
+                                  <p:childTnLst>
+                                    <p:set>
+                                      <p:cBhvr>
+                                        <p:cTn id="26" dur="indefinite"/>
+                                        <p:tgtEl>
+                                          <p:spTgt spid="30"/>
+                                        </p:tgtEl>
+                                        <p:attrNameLst>
+                                          <p:attrName>style.opacity</p:attrName>
+                                        </p:attrNameLst>
+                                      </p:cBhvr>
+                                      <p:to>
+                                        <p:strVal val="0"/>
+                                      </p:to>
+                                    </p:set>
+                                    <p:animEffect filter="image" prLst="opacity: 0">
+                                      <p:cBhvr rctx="IE">
+                                        <p:cTn id="27" dur="indefinite"/>
+                                        <p:tgtEl>
+                                          <p:spTgt spid="30"/>
+                                        </p:tgtEl>
+                                      </p:cBhvr>
+                                    </p:animEffect>
+                                  </p:childTnLst>
+                                  <p:subTnLst>
+                                    <p:set>
+                                      <p:cBhvr override="childStyle">
+                                        <p:cTn dur="1" fill="hold" display="0" masterRel="sameClick" afterEffect="1">
+                                          <p:stCondLst>
+                                            <p:cond evt="end" delay="0">
+                                              <p:tn val="25"/>
+                                            </p:cond>
+                                          </p:stCondLst>
+                                        </p:cTn>
+                                        <p:tgtEl>
+                                          <p:spTgt spid="30"/>
+                                        </p:tgtEl>
+                                        <p:attrNameLst>
+                                          <p:attrName>style.visibility</p:attrName>
+                                        </p:attrNameLst>
+                                      </p:cBhvr>
+                                      <p:to>
+                                        <p:strVal val="hidden"/>
+                                      </p:to>
+                                    </p:set>
+                                  </p:subTnLst>
+                                </p:cTn>
+                              </p:par>
+                            </p:childTnLst>
+                          </p:cTn>
+                        </p:par>
+                      </p:childTnLst>
+                    </p:cTn>
+                  </p:par>
+                </p:childTnLst>
+              </p:cTn>
+              <p:prevCondLst>
+                <p:cond evt="onPrev" delay="0">
+                  <p:tgtEl>
+                    <p:sldTgt/>
+                  </p:tgtEl>
+                </p:cond>
+              </p:prevCondLst>
+              <p:nextCondLst>
+                <p:cond evt="onNext" delay="0">
+                  <p:tgtEl>
+                    <p:sldTgt/>
+                  </p:tgtEl>
+                </p:cond>
+              </p:nextCondLst>
+            </p:seq>
+          </p:childTnLst>
+        </p:cTn>
+      </p:par>
+    </p:tnLst>
+  </p:timing>
+</p:sld>
+</file>
+
+<file path=ppt/slides/slide11.xml><?xml version="1.0" encoding="utf-8"?>
+<p:sld xmlns:a="http://schemas.openxmlformats.org/drawingml/2006/main" xmlns:r="http://schemas.openxmlformats.org/officeDocument/2006/relationships" xmlns:p="http://schemas.openxmlformats.org/presentationml/2006/main">
+  <p:cSld>
+    <p:spTree>
+      <p:nvGrpSpPr>
+        <p:cNvPr id="1" name=""/>
+        <p:cNvGrpSpPr/>
+        <p:nvPr/>
+      </p:nvGrpSpPr>
+      <p:grpSpPr>
+        <a:xfrm>
+          <a:off x="0" y="0"/>
+          <a:ext cx="0" cy="0"/>
+          <a:chOff x="0" y="0"/>
+          <a:chExt cx="0" cy="0"/>
+        </a:xfrm>
+      </p:grpSpPr>
+      <p:sp>
+        <p:nvSpPr>
+          <p:cNvPr id="4" name="Заголовок 3">
+            <a:extLst>
+              <a:ext uri="{FF2B5EF4-FFF2-40B4-BE49-F238E27FC236}">
+                <a16:creationId xmlns:a16="http://schemas.microsoft.com/office/drawing/2014/main" id="{56B210DD-3C70-4225-BAC0-26F0709D6072}"/>
+              </a:ext>
+            </a:extLst>
+          </p:cNvPr>
+          <p:cNvSpPr>
+            <a:spLocks noGrp="1"/>
+          </p:cNvSpPr>
+          <p:nvPr>
+            <p:ph type="title"/>
+          </p:nvPr>
+        </p:nvSpPr>
+        <p:spPr/>
+        <p:txBody>
+          <a:bodyPr>
+            <a:normAutofit/>
+          </a:bodyPr>
+          <a:lstStyle/>
+          <a:p>
+            <a:r>
+              <a:rPr lang="ru-RU" b="1" dirty="0"/>
+              <a:t>Принцип разделения интерфейса</a:t>
+            </a:r>
+            <a:br>
+              <a:rPr lang="en-US" b="1" dirty="0"/>
+            </a:br>
+            <a:r>
+              <a:rPr lang="en-US" sz="3200" i="1" dirty="0"/>
+              <a:t>The Interface Segregation Principle</a:t>
+            </a:r>
+            <a:endParaRPr lang="en-US" dirty="0"/>
+          </a:p>
+        </p:txBody>
+      </p:sp>
+      <p:sp>
+        <p:nvSpPr>
+          <p:cNvPr id="5" name="TextBox 4">
+            <a:extLst>
+              <a:ext uri="{FF2B5EF4-FFF2-40B4-BE49-F238E27FC236}">
+                <a16:creationId xmlns:a16="http://schemas.microsoft.com/office/drawing/2014/main" id="{D489B25B-9262-482B-B152-3465DADD2017}"/>
+              </a:ext>
+            </a:extLst>
+          </p:cNvPr>
+          <p:cNvSpPr txBox="1"/>
+          <p:nvPr/>
+        </p:nvSpPr>
+        <p:spPr>
+          <a:xfrm>
+            <a:off x="576263" y="2233613"/>
+            <a:ext cx="9836982" cy="523220"/>
+          </a:xfrm>
+          <a:prstGeom prst="rect">
+            <a:avLst/>
+          </a:prstGeom>
+          <a:noFill/>
+        </p:spPr>
+        <p:txBody>
+          <a:bodyPr wrap="square" rtlCol="0">
+            <a:spAutoFit/>
+          </a:bodyPr>
+          <a:lstStyle/>
+          <a:p>
+            <a:r>
+              <a:rPr lang="ru-RU" sz="2800" dirty="0">
+                <a:solidFill>
+                  <a:srgbClr val="FFFF00"/>
+                </a:solidFill>
+              </a:rPr>
+              <a:t>Ответ на вопрос </a:t>
+            </a:r>
+          </a:p>
+        </p:txBody>
+      </p:sp>
+      <p:pic>
+        <p:nvPicPr>
+          <p:cNvPr id="3" name="Рисунок 2">
+            <a:extLst>
+              <a:ext uri="{FF2B5EF4-FFF2-40B4-BE49-F238E27FC236}">
+                <a16:creationId xmlns:a16="http://schemas.microsoft.com/office/drawing/2014/main" id="{06B2B31F-2881-40AD-8AE4-42BDDC4287B4}"/>
+              </a:ext>
+            </a:extLst>
+          </p:cNvPr>
+          <p:cNvPicPr>
+            <a:picLocks noChangeAspect="1"/>
+          </p:cNvPicPr>
+          <p:nvPr/>
+        </p:nvPicPr>
+        <p:blipFill>
+          <a:blip r:embed="rId2"/>
+          <a:stretch>
+            <a:fillRect/>
+          </a:stretch>
+        </p:blipFill>
+        <p:spPr>
+          <a:xfrm>
+            <a:off x="616901" y="2756833"/>
+            <a:ext cx="4943512" cy="2388888"/>
+          </a:xfrm>
+          <a:prstGeom prst="rect">
+            <a:avLst/>
+          </a:prstGeom>
+        </p:spPr>
+      </p:pic>
+      <p:pic>
+        <p:nvPicPr>
+          <p:cNvPr id="6" name="Рисунок 5">
+            <a:extLst>
+              <a:ext uri="{FF2B5EF4-FFF2-40B4-BE49-F238E27FC236}">
+                <a16:creationId xmlns:a16="http://schemas.microsoft.com/office/drawing/2014/main" id="{37ACD0CD-DF47-4363-87E6-45739E62DB52}"/>
+              </a:ext>
+            </a:extLst>
+          </p:cNvPr>
+          <p:cNvPicPr>
+            <a:picLocks noChangeAspect="1"/>
+          </p:cNvPicPr>
+          <p:nvPr/>
+        </p:nvPicPr>
+        <p:blipFill>
+          <a:blip r:embed="rId3"/>
+          <a:stretch>
+            <a:fillRect/>
+          </a:stretch>
+        </p:blipFill>
+        <p:spPr>
+          <a:xfrm>
+            <a:off x="1292248" y="3113674"/>
+            <a:ext cx="5732186" cy="2423178"/>
+          </a:xfrm>
+          <a:prstGeom prst="rect">
+            <a:avLst/>
+          </a:prstGeom>
+        </p:spPr>
+      </p:pic>
+      <p:pic>
+        <p:nvPicPr>
+          <p:cNvPr id="7" name="Рисунок 6">
+            <a:extLst>
+              <a:ext uri="{FF2B5EF4-FFF2-40B4-BE49-F238E27FC236}">
+                <a16:creationId xmlns:a16="http://schemas.microsoft.com/office/drawing/2014/main" id="{C0C05E6E-5C12-44AB-AB4E-D3B98BD4EFF6}"/>
+              </a:ext>
+            </a:extLst>
+          </p:cNvPr>
+          <p:cNvPicPr>
+            <a:picLocks noChangeAspect="1"/>
+          </p:cNvPicPr>
+          <p:nvPr/>
+        </p:nvPicPr>
+        <p:blipFill>
+          <a:blip r:embed="rId4"/>
+          <a:stretch>
+            <a:fillRect/>
+          </a:stretch>
+        </p:blipFill>
+        <p:spPr>
+          <a:xfrm>
+            <a:off x="1816026" y="3346560"/>
+            <a:ext cx="4991136" cy="2681307"/>
+          </a:xfrm>
+          <a:prstGeom prst="rect">
+            <a:avLst/>
+          </a:prstGeom>
+        </p:spPr>
+      </p:pic>
+      <p:pic>
+        <p:nvPicPr>
+          <p:cNvPr id="2" name="Рисунок 1">
+            <a:extLst>
+              <a:ext uri="{FF2B5EF4-FFF2-40B4-BE49-F238E27FC236}">
+                <a16:creationId xmlns:a16="http://schemas.microsoft.com/office/drawing/2014/main" id="{15C3F6B9-85A9-448F-B740-CAD89C377E7E}"/>
+              </a:ext>
+            </a:extLst>
+          </p:cNvPr>
+          <p:cNvPicPr>
+            <a:picLocks noChangeAspect="1"/>
+          </p:cNvPicPr>
+          <p:nvPr/>
+        </p:nvPicPr>
+        <p:blipFill>
+          <a:blip r:embed="rId5"/>
+          <a:stretch>
+            <a:fillRect/>
+          </a:stretch>
+        </p:blipFill>
+        <p:spPr>
+          <a:xfrm>
+            <a:off x="3746808" y="2184979"/>
+            <a:ext cx="6337981" cy="4280567"/>
+          </a:xfrm>
+          <a:prstGeom prst="rect">
+            <a:avLst/>
+          </a:prstGeom>
+        </p:spPr>
+      </p:pic>
+      <p:pic>
+        <p:nvPicPr>
+          <p:cNvPr id="8" name="Рисунок 7">
+            <a:extLst>
+              <a:ext uri="{FF2B5EF4-FFF2-40B4-BE49-F238E27FC236}">
+                <a16:creationId xmlns:a16="http://schemas.microsoft.com/office/drawing/2014/main" id="{0F453DD6-54F6-4FA6-9C7D-B8EC2F834B5D}"/>
+              </a:ext>
+            </a:extLst>
+          </p:cNvPr>
+          <p:cNvPicPr>
+            <a:picLocks noChangeAspect="1"/>
+          </p:cNvPicPr>
+          <p:nvPr/>
+        </p:nvPicPr>
+        <p:blipFill>
+          <a:blip r:embed="rId6"/>
+          <a:stretch>
+            <a:fillRect/>
+          </a:stretch>
+        </p:blipFill>
+        <p:spPr>
+          <a:xfrm>
+            <a:off x="2725330" y="2832034"/>
+            <a:ext cx="8452547" cy="3829078"/>
+          </a:xfrm>
+          <a:prstGeom prst="rect">
+            <a:avLst/>
+          </a:prstGeom>
+        </p:spPr>
+      </p:pic>
+    </p:spTree>
+    <p:extLst>
+      <p:ext uri="{BB962C8B-B14F-4D97-AF65-F5344CB8AC3E}">
+        <p14:creationId xmlns:p14="http://schemas.microsoft.com/office/powerpoint/2010/main" val="2720149302"/>
+      </p:ext>
+    </p:extLst>
+  </p:cSld>
+  <p:clrMapOvr>
+    <a:masterClrMapping/>
+  </p:clrMapOvr>
+  <p:transition spd="slow">
+    <p:cover/>
+  </p:transition>
+  <p:timing>
+    <p:tnLst>
+      <p:par>
+        <p:cTn id="1" dur="indefinite" restart="never" nodeType="tmRoot">
+          <p:childTnLst>
+            <p:seq concurrent="1" nextAc="seek">
+              <p:cTn id="2" dur="indefinite" nodeType="mainSeq">
+                <p:childTnLst>
+                  <p:par>
+                    <p:cTn id="3" fill="hold">
+                      <p:stCondLst>
+                        <p:cond delay="indefinite"/>
+                      </p:stCondLst>
+                      <p:childTnLst>
+                        <p:par>
+                          <p:cTn id="4" fill="hold">
+                            <p:stCondLst>
+                              <p:cond delay="0"/>
+                            </p:stCondLst>
+                            <p:childTnLst>
+                              <p:par>
+                                <p:cTn id="5" presetID="2" presetClass="entr" presetSubtype="2" fill="hold" nodeType="clickEffect">
+                                  <p:stCondLst>
+                                    <p:cond delay="0"/>
+                                  </p:stCondLst>
+                                  <p:childTnLst>
+                                    <p:set>
+                                      <p:cBhvr>
+                                        <p:cTn id="6" dur="1" fill="hold">
+                                          <p:stCondLst>
+                                            <p:cond delay="0"/>
+                                          </p:stCondLst>
+                                        </p:cTn>
+                                        <p:tgtEl>
+                                          <p:spTgt spid="3"/>
+                                        </p:tgtEl>
+                                        <p:attrNameLst>
+                                          <p:attrName>style.visibility</p:attrName>
+                                        </p:attrNameLst>
+                                      </p:cBhvr>
+                                      <p:to>
+                                        <p:strVal val="visible"/>
+                                      </p:to>
+                                    </p:set>
+                                    <p:anim calcmode="lin" valueType="num">
+                                      <p:cBhvr additive="base">
+                                        <p:cTn id="7" dur="500" fill="hold"/>
+                                        <p:tgtEl>
+                                          <p:spTgt spid="3"/>
+                                        </p:tgtEl>
+                                        <p:attrNameLst>
+                                          <p:attrName>ppt_x</p:attrName>
+                                        </p:attrNameLst>
+                                      </p:cBhvr>
+                                      <p:tavLst>
+                                        <p:tav tm="0">
+                                          <p:val>
+                                            <p:strVal val="1+#ppt_w/2"/>
+                                          </p:val>
+                                        </p:tav>
+                                        <p:tav tm="100000">
+                                          <p:val>
+                                            <p:strVal val="#ppt_x"/>
+                                          </p:val>
+                                        </p:tav>
+                                      </p:tavLst>
+                                    </p:anim>
+                                    <p:anim calcmode="lin" valueType="num">
+                                      <p:cBhvr additive="base">
+                                        <p:cTn id="8" dur="500" fill="hold"/>
+                                        <p:tgtEl>
+                                          <p:spTgt spid="3"/>
+                                        </p:tgtEl>
+                                        <p:attrNameLst>
+                                          <p:attrName>ppt_y</p:attrName>
+                                        </p:attrNameLst>
+                                      </p:cBhvr>
+                                      <p:tavLst>
+                                        <p:tav tm="0">
+                                          <p:val>
+                                            <p:strVal val="#ppt_y"/>
+                                          </p:val>
+                                        </p:tav>
+                                        <p:tav tm="100000">
+                                          <p:val>
+                                            <p:strVal val="#ppt_y"/>
+                                          </p:val>
+                                        </p:tav>
+                                      </p:tavLst>
+                                    </p:anim>
+                                  </p:childTnLst>
+                                </p:cTn>
+                              </p:par>
+                            </p:childTnLst>
+                          </p:cTn>
+                        </p:par>
+                      </p:childTnLst>
+                    </p:cTn>
+                  </p:par>
+                  <p:par>
+                    <p:cTn id="9" fill="hold">
+                      <p:stCondLst>
+                        <p:cond delay="indefinite"/>
+                      </p:stCondLst>
+                      <p:childTnLst>
+                        <p:par>
+                          <p:cTn id="10" fill="hold">
+                            <p:stCondLst>
+                              <p:cond delay="0"/>
+                            </p:stCondLst>
+                            <p:childTnLst>
+                              <p:par>
+                                <p:cTn id="11" presetID="2" presetClass="exit" presetSubtype="8" fill="hold" nodeType="clickEffect">
+                                  <p:stCondLst>
+                                    <p:cond delay="0"/>
+                                  </p:stCondLst>
+                                  <p:childTnLst>
+                                    <p:anim calcmode="lin" valueType="num">
+                                      <p:cBhvr additive="base">
+                                        <p:cTn id="12" dur="500"/>
+                                        <p:tgtEl>
+                                          <p:spTgt spid="3"/>
+                                        </p:tgtEl>
+                                        <p:attrNameLst>
+                                          <p:attrName>ppt_x</p:attrName>
+                                        </p:attrNameLst>
+                                      </p:cBhvr>
+                                      <p:tavLst>
+                                        <p:tav tm="0">
+                                          <p:val>
+                                            <p:strVal val="ppt_x"/>
+                                          </p:val>
+                                        </p:tav>
+                                        <p:tav tm="100000">
+                                          <p:val>
+                                            <p:strVal val="0-ppt_w/2"/>
+                                          </p:val>
+                                        </p:tav>
+                                      </p:tavLst>
+                                    </p:anim>
+                                    <p:anim calcmode="lin" valueType="num">
+                                      <p:cBhvr additive="base">
+                                        <p:cTn id="13" dur="500"/>
+                                        <p:tgtEl>
+                                          <p:spTgt spid="3"/>
+                                        </p:tgtEl>
+                                        <p:attrNameLst>
+                                          <p:attrName>ppt_y</p:attrName>
+                                        </p:attrNameLst>
+                                      </p:cBhvr>
+                                      <p:tavLst>
+                                        <p:tav tm="0">
+                                          <p:val>
+                                            <p:strVal val="ppt_y"/>
+                                          </p:val>
+                                        </p:tav>
+                                        <p:tav tm="100000">
+                                          <p:val>
+                                            <p:strVal val="ppt_y"/>
+                                          </p:val>
+                                        </p:tav>
+                                      </p:tavLst>
+                                    </p:anim>
+                                    <p:set>
+                                      <p:cBhvr>
+                                        <p:cTn id="14" dur="1" fill="hold">
+                                          <p:stCondLst>
+                                            <p:cond delay="499"/>
+                                          </p:stCondLst>
+                                        </p:cTn>
+                                        <p:tgtEl>
+                                          <p:spTgt spid="3"/>
+                                        </p:tgtEl>
+                                        <p:attrNameLst>
+                                          <p:attrName>style.visibility</p:attrName>
+                                        </p:attrNameLst>
+                                      </p:cBhvr>
+                                      <p:to>
+                                        <p:strVal val="hidden"/>
+                                      </p:to>
+                                    </p:set>
+                                  </p:childTnLst>
+                                </p:cTn>
+                              </p:par>
+                              <p:par>
+                                <p:cTn id="15" presetID="2" presetClass="entr" presetSubtype="2" fill="hold" nodeType="withEffect">
+                                  <p:stCondLst>
+                                    <p:cond delay="0"/>
+                                  </p:stCondLst>
+                                  <p:childTnLst>
+                                    <p:set>
+                                      <p:cBhvr>
+                                        <p:cTn id="16" dur="1" fill="hold">
+                                          <p:stCondLst>
+                                            <p:cond delay="0"/>
+                                          </p:stCondLst>
+                                        </p:cTn>
+                                        <p:tgtEl>
+                                          <p:spTgt spid="6"/>
+                                        </p:tgtEl>
+                                        <p:attrNameLst>
+                                          <p:attrName>style.visibility</p:attrName>
+                                        </p:attrNameLst>
+                                      </p:cBhvr>
+                                      <p:to>
+                                        <p:strVal val="visible"/>
+                                      </p:to>
+                                    </p:set>
+                                    <p:anim calcmode="lin" valueType="num">
+                                      <p:cBhvr additive="base">
+                                        <p:cTn id="17" dur="500" fill="hold"/>
+                                        <p:tgtEl>
+                                          <p:spTgt spid="6"/>
+                                        </p:tgtEl>
+                                        <p:attrNameLst>
+                                          <p:attrName>ppt_x</p:attrName>
+                                        </p:attrNameLst>
+                                      </p:cBhvr>
+                                      <p:tavLst>
+                                        <p:tav tm="0">
+                                          <p:val>
+                                            <p:strVal val="1+#ppt_w/2"/>
+                                          </p:val>
+                                        </p:tav>
+                                        <p:tav tm="100000">
+                                          <p:val>
+                                            <p:strVal val="#ppt_x"/>
+                                          </p:val>
+                                        </p:tav>
+                                      </p:tavLst>
+                                    </p:anim>
+                                    <p:anim calcmode="lin" valueType="num">
+                                      <p:cBhvr additive="base">
+                                        <p:cTn id="18" dur="500" fill="hold"/>
+                                        <p:tgtEl>
+                                          <p:spTgt spid="6"/>
+                                        </p:tgtEl>
+                                        <p:attrNameLst>
+                                          <p:attrName>ppt_y</p:attrName>
+                                        </p:attrNameLst>
+                                      </p:cBhvr>
+                                      <p:tavLst>
+                                        <p:tav tm="0">
+                                          <p:val>
+                                            <p:strVal val="#ppt_y"/>
+                                          </p:val>
+                                        </p:tav>
+                                        <p:tav tm="100000">
+                                          <p:val>
+                                            <p:strVal val="#ppt_y"/>
+                                          </p:val>
+                                        </p:tav>
+                                      </p:tavLst>
+                                    </p:anim>
+                                  </p:childTnLst>
+                                </p:cTn>
+                              </p:par>
+                            </p:childTnLst>
+                          </p:cTn>
+                        </p:par>
+                      </p:childTnLst>
+                    </p:cTn>
+                  </p:par>
+                  <p:par>
+                    <p:cTn id="19" fill="hold">
+                      <p:stCondLst>
+                        <p:cond delay="indefinite"/>
+                      </p:stCondLst>
+                      <p:childTnLst>
+                        <p:par>
+                          <p:cTn id="20" fill="hold">
+                            <p:stCondLst>
+                              <p:cond delay="0"/>
+                            </p:stCondLst>
+                            <p:childTnLst>
+                              <p:par>
+                                <p:cTn id="21" presetID="2" presetClass="exit" presetSubtype="8" fill="hold" nodeType="clickEffect">
+                                  <p:stCondLst>
+                                    <p:cond delay="0"/>
+                                  </p:stCondLst>
+                                  <p:childTnLst>
+                                    <p:anim calcmode="lin" valueType="num">
+                                      <p:cBhvr additive="base">
+                                        <p:cTn id="22" dur="500"/>
+                                        <p:tgtEl>
+                                          <p:spTgt spid="6"/>
+                                        </p:tgtEl>
+                                        <p:attrNameLst>
+                                          <p:attrName>ppt_x</p:attrName>
+                                        </p:attrNameLst>
+                                      </p:cBhvr>
+                                      <p:tavLst>
+                                        <p:tav tm="0">
+                                          <p:val>
+                                            <p:strVal val="ppt_x"/>
+                                          </p:val>
+                                        </p:tav>
+                                        <p:tav tm="100000">
+                                          <p:val>
+                                            <p:strVal val="0-ppt_w/2"/>
+                                          </p:val>
+                                        </p:tav>
+                                      </p:tavLst>
+                                    </p:anim>
+                                    <p:anim calcmode="lin" valueType="num">
+                                      <p:cBhvr additive="base">
+                                        <p:cTn id="23" dur="500"/>
+                                        <p:tgtEl>
+                                          <p:spTgt spid="6"/>
+                                        </p:tgtEl>
+                                        <p:attrNameLst>
+                                          <p:attrName>ppt_y</p:attrName>
+                                        </p:attrNameLst>
+                                      </p:cBhvr>
+                                      <p:tavLst>
+                                        <p:tav tm="0">
+                                          <p:val>
+                                            <p:strVal val="ppt_y"/>
+                                          </p:val>
+                                        </p:tav>
+                                        <p:tav tm="100000">
+                                          <p:val>
+                                            <p:strVal val="ppt_y"/>
+                                          </p:val>
+                                        </p:tav>
+                                      </p:tavLst>
+                                    </p:anim>
+                                    <p:set>
+                                      <p:cBhvr>
+                                        <p:cTn id="24" dur="1" fill="hold">
+                                          <p:stCondLst>
+                                            <p:cond delay="499"/>
+                                          </p:stCondLst>
+                                        </p:cTn>
+                                        <p:tgtEl>
+                                          <p:spTgt spid="6"/>
+                                        </p:tgtEl>
+                                        <p:attrNameLst>
+                                          <p:attrName>style.visibility</p:attrName>
+                                        </p:attrNameLst>
+                                      </p:cBhvr>
+                                      <p:to>
+                                        <p:strVal val="hidden"/>
+                                      </p:to>
+                                    </p:set>
+                                  </p:childTnLst>
+                                </p:cTn>
+                              </p:par>
+                              <p:par>
+                                <p:cTn id="25" presetID="2" presetClass="entr" presetSubtype="2" fill="hold" nodeType="withEffect">
+                                  <p:stCondLst>
+                                    <p:cond delay="0"/>
+                                  </p:stCondLst>
+                                  <p:childTnLst>
+                                    <p:set>
+                                      <p:cBhvr>
+                                        <p:cTn id="26" dur="1" fill="hold">
+                                          <p:stCondLst>
+                                            <p:cond delay="0"/>
+                                          </p:stCondLst>
+                                        </p:cTn>
+                                        <p:tgtEl>
+                                          <p:spTgt spid="7"/>
+                                        </p:tgtEl>
+                                        <p:attrNameLst>
+                                          <p:attrName>style.visibility</p:attrName>
+                                        </p:attrNameLst>
+                                      </p:cBhvr>
+                                      <p:to>
+                                        <p:strVal val="visible"/>
+                                      </p:to>
+                                    </p:set>
+                                    <p:anim calcmode="lin" valueType="num">
+                                      <p:cBhvr additive="base">
+                                        <p:cTn id="27" dur="500" fill="hold"/>
+                                        <p:tgtEl>
+                                          <p:spTgt spid="7"/>
+                                        </p:tgtEl>
+                                        <p:attrNameLst>
+                                          <p:attrName>ppt_x</p:attrName>
+                                        </p:attrNameLst>
+                                      </p:cBhvr>
+                                      <p:tavLst>
+                                        <p:tav tm="0">
+                                          <p:val>
+                                            <p:strVal val="1+#ppt_w/2"/>
+                                          </p:val>
+                                        </p:tav>
+                                        <p:tav tm="100000">
+                                          <p:val>
+                                            <p:strVal val="#ppt_x"/>
+                                          </p:val>
+                                        </p:tav>
+                                      </p:tavLst>
+                                    </p:anim>
+                                    <p:anim calcmode="lin" valueType="num">
+                                      <p:cBhvr additive="base">
+                                        <p:cTn id="28" dur="500" fill="hold"/>
+                                        <p:tgtEl>
+                                          <p:spTgt spid="7"/>
+                                        </p:tgtEl>
+                                        <p:attrNameLst>
+                                          <p:attrName>ppt_y</p:attrName>
+                                        </p:attrNameLst>
+                                      </p:cBhvr>
+                                      <p:tavLst>
+                                        <p:tav tm="0">
+                                          <p:val>
+                                            <p:strVal val="#ppt_y"/>
+                                          </p:val>
+                                        </p:tav>
+                                        <p:tav tm="100000">
+                                          <p:val>
+                                            <p:strVal val="#ppt_y"/>
+                                          </p:val>
+                                        </p:tav>
+                                      </p:tavLst>
+                                    </p:anim>
+                                  </p:childTnLst>
+                                </p:cTn>
+                              </p:par>
+                            </p:childTnLst>
+                          </p:cTn>
+                        </p:par>
+                      </p:childTnLst>
+                    </p:cTn>
+                  </p:par>
+                  <p:par>
+                    <p:cTn id="29" fill="hold">
+                      <p:stCondLst>
+                        <p:cond delay="indefinite"/>
+                      </p:stCondLst>
+                      <p:childTnLst>
+                        <p:par>
+                          <p:cTn id="30" fill="hold">
+                            <p:stCondLst>
+                              <p:cond delay="0"/>
+                            </p:stCondLst>
+                            <p:childTnLst>
+                              <p:par>
+                                <p:cTn id="31" presetID="2" presetClass="exit" presetSubtype="8" fill="hold" nodeType="clickEffect">
+                                  <p:stCondLst>
+                                    <p:cond delay="0"/>
+                                  </p:stCondLst>
+                                  <p:childTnLst>
+                                    <p:anim calcmode="lin" valueType="num">
+                                      <p:cBhvr additive="base">
+                                        <p:cTn id="32" dur="500"/>
+                                        <p:tgtEl>
+                                          <p:spTgt spid="7"/>
+                                        </p:tgtEl>
+                                        <p:attrNameLst>
+                                          <p:attrName>ppt_x</p:attrName>
+                                        </p:attrNameLst>
+                                      </p:cBhvr>
+                                      <p:tavLst>
+                                        <p:tav tm="0">
+                                          <p:val>
+                                            <p:strVal val="ppt_x"/>
+                                          </p:val>
+                                        </p:tav>
+                                        <p:tav tm="100000">
+                                          <p:val>
+                                            <p:strVal val="0-ppt_w/2"/>
+                                          </p:val>
+                                        </p:tav>
+                                      </p:tavLst>
+                                    </p:anim>
+                                    <p:anim calcmode="lin" valueType="num">
+                                      <p:cBhvr additive="base">
+                                        <p:cTn id="33" dur="500"/>
+                                        <p:tgtEl>
+                                          <p:spTgt spid="7"/>
+                                        </p:tgtEl>
+                                        <p:attrNameLst>
+                                          <p:attrName>ppt_y</p:attrName>
+                                        </p:attrNameLst>
+                                      </p:cBhvr>
+                                      <p:tavLst>
+                                        <p:tav tm="0">
+                                          <p:val>
+                                            <p:strVal val="ppt_y"/>
+                                          </p:val>
+                                        </p:tav>
+                                        <p:tav tm="100000">
+                                          <p:val>
+                                            <p:strVal val="ppt_y"/>
+                                          </p:val>
+                                        </p:tav>
+                                      </p:tavLst>
+                                    </p:anim>
+                                    <p:set>
+                                      <p:cBhvr>
+                                        <p:cTn id="34" dur="1" fill="hold">
+                                          <p:stCondLst>
+                                            <p:cond delay="499"/>
+                                          </p:stCondLst>
+                                        </p:cTn>
+                                        <p:tgtEl>
+                                          <p:spTgt spid="7"/>
+                                        </p:tgtEl>
+                                        <p:attrNameLst>
+                                          <p:attrName>style.visibility</p:attrName>
+                                        </p:attrNameLst>
+                                      </p:cBhvr>
+                                      <p:to>
+                                        <p:strVal val="hidden"/>
+                                      </p:to>
+                                    </p:set>
+                                  </p:childTnLst>
+                                </p:cTn>
+                              </p:par>
+                              <p:par>
+                                <p:cTn id="35" presetID="2" presetClass="entr" presetSubtype="2" fill="hold" nodeType="withEffect">
+                                  <p:stCondLst>
+                                    <p:cond delay="0"/>
+                                  </p:stCondLst>
+                                  <p:childTnLst>
+                                    <p:set>
+                                      <p:cBhvr>
+                                        <p:cTn id="36" dur="1" fill="hold">
+                                          <p:stCondLst>
+                                            <p:cond delay="0"/>
+                                          </p:stCondLst>
+                                        </p:cTn>
+                                        <p:tgtEl>
+                                          <p:spTgt spid="2"/>
+                                        </p:tgtEl>
+                                        <p:attrNameLst>
+                                          <p:attrName>style.visibility</p:attrName>
+                                        </p:attrNameLst>
+                                      </p:cBhvr>
+                                      <p:to>
+                                        <p:strVal val="visible"/>
+                                      </p:to>
+                                    </p:set>
+                                    <p:anim calcmode="lin" valueType="num">
+                                      <p:cBhvr additive="base">
+                                        <p:cTn id="37" dur="500" fill="hold"/>
+                                        <p:tgtEl>
+                                          <p:spTgt spid="2"/>
+                                        </p:tgtEl>
+                                        <p:attrNameLst>
+                                          <p:attrName>ppt_x</p:attrName>
+                                        </p:attrNameLst>
+                                      </p:cBhvr>
+                                      <p:tavLst>
+                                        <p:tav tm="0">
+                                          <p:val>
+                                            <p:strVal val="1+#ppt_w/2"/>
+                                          </p:val>
+                                        </p:tav>
+                                        <p:tav tm="100000">
+                                          <p:val>
+                                            <p:strVal val="#ppt_x"/>
+                                          </p:val>
+                                        </p:tav>
+                                      </p:tavLst>
+                                    </p:anim>
+                                    <p:anim calcmode="lin" valueType="num">
+                                      <p:cBhvr additive="base">
+                                        <p:cTn id="38" dur="500" fill="hold"/>
+                                        <p:tgtEl>
+                                          <p:spTgt spid="2"/>
+                                        </p:tgtEl>
+                                        <p:attrNameLst>
+                                          <p:attrName>ppt_y</p:attrName>
+                                        </p:attrNameLst>
+                                      </p:cBhvr>
+                                      <p:tavLst>
+                                        <p:tav tm="0">
+                                          <p:val>
+                                            <p:strVal val="#ppt_y"/>
+                                          </p:val>
+                                        </p:tav>
+                                        <p:tav tm="100000">
+                                          <p:val>
+                                            <p:strVal val="#ppt_y"/>
+                                          </p:val>
+                                        </p:tav>
+                                      </p:tavLst>
+                                    </p:anim>
+                                  </p:childTnLst>
+                                </p:cTn>
+                              </p:par>
+                            </p:childTnLst>
+                          </p:cTn>
+                        </p:par>
+                      </p:childTnLst>
+                    </p:cTn>
+                  </p:par>
+                  <p:par>
+                    <p:cTn id="39" fill="hold">
+                      <p:stCondLst>
+                        <p:cond delay="indefinite"/>
+                      </p:stCondLst>
+                      <p:childTnLst>
+                        <p:par>
+                          <p:cTn id="40" fill="hold">
+                            <p:stCondLst>
+                              <p:cond delay="0"/>
+                            </p:stCondLst>
+                            <p:childTnLst>
+                              <p:par>
+                                <p:cTn id="41" presetID="2" presetClass="exit" presetSubtype="8" fill="hold" nodeType="clickEffect">
+                                  <p:stCondLst>
+                                    <p:cond delay="0"/>
+                                  </p:stCondLst>
+                                  <p:childTnLst>
+                                    <p:anim calcmode="lin" valueType="num">
+                                      <p:cBhvr additive="base">
+                                        <p:cTn id="42" dur="500"/>
+                                        <p:tgtEl>
+                                          <p:spTgt spid="2"/>
+                                        </p:tgtEl>
+                                        <p:attrNameLst>
+                                          <p:attrName>ppt_x</p:attrName>
+                                        </p:attrNameLst>
+                                      </p:cBhvr>
+                                      <p:tavLst>
+                                        <p:tav tm="0">
+                                          <p:val>
+                                            <p:strVal val="ppt_x"/>
+                                          </p:val>
+                                        </p:tav>
+                                        <p:tav tm="100000">
+                                          <p:val>
+                                            <p:strVal val="0-ppt_w/2"/>
+                                          </p:val>
+                                        </p:tav>
+                                      </p:tavLst>
+                                    </p:anim>
+                                    <p:anim calcmode="lin" valueType="num">
+                                      <p:cBhvr additive="base">
+                                        <p:cTn id="43" dur="500"/>
+                                        <p:tgtEl>
+                                          <p:spTgt spid="2"/>
+                                        </p:tgtEl>
+                                        <p:attrNameLst>
+                                          <p:attrName>ppt_y</p:attrName>
+                                        </p:attrNameLst>
+                                      </p:cBhvr>
+                                      <p:tavLst>
+                                        <p:tav tm="0">
+                                          <p:val>
+                                            <p:strVal val="ppt_y"/>
+                                          </p:val>
+                                        </p:tav>
+                                        <p:tav tm="100000">
+                                          <p:val>
+                                            <p:strVal val="ppt_y"/>
+                                          </p:val>
+                                        </p:tav>
+                                      </p:tavLst>
+                                    </p:anim>
+                                    <p:set>
+                                      <p:cBhvr>
+                                        <p:cTn id="44" dur="1" fill="hold">
+                                          <p:stCondLst>
+                                            <p:cond delay="499"/>
+                                          </p:stCondLst>
+                                        </p:cTn>
+                                        <p:tgtEl>
+                                          <p:spTgt spid="2"/>
+                                        </p:tgtEl>
+                                        <p:attrNameLst>
+                                          <p:attrName>style.visibility</p:attrName>
+                                        </p:attrNameLst>
+                                      </p:cBhvr>
+                                      <p:to>
+                                        <p:strVal val="hidden"/>
+                                      </p:to>
+                                    </p:set>
+                                  </p:childTnLst>
+                                </p:cTn>
+                              </p:par>
+                              <p:par>
+                                <p:cTn id="45" presetID="2" presetClass="entr" presetSubtype="2" fill="hold" nodeType="withEffect">
+                                  <p:stCondLst>
+                                    <p:cond delay="0"/>
+                                  </p:stCondLst>
+                                  <p:childTnLst>
+                                    <p:set>
+                                      <p:cBhvr>
+                                        <p:cTn id="46" dur="1" fill="hold">
+                                          <p:stCondLst>
+                                            <p:cond delay="0"/>
+                                          </p:stCondLst>
+                                        </p:cTn>
+                                        <p:tgtEl>
+                                          <p:spTgt spid="8"/>
+                                        </p:tgtEl>
+                                        <p:attrNameLst>
+                                          <p:attrName>style.visibility</p:attrName>
+                                        </p:attrNameLst>
+                                      </p:cBhvr>
+                                      <p:to>
+                                        <p:strVal val="visible"/>
+                                      </p:to>
+                                    </p:set>
+                                    <p:anim calcmode="lin" valueType="num">
+                                      <p:cBhvr additive="base">
+                                        <p:cTn id="47" dur="500" fill="hold"/>
+                                        <p:tgtEl>
+                                          <p:spTgt spid="8"/>
+                                        </p:tgtEl>
+                                        <p:attrNameLst>
+                                          <p:attrName>ppt_x</p:attrName>
+                                        </p:attrNameLst>
+                                      </p:cBhvr>
+                                      <p:tavLst>
+                                        <p:tav tm="0">
+                                          <p:val>
+                                            <p:strVal val="1+#ppt_w/2"/>
+                                          </p:val>
+                                        </p:tav>
+                                        <p:tav tm="100000">
+                                          <p:val>
+                                            <p:strVal val="#ppt_x"/>
+                                          </p:val>
+                                        </p:tav>
+                                      </p:tavLst>
+                                    </p:anim>
+                                    <p:anim calcmode="lin" valueType="num">
+                                      <p:cBhvr additive="base">
+                                        <p:cTn id="48" dur="500" fill="hold"/>
+                                        <p:tgtEl>
+                                          <p:spTgt spid="8"/>
+                                        </p:tgtEl>
+                                        <p:attrNameLst>
+                                          <p:attrName>ppt_y</p:attrName>
+                                        </p:attrNameLst>
+                                      </p:cBhvr>
+                                      <p:tavLst>
+                                        <p:tav tm="0">
+                                          <p:val>
+                                            <p:strVal val="#ppt_y"/>
+                                          </p:val>
+                                        </p:tav>
+                                        <p:tav tm="100000">
+                                          <p:val>
+                                            <p:strVal val="#ppt_y"/>
+                                          </p:val>
+                                        </p:tav>
+                                      </p:tavLst>
+                                    </p:anim>
+                                  </p:childTnLst>
+                                </p:cTn>
+                              </p:par>
+                            </p:childTnLst>
+                          </p:cTn>
+                        </p:par>
+                      </p:childTnLst>
+                    </p:cTn>
+                  </p:par>
+                  <p:par>
+                    <p:cTn id="49" fill="hold">
+                      <p:stCondLst>
+                        <p:cond delay="indefinite"/>
+                      </p:stCondLst>
+                      <p:childTnLst>
+                        <p:par>
+                          <p:cTn id="50" fill="hold">
+                            <p:stCondLst>
+                              <p:cond delay="0"/>
+                            </p:stCondLst>
+                            <p:childTnLst>
+                              <p:par>
+                                <p:cTn id="51" presetID="2" presetClass="exit" presetSubtype="8" fill="hold" nodeType="clickEffect">
+                                  <p:stCondLst>
+                                    <p:cond delay="0"/>
+                                  </p:stCondLst>
+                                  <p:childTnLst>
+                                    <p:anim calcmode="lin" valueType="num">
+                                      <p:cBhvr additive="base">
+                                        <p:cTn id="52" dur="500"/>
+                                        <p:tgtEl>
+                                          <p:spTgt spid="8"/>
+                                        </p:tgtEl>
+                                        <p:attrNameLst>
+                                          <p:attrName>ppt_x</p:attrName>
+                                        </p:attrNameLst>
+                                      </p:cBhvr>
+                                      <p:tavLst>
+                                        <p:tav tm="0">
+                                          <p:val>
+                                            <p:strVal val="ppt_x"/>
+                                          </p:val>
+                                        </p:tav>
+                                        <p:tav tm="100000">
+                                          <p:val>
+                                            <p:strVal val="0-ppt_w/2"/>
+                                          </p:val>
+                                        </p:tav>
+                                      </p:tavLst>
+                                    </p:anim>
+                                    <p:anim calcmode="lin" valueType="num">
+                                      <p:cBhvr additive="base">
+                                        <p:cTn id="53" dur="500"/>
+                                        <p:tgtEl>
+                                          <p:spTgt spid="8"/>
+                                        </p:tgtEl>
+                                        <p:attrNameLst>
+                                          <p:attrName>ppt_y</p:attrName>
+                                        </p:attrNameLst>
+                                      </p:cBhvr>
+                                      <p:tavLst>
+                                        <p:tav tm="0">
+                                          <p:val>
+                                            <p:strVal val="ppt_y"/>
+                                          </p:val>
+                                        </p:tav>
+                                        <p:tav tm="100000">
+                                          <p:val>
+                                            <p:strVal val="ppt_y"/>
+                                          </p:val>
+                                        </p:tav>
+                                      </p:tavLst>
+                                    </p:anim>
+                                    <p:set>
+                                      <p:cBhvr>
+                                        <p:cTn id="54" dur="1" fill="hold">
+                                          <p:stCondLst>
+                                            <p:cond delay="499"/>
+                                          </p:stCondLst>
+                                        </p:cTn>
+                                        <p:tgtEl>
+                                          <p:spTgt spid="8"/>
+                                        </p:tgtEl>
+                                        <p:attrNameLst>
+                                          <p:attrName>style.visibility</p:attrName>
+                                        </p:attrNameLst>
+                                      </p:cBhvr>
+                                      <p:to>
+                                        <p:strVal val="hidden"/>
+                                      </p:to>
+                                    </p:set>
+                                  </p:childTnLst>
+                                </p:cTn>
+                              </p:par>
+                            </p:childTnLst>
+                          </p:cTn>
+                        </p:par>
+                      </p:childTnLst>
+                    </p:cTn>
+                  </p:par>
+                </p:childTnLst>
+              </p:cTn>
+              <p:prevCondLst>
+                <p:cond evt="onPrev" delay="0">
+                  <p:tgtEl>
+                    <p:sldTgt/>
+                  </p:tgtEl>
+                </p:cond>
+              </p:prevCondLst>
+              <p:nextCondLst>
+                <p:cond evt="onNext" delay="0">
+                  <p:tgtEl>
+                    <p:sldTgt/>
+                  </p:tgtEl>
+                </p:cond>
+              </p:nextCondLst>
+            </p:seq>
+          </p:childTnLst>
+        </p:cTn>
+      </p:par>
+    </p:tnLst>
+  </p:timing>
+</p:sld>
+</file>
+
+<file path=ppt/slides/slide12.xml><?xml version="1.0" encoding="utf-8"?>
+<p:sld xmlns:a="http://schemas.openxmlformats.org/drawingml/2006/main" xmlns:r="http://schemas.openxmlformats.org/officeDocument/2006/relationships" xmlns:p="http://schemas.openxmlformats.org/presentationml/2006/main">
+  <p:cSld>
+    <p:spTree>
+      <p:nvGrpSpPr>
+        <p:cNvPr id="1" name=""/>
+        <p:cNvGrpSpPr/>
+        <p:nvPr/>
+      </p:nvGrpSpPr>
+      <p:grpSpPr>
+        <a:xfrm>
+          <a:off x="0" y="0"/>
+          <a:ext cx="0" cy="0"/>
+          <a:chOff x="0" y="0"/>
+          <a:chExt cx="0" cy="0"/>
+        </a:xfrm>
+      </p:grpSpPr>
+      <p:sp>
+        <p:nvSpPr>
+          <p:cNvPr id="2" name="Заголовок 1">
+            <a:extLst>
+              <a:ext uri="{FF2B5EF4-FFF2-40B4-BE49-F238E27FC236}">
+                <a16:creationId xmlns:a16="http://schemas.microsoft.com/office/drawing/2014/main" id="{850044EC-6F2E-473C-897A-F5E42C7C6AE0}"/>
+              </a:ext>
+            </a:extLst>
+          </p:cNvPr>
+          <p:cNvSpPr>
+            <a:spLocks noGrp="1"/>
+          </p:cNvSpPr>
+          <p:nvPr>
+            <p:ph type="title"/>
+          </p:nvPr>
+        </p:nvSpPr>
+        <p:spPr/>
+        <p:txBody>
+          <a:bodyPr/>
+          <a:lstStyle/>
+          <a:p>
+            <a:r>
+              <a:rPr lang="ru-RU" b="1" dirty="0"/>
+              <a:t>Принцип разделения интерфейса</a:t>
+            </a:r>
+            <a:br>
+              <a:rPr lang="en-US" b="1" dirty="0"/>
+            </a:br>
+            <a:r>
+              <a:rPr lang="en-US" i="1" dirty="0"/>
+              <a:t>The Interface Segregation Principle</a:t>
+            </a:r>
+            <a:endParaRPr lang="en-US" dirty="0"/>
+          </a:p>
+        </p:txBody>
+      </p:sp>
+      <p:sp>
+        <p:nvSpPr>
+          <p:cNvPr id="3" name="TextBox 2">
+            <a:extLst>
+              <a:ext uri="{FF2B5EF4-FFF2-40B4-BE49-F238E27FC236}">
+                <a16:creationId xmlns:a16="http://schemas.microsoft.com/office/drawing/2014/main" id="{AE7FDCDC-A782-4C02-875E-37D8EC179086}"/>
+              </a:ext>
+            </a:extLst>
+          </p:cNvPr>
+          <p:cNvSpPr txBox="1"/>
+          <p:nvPr/>
+        </p:nvSpPr>
+        <p:spPr>
+          <a:xfrm>
+            <a:off x="576263" y="2233613"/>
+            <a:ext cx="9836982" cy="3970318"/>
+          </a:xfrm>
+          <a:prstGeom prst="rect">
+            <a:avLst/>
+          </a:prstGeom>
+          <a:noFill/>
+        </p:spPr>
+        <p:txBody>
+          <a:bodyPr wrap="square" rtlCol="0">
+            <a:spAutoFit/>
+          </a:bodyPr>
+          <a:lstStyle/>
+          <a:p>
+            <a:r>
+              <a:rPr lang="ru-RU" sz="2800" dirty="0">
+                <a:solidFill>
+                  <a:srgbClr val="FFFF00"/>
+                </a:solidFill>
+              </a:rPr>
+              <a:t>Комментарии</a:t>
+            </a:r>
+          </a:p>
+          <a:p>
+            <a:endParaRPr lang="ru-RU" sz="2800" dirty="0">
+              <a:solidFill>
+                <a:srgbClr val="FFFF00"/>
+              </a:solidFill>
+            </a:endParaRPr>
+          </a:p>
+          <a:p>
+            <a:r>
+              <a:rPr lang="ru-RU" sz="2800" dirty="0"/>
+              <a:t>Конечно, с точки зрения компилятора, интерфейс так и не обзавелся </a:t>
+            </a:r>
+            <a:r>
+              <a:rPr lang="ru-RU" sz="2800" dirty="0" err="1"/>
+              <a:t>реализацей</a:t>
+            </a:r>
+            <a:r>
+              <a:rPr lang="ru-RU" sz="2800" dirty="0"/>
+              <a:t>, а так и остался маркером (то есть не получил никаких сигнатур и тем более реализаций.</a:t>
+            </a:r>
+          </a:p>
+          <a:p>
+            <a:endParaRPr lang="ru-RU" sz="2800" dirty="0"/>
+          </a:p>
+          <a:p>
+            <a:r>
+              <a:rPr lang="ru-RU" sz="2800" dirty="0"/>
+              <a:t>Но с другой стороны, без этого интерфейса, класс потеряет реализацию метода </a:t>
+            </a:r>
+            <a:r>
+              <a:rPr lang="en-US" sz="2800" dirty="0"/>
+              <a:t>Send()</a:t>
+            </a:r>
+            <a:endParaRPr lang="ru-RU" sz="2800" dirty="0"/>
+          </a:p>
+        </p:txBody>
+      </p:sp>
+    </p:spTree>
+    <p:extLst>
+      <p:ext uri="{BB962C8B-B14F-4D97-AF65-F5344CB8AC3E}">
+        <p14:creationId xmlns:p14="http://schemas.microsoft.com/office/powerpoint/2010/main" val="3292821284"/>
+      </p:ext>
+    </p:extLst>
+  </p:cSld>
+  <p:clrMapOvr>
+    <a:masterClrMapping/>
+  </p:clrMapOvr>
+</p:sld>
+</file>
+
+<file path=ppt/slides/slide13.xml><?xml version="1.0" encoding="utf-8"?>
+<p:sld xmlns:a="http://schemas.openxmlformats.org/drawingml/2006/main" xmlns:r="http://schemas.openxmlformats.org/officeDocument/2006/relationships" xmlns:p="http://schemas.openxmlformats.org/presentationml/2006/main">
+  <p:cSld>
+    <p:spTree>
+      <p:nvGrpSpPr>
+        <p:cNvPr id="1" name=""/>
+        <p:cNvGrpSpPr/>
+        <p:nvPr/>
+      </p:nvGrpSpPr>
+      <p:grpSpPr>
+        <a:xfrm>
+          <a:off x="0" y="0"/>
+          <a:ext cx="0" cy="0"/>
+          <a:chOff x="0" y="0"/>
+          <a:chExt cx="0" cy="0"/>
+        </a:xfrm>
+      </p:grpSpPr>
+      <p:sp>
+        <p:nvSpPr>
+          <p:cNvPr id="4" name="Заголовок 3">
+            <a:extLst>
+              <a:ext uri="{FF2B5EF4-FFF2-40B4-BE49-F238E27FC236}">
+                <a16:creationId xmlns:a16="http://schemas.microsoft.com/office/drawing/2014/main" id="{56B210DD-3C70-4225-BAC0-26F0709D6072}"/>
+              </a:ext>
+            </a:extLst>
+          </p:cNvPr>
+          <p:cNvSpPr>
+            <a:spLocks noGrp="1"/>
+          </p:cNvSpPr>
+          <p:nvPr>
+            <p:ph type="title"/>
+          </p:nvPr>
+        </p:nvSpPr>
+        <p:spPr/>
+        <p:txBody>
+          <a:bodyPr>
+            <a:normAutofit/>
+          </a:bodyPr>
+          <a:lstStyle/>
+          <a:p>
+            <a:r>
+              <a:rPr lang="ru-RU" b="1" dirty="0"/>
+              <a:t>Принцип разделения интерфейса</a:t>
+            </a:r>
+            <a:br>
+              <a:rPr lang="en-US" b="1" dirty="0"/>
+            </a:br>
+            <a:r>
+              <a:rPr lang="en-US" sz="3200" i="1" dirty="0"/>
+              <a:t>The Interface Segregation Principle</a:t>
+            </a:r>
+            <a:endParaRPr lang="en-US" dirty="0"/>
+          </a:p>
+        </p:txBody>
+      </p:sp>
+      <p:sp>
+        <p:nvSpPr>
+          <p:cNvPr id="3" name="TextBox 2">
+            <a:extLst>
+              <a:ext uri="{FF2B5EF4-FFF2-40B4-BE49-F238E27FC236}">
+                <a16:creationId xmlns:a16="http://schemas.microsoft.com/office/drawing/2014/main" id="{9D5961E6-AF38-4100-8B63-BD9839E777E6}"/>
+              </a:ext>
+            </a:extLst>
+          </p:cNvPr>
+          <p:cNvSpPr txBox="1"/>
+          <p:nvPr/>
+        </p:nvSpPr>
+        <p:spPr>
+          <a:xfrm>
+            <a:off x="568760" y="3226300"/>
+            <a:ext cx="9836982" cy="2062103"/>
+          </a:xfrm>
+          <a:prstGeom prst="rect">
+            <a:avLst/>
+          </a:prstGeom>
+          <a:noFill/>
+        </p:spPr>
+        <p:txBody>
+          <a:bodyPr wrap="square" rtlCol="0">
+            <a:spAutoFit/>
+          </a:bodyPr>
+          <a:lstStyle/>
+          <a:p>
+            <a:pPr algn="ctr"/>
+            <a:r>
+              <a:rPr lang="ru-RU" sz="4400" dirty="0">
+                <a:solidFill>
+                  <a:srgbClr val="FFFF00"/>
+                </a:solidFill>
+              </a:rPr>
+              <a:t>КОНЕЦ ФИЛЬМА</a:t>
+            </a:r>
+          </a:p>
+          <a:p>
+            <a:pPr algn="ctr"/>
+            <a:endParaRPr lang="ru-RU" sz="4400" dirty="0">
+              <a:solidFill>
+                <a:srgbClr val="FFFF00"/>
+              </a:solidFill>
+            </a:endParaRPr>
+          </a:p>
+          <a:p>
+            <a:pPr algn="ctr"/>
+            <a:r>
+              <a:rPr lang="ru-RU" sz="2000" dirty="0"/>
+              <a:t>Пишите комментарии, ставьте лайки, а чтобы получать уведомления о новых видео подписывайтесь на канал.</a:t>
+            </a:r>
+            <a:endParaRPr lang="en-US" sz="4400" dirty="0"/>
+          </a:p>
+        </p:txBody>
+      </p:sp>
+    </p:spTree>
+    <p:extLst>
+      <p:ext uri="{BB962C8B-B14F-4D97-AF65-F5344CB8AC3E}">
+        <p14:creationId xmlns:p14="http://schemas.microsoft.com/office/powerpoint/2010/main" val="777786714"/>
+      </p:ext>
+    </p:extLst>
+  </p:cSld>
+  <p:clrMapOvr>
+    <a:masterClrMapping/>
+  </p:clrMapOvr>
+  <p:transition spd="slow">
+    <p:cover/>
+  </p:transition>
 </p:sld>
 </file>
 
@@ -8207,6 +10191,122 @@
         </p:nvSpPr>
         <p:spPr>
           <a:xfrm>
+            <a:off x="568760" y="3226300"/>
+            <a:ext cx="9836982" cy="769441"/>
+          </a:xfrm>
+          <a:prstGeom prst="rect">
+            <a:avLst/>
+          </a:prstGeom>
+          <a:noFill/>
+        </p:spPr>
+        <p:txBody>
+          <a:bodyPr wrap="square" rtlCol="0">
+            <a:spAutoFit/>
+          </a:bodyPr>
+          <a:lstStyle/>
+          <a:p>
+            <a:pPr algn="ctr"/>
+            <a:r>
+              <a:rPr lang="ru-RU" sz="4400" dirty="0">
+                <a:solidFill>
+                  <a:srgbClr val="FFFF00"/>
+                </a:solidFill>
+              </a:rPr>
+              <a:t>Практическая часть</a:t>
+            </a:r>
+            <a:endParaRPr lang="en-US" sz="4400" dirty="0">
+              <a:solidFill>
+                <a:srgbClr val="FFFF00"/>
+              </a:solidFill>
+            </a:endParaRPr>
+          </a:p>
+        </p:txBody>
+      </p:sp>
+    </p:spTree>
+    <p:extLst>
+      <p:ext uri="{BB962C8B-B14F-4D97-AF65-F5344CB8AC3E}">
+        <p14:creationId xmlns:p14="http://schemas.microsoft.com/office/powerpoint/2010/main" val="3230918097"/>
+      </p:ext>
+    </p:extLst>
+  </p:cSld>
+  <p:clrMapOvr>
+    <a:masterClrMapping/>
+  </p:clrMapOvr>
+  <p:transition spd="slow">
+    <p:cover/>
+  </p:transition>
+</p:sld>
+</file>
+
+<file path=ppt/slides/slide7.xml><?xml version="1.0" encoding="utf-8"?>
+<p:sld xmlns:a="http://schemas.openxmlformats.org/drawingml/2006/main" xmlns:r="http://schemas.openxmlformats.org/officeDocument/2006/relationships" xmlns:p="http://schemas.openxmlformats.org/presentationml/2006/main">
+  <p:cSld>
+    <p:spTree>
+      <p:nvGrpSpPr>
+        <p:cNvPr id="1" name=""/>
+        <p:cNvGrpSpPr/>
+        <p:nvPr/>
+      </p:nvGrpSpPr>
+      <p:grpSpPr>
+        <a:xfrm>
+          <a:off x="0" y="0"/>
+          <a:ext cx="0" cy="0"/>
+          <a:chOff x="0" y="0"/>
+          <a:chExt cx="0" cy="0"/>
+        </a:xfrm>
+      </p:grpSpPr>
+      <p:sp>
+        <p:nvSpPr>
+          <p:cNvPr id="4" name="Заголовок 3">
+            <a:extLst>
+              <a:ext uri="{FF2B5EF4-FFF2-40B4-BE49-F238E27FC236}">
+                <a16:creationId xmlns:a16="http://schemas.microsoft.com/office/drawing/2014/main" id="{56B210DD-3C70-4225-BAC0-26F0709D6072}"/>
+              </a:ext>
+            </a:extLst>
+          </p:cNvPr>
+          <p:cNvSpPr>
+            <a:spLocks noGrp="1"/>
+          </p:cNvSpPr>
+          <p:nvPr>
+            <p:ph type="title"/>
+          </p:nvPr>
+        </p:nvSpPr>
+        <p:spPr/>
+        <p:txBody>
+          <a:bodyPr>
+            <a:normAutofit/>
+          </a:bodyPr>
+          <a:lstStyle/>
+          <a:p>
+            <a:r>
+              <a:rPr lang="ru-RU" b="1" dirty="0"/>
+              <a:t>Принцип разделения интерфейса</a:t>
+            </a:r>
+            <a:br>
+              <a:rPr lang="en-US" b="1" dirty="0"/>
+            </a:br>
+            <a:r>
+              <a:rPr lang="en-US" sz="3200" i="1" dirty="0"/>
+              <a:t>The Interface Segregation Principle</a:t>
+            </a:r>
+            <a:endParaRPr lang="en-US" dirty="0"/>
+          </a:p>
+        </p:txBody>
+      </p:sp>
+      <p:sp>
+        <p:nvSpPr>
+          <p:cNvPr id="3" name="TextBox 2">
+            <a:extLst>
+              <a:ext uri="{FF2B5EF4-FFF2-40B4-BE49-F238E27FC236}">
+                <a16:creationId xmlns:a16="http://schemas.microsoft.com/office/drawing/2014/main" id="{9D5961E6-AF38-4100-8B63-BD9839E777E6}"/>
+              </a:ext>
+            </a:extLst>
+          </p:cNvPr>
+          <p:cNvSpPr txBox="1"/>
+          <p:nvPr/>
+        </p:nvSpPr>
+        <p:spPr>
+          <a:xfrm>
             <a:off x="576263" y="2233613"/>
             <a:ext cx="9836982" cy="1261884"/>
           </a:xfrm>
@@ -8269,36 +10369,17 @@
         </p:nvSpPr>
         <p:spPr>
           <a:xfrm>
-            <a:off x="1202869" y="4202721"/>
-            <a:ext cx="4027716" cy="1882667"/>
+            <a:off x="1202869" y="4202722"/>
+            <a:ext cx="4027716" cy="1384038"/>
           </a:xfrm>
           <a:prstGeom prst="roundRect">
-            <a:avLst/>
+            <a:avLst>
+              <a:gd name="adj" fmla="val 0"/>
+            </a:avLst>
           </a:prstGeom>
-          <a:gradFill>
-            <a:gsLst>
-              <a:gs pos="100000">
-                <a:srgbClr val="FF710D"/>
-              </a:gs>
-              <a:gs pos="78000">
-                <a:schemeClr val="bg2">
-                  <a:shade val="100000"/>
-                  <a:hueMod val="100000"/>
-                  <a:satMod val="110000"/>
-                  <a:lumMod val="130000"/>
-                </a:schemeClr>
-              </a:gs>
-              <a:gs pos="0">
-                <a:schemeClr val="bg2">
-                  <a:shade val="78000"/>
-                  <a:hueMod val="44000"/>
-                  <a:satMod val="200000"/>
-                  <a:lumMod val="69000"/>
-                </a:schemeClr>
-              </a:gs>
-            </a:gsLst>
-            <a:lin ang="2520000" scaled="0"/>
-          </a:gradFill>
+          <a:solidFill>
+            <a:schemeClr val="accent3"/>
+          </a:solidFill>
           <a:ln>
             <a:solidFill>
               <a:schemeClr val="tx1"/>
@@ -8327,10 +10408,17 @@
           <a:p>
             <a:pPr algn="ctr"/>
             <a:r>
-              <a:rPr lang="ru-RU"/>
+              <a:rPr lang="en-US" dirty="0"/>
+              <a:t>“</a:t>
+            </a:r>
+            <a:r>
+              <a:rPr lang="ru-RU" dirty="0"/>
               <a:t>Маркер</a:t>
             </a:r>
-            <a:endParaRPr lang="en-US" dirty="0"/>
+            <a:r>
+              <a:rPr lang="en-US" dirty="0"/>
+              <a:t>”</a:t>
+            </a:r>
           </a:p>
         </p:txBody>
       </p:sp>
@@ -8348,36 +10436,17 @@
         </p:nvSpPr>
         <p:spPr>
           <a:xfrm>
-            <a:off x="5524503" y="4211219"/>
-            <a:ext cx="4027716" cy="1882667"/>
+            <a:off x="5524503" y="4211220"/>
+            <a:ext cx="4027716" cy="1384038"/>
           </a:xfrm>
           <a:prstGeom prst="roundRect">
-            <a:avLst/>
+            <a:avLst>
+              <a:gd name="adj" fmla="val 0"/>
+            </a:avLst>
           </a:prstGeom>
-          <a:gradFill>
-            <a:gsLst>
-              <a:gs pos="100000">
-                <a:srgbClr val="FF710D"/>
-              </a:gs>
-              <a:gs pos="78000">
-                <a:schemeClr val="bg2">
-                  <a:shade val="100000"/>
-                  <a:hueMod val="100000"/>
-                  <a:satMod val="110000"/>
-                  <a:lumMod val="130000"/>
-                </a:schemeClr>
-              </a:gs>
-              <a:gs pos="0">
-                <a:schemeClr val="bg2">
-                  <a:shade val="78000"/>
-                  <a:hueMod val="44000"/>
-                  <a:satMod val="200000"/>
-                  <a:lumMod val="69000"/>
-                </a:schemeClr>
-              </a:gs>
-            </a:gsLst>
-            <a:lin ang="2520000" scaled="0"/>
-          </a:gradFill>
+          <a:solidFill>
+            <a:schemeClr val="accent3"/>
+          </a:solidFill>
           <a:ln>
             <a:solidFill>
               <a:schemeClr val="tx1"/>
@@ -8407,7 +10476,7 @@
             <a:pPr algn="ctr"/>
             <a:r>
               <a:rPr lang="en-US" dirty="0"/>
-              <a:t>Can Do</a:t>
+              <a:t>“Can Do”</a:t>
             </a:r>
           </a:p>
         </p:txBody>
@@ -8660,7 +10729,7 @@
 </p:sld>
 </file>
 
-<file path=ppt/slides/slide7.xml><?xml version="1.0" encoding="utf-8"?>
+<file path=ppt/slides/slide8.xml><?xml version="1.0" encoding="utf-8"?>
 <p:sld xmlns:a="http://schemas.openxmlformats.org/drawingml/2006/main" xmlns:r="http://schemas.openxmlformats.org/officeDocument/2006/relationships" xmlns:p="http://schemas.openxmlformats.org/presentationml/2006/main">
   <p:cSld>
     <p:spTree>
@@ -8729,8 +10798,8 @@
         </p:nvSpPr>
         <p:spPr>
           <a:xfrm>
-            <a:off x="568760" y="3226300"/>
-            <a:ext cx="9836982" cy="769441"/>
+            <a:off x="576263" y="2233613"/>
+            <a:ext cx="9836982" cy="523220"/>
           </a:xfrm>
           <a:prstGeom prst="rect">
             <a:avLst/>
@@ -8743,16 +10812,15 @@
           </a:bodyPr>
           <a:lstStyle/>
           <a:p>
-            <a:pPr algn="ctr"/>
-            <a:r>
-              <a:rPr lang="ru-RU" sz="4400" dirty="0">
+            <a:r>
+              <a:rPr lang="ru-RU" sz="2800" dirty="0">
                 <a:solidFill>
                   <a:srgbClr val="FFFF00"/>
                 </a:solidFill>
               </a:rPr>
-              <a:t>Демонстрация</a:t>
-            </a:r>
-            <a:endParaRPr lang="en-US" sz="4400" dirty="0">
+              <a:t>Тип интерфейса Маркер</a:t>
+            </a:r>
+            <a:endParaRPr lang="en-US" sz="2800" dirty="0">
               <a:solidFill>
                 <a:srgbClr val="FFFF00"/>
               </a:solidFill>
@@ -8760,10 +10828,70 @@
           </a:p>
         </p:txBody>
       </p:sp>
+      <p:pic>
+        <p:nvPicPr>
+          <p:cNvPr id="2" name="Рисунок 1">
+            <a:extLst>
+              <a:ext uri="{FF2B5EF4-FFF2-40B4-BE49-F238E27FC236}">
+                <a16:creationId xmlns:a16="http://schemas.microsoft.com/office/drawing/2014/main" id="{F8A5C1F0-17D8-4FAB-90FA-B56947334BA2}"/>
+              </a:ext>
+            </a:extLst>
+          </p:cNvPr>
+          <p:cNvPicPr>
+            <a:picLocks noChangeAspect="1"/>
+          </p:cNvPicPr>
+          <p:nvPr/>
+        </p:nvPicPr>
+        <p:blipFill>
+          <a:blip r:embed="rId2"/>
+          <a:stretch>
+            <a:fillRect/>
+          </a:stretch>
+        </p:blipFill>
+        <p:spPr>
+          <a:xfrm>
+            <a:off x="680321" y="3156280"/>
+            <a:ext cx="8075876" cy="2024324"/>
+          </a:xfrm>
+          <a:prstGeom prst="rect">
+            <a:avLst/>
+          </a:prstGeom>
+        </p:spPr>
+      </p:pic>
+      <p:pic>
+        <p:nvPicPr>
+          <p:cNvPr id="5" name="Рисунок 4">
+            <a:extLst>
+              <a:ext uri="{FF2B5EF4-FFF2-40B4-BE49-F238E27FC236}">
+                <a16:creationId xmlns:a16="http://schemas.microsoft.com/office/drawing/2014/main" id="{C67045CB-5878-499E-83C3-599CE826525E}"/>
+              </a:ext>
+            </a:extLst>
+          </p:cNvPr>
+          <p:cNvPicPr>
+            <a:picLocks noChangeAspect="1"/>
+          </p:cNvPicPr>
+          <p:nvPr/>
+        </p:nvPicPr>
+        <p:blipFill>
+          <a:blip r:embed="rId3"/>
+          <a:stretch>
+            <a:fillRect/>
+          </a:stretch>
+        </p:blipFill>
+        <p:spPr>
+          <a:xfrm>
+            <a:off x="3341936" y="3622788"/>
+            <a:ext cx="7181977" cy="2257807"/>
+          </a:xfrm>
+          <a:prstGeom prst="rect">
+            <a:avLst/>
+          </a:prstGeom>
+        </p:spPr>
+      </p:pic>
     </p:spTree>
     <p:extLst>
       <p:ext uri="{BB962C8B-B14F-4D97-AF65-F5344CB8AC3E}">
-        <p14:creationId xmlns:p14="http://schemas.microsoft.com/office/powerpoint/2010/main" val="3230918097"/>
+        <p14:creationId xmlns:p14="http://schemas.microsoft.com/office/powerpoint/2010/main" val="4027867262"/>
       </p:ext>
     </p:extLst>
   </p:cSld>
@@ -8773,6 +10901,1029 @@
   <p:transition spd="slow">
     <p:cover/>
   </p:transition>
+  <p:timing>
+    <p:tnLst>
+      <p:par>
+        <p:cTn id="1" dur="indefinite" restart="never" nodeType="tmRoot">
+          <p:childTnLst>
+            <p:seq concurrent="1" nextAc="seek">
+              <p:cTn id="2" dur="indefinite" nodeType="mainSeq">
+                <p:childTnLst>
+                  <p:par>
+                    <p:cTn id="3" fill="hold">
+                      <p:stCondLst>
+                        <p:cond delay="indefinite"/>
+                      </p:stCondLst>
+                      <p:childTnLst>
+                        <p:par>
+                          <p:cTn id="4" fill="hold">
+                            <p:stCondLst>
+                              <p:cond delay="0"/>
+                            </p:stCondLst>
+                            <p:childTnLst>
+                              <p:par>
+                                <p:cTn id="5" presetID="53" presetClass="entr" presetSubtype="16" fill="hold" nodeType="clickEffect">
+                                  <p:stCondLst>
+                                    <p:cond delay="0"/>
+                                  </p:stCondLst>
+                                  <p:childTnLst>
+                                    <p:set>
+                                      <p:cBhvr>
+                                        <p:cTn id="6" dur="1" fill="hold">
+                                          <p:stCondLst>
+                                            <p:cond delay="0"/>
+                                          </p:stCondLst>
+                                        </p:cTn>
+                                        <p:tgtEl>
+                                          <p:spTgt spid="2"/>
+                                        </p:tgtEl>
+                                        <p:attrNameLst>
+                                          <p:attrName>style.visibility</p:attrName>
+                                        </p:attrNameLst>
+                                      </p:cBhvr>
+                                      <p:to>
+                                        <p:strVal val="visible"/>
+                                      </p:to>
+                                    </p:set>
+                                    <p:anim calcmode="lin" valueType="num">
+                                      <p:cBhvr>
+                                        <p:cTn id="7" dur="500" fill="hold"/>
+                                        <p:tgtEl>
+                                          <p:spTgt spid="2"/>
+                                        </p:tgtEl>
+                                        <p:attrNameLst>
+                                          <p:attrName>ppt_w</p:attrName>
+                                        </p:attrNameLst>
+                                      </p:cBhvr>
+                                      <p:tavLst>
+                                        <p:tav tm="0">
+                                          <p:val>
+                                            <p:fltVal val="0"/>
+                                          </p:val>
+                                        </p:tav>
+                                        <p:tav tm="100000">
+                                          <p:val>
+                                            <p:strVal val="#ppt_w"/>
+                                          </p:val>
+                                        </p:tav>
+                                      </p:tavLst>
+                                    </p:anim>
+                                    <p:anim calcmode="lin" valueType="num">
+                                      <p:cBhvr>
+                                        <p:cTn id="8" dur="500" fill="hold"/>
+                                        <p:tgtEl>
+                                          <p:spTgt spid="2"/>
+                                        </p:tgtEl>
+                                        <p:attrNameLst>
+                                          <p:attrName>ppt_h</p:attrName>
+                                        </p:attrNameLst>
+                                      </p:cBhvr>
+                                      <p:tavLst>
+                                        <p:tav tm="0">
+                                          <p:val>
+                                            <p:fltVal val="0"/>
+                                          </p:val>
+                                        </p:tav>
+                                        <p:tav tm="100000">
+                                          <p:val>
+                                            <p:strVal val="#ppt_h"/>
+                                          </p:val>
+                                        </p:tav>
+                                      </p:tavLst>
+                                    </p:anim>
+                                    <p:animEffect transition="in" filter="fade">
+                                      <p:cBhvr>
+                                        <p:cTn id="9" dur="500"/>
+                                        <p:tgtEl>
+                                          <p:spTgt spid="2"/>
+                                        </p:tgtEl>
+                                      </p:cBhvr>
+                                    </p:animEffect>
+                                  </p:childTnLst>
+                                </p:cTn>
+                              </p:par>
+                            </p:childTnLst>
+                          </p:cTn>
+                        </p:par>
+                      </p:childTnLst>
+                    </p:cTn>
+                  </p:par>
+                  <p:par>
+                    <p:cTn id="10" fill="hold">
+                      <p:stCondLst>
+                        <p:cond delay="indefinite"/>
+                      </p:stCondLst>
+                      <p:childTnLst>
+                        <p:par>
+                          <p:cTn id="11" fill="hold">
+                            <p:stCondLst>
+                              <p:cond delay="0"/>
+                            </p:stCondLst>
+                            <p:childTnLst>
+                              <p:par>
+                                <p:cTn id="12" presetID="53" presetClass="exit" presetSubtype="32" fill="hold" nodeType="clickEffect">
+                                  <p:stCondLst>
+                                    <p:cond delay="0"/>
+                                  </p:stCondLst>
+                                  <p:childTnLst>
+                                    <p:anim calcmode="lin" valueType="num">
+                                      <p:cBhvr>
+                                        <p:cTn id="13" dur="500"/>
+                                        <p:tgtEl>
+                                          <p:spTgt spid="2"/>
+                                        </p:tgtEl>
+                                        <p:attrNameLst>
+                                          <p:attrName>ppt_w</p:attrName>
+                                        </p:attrNameLst>
+                                      </p:cBhvr>
+                                      <p:tavLst>
+                                        <p:tav tm="0">
+                                          <p:val>
+                                            <p:strVal val="ppt_w"/>
+                                          </p:val>
+                                        </p:tav>
+                                        <p:tav tm="100000">
+                                          <p:val>
+                                            <p:fltVal val="0"/>
+                                          </p:val>
+                                        </p:tav>
+                                      </p:tavLst>
+                                    </p:anim>
+                                    <p:anim calcmode="lin" valueType="num">
+                                      <p:cBhvr>
+                                        <p:cTn id="14" dur="500"/>
+                                        <p:tgtEl>
+                                          <p:spTgt spid="2"/>
+                                        </p:tgtEl>
+                                        <p:attrNameLst>
+                                          <p:attrName>ppt_h</p:attrName>
+                                        </p:attrNameLst>
+                                      </p:cBhvr>
+                                      <p:tavLst>
+                                        <p:tav tm="0">
+                                          <p:val>
+                                            <p:strVal val="ppt_h"/>
+                                          </p:val>
+                                        </p:tav>
+                                        <p:tav tm="100000">
+                                          <p:val>
+                                            <p:fltVal val="0"/>
+                                          </p:val>
+                                        </p:tav>
+                                      </p:tavLst>
+                                    </p:anim>
+                                    <p:animEffect transition="out" filter="fade">
+                                      <p:cBhvr>
+                                        <p:cTn id="15" dur="500"/>
+                                        <p:tgtEl>
+                                          <p:spTgt spid="2"/>
+                                        </p:tgtEl>
+                                      </p:cBhvr>
+                                    </p:animEffect>
+                                    <p:set>
+                                      <p:cBhvr>
+                                        <p:cTn id="16" dur="1" fill="hold">
+                                          <p:stCondLst>
+                                            <p:cond delay="499"/>
+                                          </p:stCondLst>
+                                        </p:cTn>
+                                        <p:tgtEl>
+                                          <p:spTgt spid="2"/>
+                                        </p:tgtEl>
+                                        <p:attrNameLst>
+                                          <p:attrName>style.visibility</p:attrName>
+                                        </p:attrNameLst>
+                                      </p:cBhvr>
+                                      <p:to>
+                                        <p:strVal val="hidden"/>
+                                      </p:to>
+                                    </p:set>
+                                  </p:childTnLst>
+                                </p:cTn>
+                              </p:par>
+                              <p:par>
+                                <p:cTn id="17" presetID="53" presetClass="entr" presetSubtype="16" fill="hold" nodeType="withEffect">
+                                  <p:stCondLst>
+                                    <p:cond delay="0"/>
+                                  </p:stCondLst>
+                                  <p:childTnLst>
+                                    <p:set>
+                                      <p:cBhvr>
+                                        <p:cTn id="18" dur="1" fill="hold">
+                                          <p:stCondLst>
+                                            <p:cond delay="0"/>
+                                          </p:stCondLst>
+                                        </p:cTn>
+                                        <p:tgtEl>
+                                          <p:spTgt spid="5"/>
+                                        </p:tgtEl>
+                                        <p:attrNameLst>
+                                          <p:attrName>style.visibility</p:attrName>
+                                        </p:attrNameLst>
+                                      </p:cBhvr>
+                                      <p:to>
+                                        <p:strVal val="visible"/>
+                                      </p:to>
+                                    </p:set>
+                                    <p:anim calcmode="lin" valueType="num">
+                                      <p:cBhvr>
+                                        <p:cTn id="19" dur="500" fill="hold"/>
+                                        <p:tgtEl>
+                                          <p:spTgt spid="5"/>
+                                        </p:tgtEl>
+                                        <p:attrNameLst>
+                                          <p:attrName>ppt_w</p:attrName>
+                                        </p:attrNameLst>
+                                      </p:cBhvr>
+                                      <p:tavLst>
+                                        <p:tav tm="0">
+                                          <p:val>
+                                            <p:fltVal val="0"/>
+                                          </p:val>
+                                        </p:tav>
+                                        <p:tav tm="100000">
+                                          <p:val>
+                                            <p:strVal val="#ppt_w"/>
+                                          </p:val>
+                                        </p:tav>
+                                      </p:tavLst>
+                                    </p:anim>
+                                    <p:anim calcmode="lin" valueType="num">
+                                      <p:cBhvr>
+                                        <p:cTn id="20" dur="500" fill="hold"/>
+                                        <p:tgtEl>
+                                          <p:spTgt spid="5"/>
+                                        </p:tgtEl>
+                                        <p:attrNameLst>
+                                          <p:attrName>ppt_h</p:attrName>
+                                        </p:attrNameLst>
+                                      </p:cBhvr>
+                                      <p:tavLst>
+                                        <p:tav tm="0">
+                                          <p:val>
+                                            <p:fltVal val="0"/>
+                                          </p:val>
+                                        </p:tav>
+                                        <p:tav tm="100000">
+                                          <p:val>
+                                            <p:strVal val="#ppt_h"/>
+                                          </p:val>
+                                        </p:tav>
+                                      </p:tavLst>
+                                    </p:anim>
+                                    <p:animEffect transition="in" filter="fade">
+                                      <p:cBhvr>
+                                        <p:cTn id="21" dur="500"/>
+                                        <p:tgtEl>
+                                          <p:spTgt spid="5"/>
+                                        </p:tgtEl>
+                                      </p:cBhvr>
+                                    </p:animEffect>
+                                  </p:childTnLst>
+                                </p:cTn>
+                              </p:par>
+                            </p:childTnLst>
+                          </p:cTn>
+                        </p:par>
+                      </p:childTnLst>
+                    </p:cTn>
+                  </p:par>
+                  <p:par>
+                    <p:cTn id="22" fill="hold">
+                      <p:stCondLst>
+                        <p:cond delay="indefinite"/>
+                      </p:stCondLst>
+                      <p:childTnLst>
+                        <p:par>
+                          <p:cTn id="23" fill="hold">
+                            <p:stCondLst>
+                              <p:cond delay="0"/>
+                            </p:stCondLst>
+                            <p:childTnLst>
+                              <p:par>
+                                <p:cTn id="24" presetID="53" presetClass="exit" presetSubtype="32" fill="hold" nodeType="clickEffect">
+                                  <p:stCondLst>
+                                    <p:cond delay="0"/>
+                                  </p:stCondLst>
+                                  <p:childTnLst>
+                                    <p:anim calcmode="lin" valueType="num">
+                                      <p:cBhvr>
+                                        <p:cTn id="25" dur="500"/>
+                                        <p:tgtEl>
+                                          <p:spTgt spid="5"/>
+                                        </p:tgtEl>
+                                        <p:attrNameLst>
+                                          <p:attrName>ppt_w</p:attrName>
+                                        </p:attrNameLst>
+                                      </p:cBhvr>
+                                      <p:tavLst>
+                                        <p:tav tm="0">
+                                          <p:val>
+                                            <p:strVal val="ppt_w"/>
+                                          </p:val>
+                                        </p:tav>
+                                        <p:tav tm="100000">
+                                          <p:val>
+                                            <p:fltVal val="0"/>
+                                          </p:val>
+                                        </p:tav>
+                                      </p:tavLst>
+                                    </p:anim>
+                                    <p:anim calcmode="lin" valueType="num">
+                                      <p:cBhvr>
+                                        <p:cTn id="26" dur="500"/>
+                                        <p:tgtEl>
+                                          <p:spTgt spid="5"/>
+                                        </p:tgtEl>
+                                        <p:attrNameLst>
+                                          <p:attrName>ppt_h</p:attrName>
+                                        </p:attrNameLst>
+                                      </p:cBhvr>
+                                      <p:tavLst>
+                                        <p:tav tm="0">
+                                          <p:val>
+                                            <p:strVal val="ppt_h"/>
+                                          </p:val>
+                                        </p:tav>
+                                        <p:tav tm="100000">
+                                          <p:val>
+                                            <p:fltVal val="0"/>
+                                          </p:val>
+                                        </p:tav>
+                                      </p:tavLst>
+                                    </p:anim>
+                                    <p:animEffect transition="out" filter="fade">
+                                      <p:cBhvr>
+                                        <p:cTn id="27" dur="500"/>
+                                        <p:tgtEl>
+                                          <p:spTgt spid="5"/>
+                                        </p:tgtEl>
+                                      </p:cBhvr>
+                                    </p:animEffect>
+                                    <p:set>
+                                      <p:cBhvr>
+                                        <p:cTn id="28" dur="1" fill="hold">
+                                          <p:stCondLst>
+                                            <p:cond delay="499"/>
+                                          </p:stCondLst>
+                                        </p:cTn>
+                                        <p:tgtEl>
+                                          <p:spTgt spid="5"/>
+                                        </p:tgtEl>
+                                        <p:attrNameLst>
+                                          <p:attrName>style.visibility</p:attrName>
+                                        </p:attrNameLst>
+                                      </p:cBhvr>
+                                      <p:to>
+                                        <p:strVal val="hidden"/>
+                                      </p:to>
+                                    </p:set>
+                                  </p:childTnLst>
+                                </p:cTn>
+                              </p:par>
+                            </p:childTnLst>
+                          </p:cTn>
+                        </p:par>
+                      </p:childTnLst>
+                    </p:cTn>
+                  </p:par>
+                </p:childTnLst>
+              </p:cTn>
+              <p:prevCondLst>
+                <p:cond evt="onPrev" delay="0">
+                  <p:tgtEl>
+                    <p:sldTgt/>
+                  </p:tgtEl>
+                </p:cond>
+              </p:prevCondLst>
+              <p:nextCondLst>
+                <p:cond evt="onNext" delay="0">
+                  <p:tgtEl>
+                    <p:sldTgt/>
+                  </p:tgtEl>
+                </p:cond>
+              </p:nextCondLst>
+            </p:seq>
+          </p:childTnLst>
+        </p:cTn>
+      </p:par>
+    </p:tnLst>
+  </p:timing>
+</p:sld>
+</file>
+
+<file path=ppt/slides/slide9.xml><?xml version="1.0" encoding="utf-8"?>
+<p:sld xmlns:a="http://schemas.openxmlformats.org/drawingml/2006/main" xmlns:r="http://schemas.openxmlformats.org/officeDocument/2006/relationships" xmlns:p="http://schemas.openxmlformats.org/presentationml/2006/main">
+  <p:cSld>
+    <p:spTree>
+      <p:nvGrpSpPr>
+        <p:cNvPr id="1" name=""/>
+        <p:cNvGrpSpPr/>
+        <p:nvPr/>
+      </p:nvGrpSpPr>
+      <p:grpSpPr>
+        <a:xfrm>
+          <a:off x="0" y="0"/>
+          <a:ext cx="0" cy="0"/>
+          <a:chOff x="0" y="0"/>
+          <a:chExt cx="0" cy="0"/>
+        </a:xfrm>
+      </p:grpSpPr>
+      <p:sp>
+        <p:nvSpPr>
+          <p:cNvPr id="4" name="Заголовок 3">
+            <a:extLst>
+              <a:ext uri="{FF2B5EF4-FFF2-40B4-BE49-F238E27FC236}">
+                <a16:creationId xmlns:a16="http://schemas.microsoft.com/office/drawing/2014/main" id="{56B210DD-3C70-4225-BAC0-26F0709D6072}"/>
+              </a:ext>
+            </a:extLst>
+          </p:cNvPr>
+          <p:cNvSpPr>
+            <a:spLocks noGrp="1"/>
+          </p:cNvSpPr>
+          <p:nvPr>
+            <p:ph type="title"/>
+          </p:nvPr>
+        </p:nvSpPr>
+        <p:spPr/>
+        <p:txBody>
+          <a:bodyPr>
+            <a:normAutofit/>
+          </a:bodyPr>
+          <a:lstStyle/>
+          <a:p>
+            <a:r>
+              <a:rPr lang="ru-RU" b="1" dirty="0"/>
+              <a:t>Принцип разделения интерфейса</a:t>
+            </a:r>
+            <a:br>
+              <a:rPr lang="en-US" b="1" dirty="0"/>
+            </a:br>
+            <a:r>
+              <a:rPr lang="en-US" sz="3200" i="1" dirty="0"/>
+              <a:t>The Interface Segregation Principle</a:t>
+            </a:r>
+            <a:endParaRPr lang="en-US" dirty="0"/>
+          </a:p>
+        </p:txBody>
+      </p:sp>
+      <p:sp>
+        <p:nvSpPr>
+          <p:cNvPr id="3" name="TextBox 2">
+            <a:extLst>
+              <a:ext uri="{FF2B5EF4-FFF2-40B4-BE49-F238E27FC236}">
+                <a16:creationId xmlns:a16="http://schemas.microsoft.com/office/drawing/2014/main" id="{9D5961E6-AF38-4100-8B63-BD9839E777E6}"/>
+              </a:ext>
+            </a:extLst>
+          </p:cNvPr>
+          <p:cNvSpPr txBox="1"/>
+          <p:nvPr/>
+        </p:nvSpPr>
+        <p:spPr>
+          <a:xfrm>
+            <a:off x="576263" y="2233613"/>
+            <a:ext cx="9836982" cy="523220"/>
+          </a:xfrm>
+          <a:prstGeom prst="rect">
+            <a:avLst/>
+          </a:prstGeom>
+          <a:noFill/>
+        </p:spPr>
+        <p:txBody>
+          <a:bodyPr wrap="square" rtlCol="0">
+            <a:spAutoFit/>
+          </a:bodyPr>
+          <a:lstStyle/>
+          <a:p>
+            <a:r>
+              <a:rPr lang="ru-RU" sz="2800" dirty="0">
+                <a:solidFill>
+                  <a:srgbClr val="FFFF00"/>
+                </a:solidFill>
+              </a:rPr>
+              <a:t>Тип интерфейс </a:t>
+            </a:r>
+            <a:r>
+              <a:rPr lang="en-US" sz="2800" dirty="0">
+                <a:solidFill>
+                  <a:srgbClr val="FFFF00"/>
+                </a:solidFill>
+              </a:rPr>
+              <a:t>“Can Do” </a:t>
+            </a:r>
+            <a:r>
+              <a:rPr lang="ru-RU" sz="2800" dirty="0">
+                <a:solidFill>
+                  <a:srgbClr val="FFFF00"/>
+                </a:solidFill>
+              </a:rPr>
+              <a:t>или </a:t>
+            </a:r>
+            <a:r>
+              <a:rPr lang="en-US" sz="2800" dirty="0">
+                <a:solidFill>
+                  <a:srgbClr val="FFFF00"/>
+                </a:solidFill>
+              </a:rPr>
+              <a:t>“</a:t>
+            </a:r>
+            <a:r>
+              <a:rPr lang="en-US" sz="2800">
+                <a:solidFill>
+                  <a:srgbClr val="FFFF00"/>
+                </a:solidFill>
+              </a:rPr>
+              <a:t>I Have”</a:t>
+            </a:r>
+            <a:endParaRPr lang="en-US" sz="2800" dirty="0">
+              <a:solidFill>
+                <a:srgbClr val="FFFF00"/>
+              </a:solidFill>
+            </a:endParaRPr>
+          </a:p>
+        </p:txBody>
+      </p:sp>
+      <p:pic>
+        <p:nvPicPr>
+          <p:cNvPr id="6" name="Рисунок 5">
+            <a:extLst>
+              <a:ext uri="{FF2B5EF4-FFF2-40B4-BE49-F238E27FC236}">
+                <a16:creationId xmlns:a16="http://schemas.microsoft.com/office/drawing/2014/main" id="{2367826F-3ED9-4D38-B90C-865739C708C1}"/>
+              </a:ext>
+            </a:extLst>
+          </p:cNvPr>
+          <p:cNvPicPr>
+            <a:picLocks noChangeAspect="1"/>
+          </p:cNvPicPr>
+          <p:nvPr/>
+        </p:nvPicPr>
+        <p:blipFill>
+          <a:blip r:embed="rId2"/>
+          <a:stretch>
+            <a:fillRect/>
+          </a:stretch>
+        </p:blipFill>
+        <p:spPr>
+          <a:xfrm>
+            <a:off x="680320" y="2932205"/>
+            <a:ext cx="6640384" cy="2550683"/>
+          </a:xfrm>
+          <a:prstGeom prst="rect">
+            <a:avLst/>
+          </a:prstGeom>
+        </p:spPr>
+      </p:pic>
+      <p:pic>
+        <p:nvPicPr>
+          <p:cNvPr id="5" name="Рисунок 4">
+            <a:extLst>
+              <a:ext uri="{FF2B5EF4-FFF2-40B4-BE49-F238E27FC236}">
+                <a16:creationId xmlns:a16="http://schemas.microsoft.com/office/drawing/2014/main" id="{1E93867B-6DB7-474C-A941-BFB1640EB53D}"/>
+              </a:ext>
+            </a:extLst>
+          </p:cNvPr>
+          <p:cNvPicPr>
+            <a:picLocks noChangeAspect="1"/>
+          </p:cNvPicPr>
+          <p:nvPr/>
+        </p:nvPicPr>
+        <p:blipFill>
+          <a:blip r:embed="rId3"/>
+          <a:stretch>
+            <a:fillRect/>
+          </a:stretch>
+        </p:blipFill>
+        <p:spPr>
+          <a:xfrm>
+            <a:off x="3480261" y="3429000"/>
+            <a:ext cx="7012679" cy="2424266"/>
+          </a:xfrm>
+          <a:prstGeom prst="rect">
+            <a:avLst/>
+          </a:prstGeom>
+        </p:spPr>
+      </p:pic>
+    </p:spTree>
+    <p:extLst>
+      <p:ext uri="{BB962C8B-B14F-4D97-AF65-F5344CB8AC3E}">
+        <p14:creationId xmlns:p14="http://schemas.microsoft.com/office/powerpoint/2010/main" val="2156029272"/>
+      </p:ext>
+    </p:extLst>
+  </p:cSld>
+  <p:clrMapOvr>
+    <a:masterClrMapping/>
+  </p:clrMapOvr>
+  <p:transition spd="slow">
+    <p:cover/>
+  </p:transition>
+  <p:timing>
+    <p:tnLst>
+      <p:par>
+        <p:cTn id="1" dur="indefinite" restart="never" nodeType="tmRoot">
+          <p:childTnLst>
+            <p:seq concurrent="1" nextAc="seek">
+              <p:cTn id="2" dur="indefinite" nodeType="mainSeq">
+                <p:childTnLst>
+                  <p:par>
+                    <p:cTn id="3" fill="hold">
+                      <p:stCondLst>
+                        <p:cond delay="indefinite"/>
+                      </p:stCondLst>
+                      <p:childTnLst>
+                        <p:par>
+                          <p:cTn id="4" fill="hold">
+                            <p:stCondLst>
+                              <p:cond delay="0"/>
+                            </p:stCondLst>
+                            <p:childTnLst>
+                              <p:par>
+                                <p:cTn id="5" presetID="53" presetClass="entr" presetSubtype="16" fill="hold" nodeType="clickEffect">
+                                  <p:stCondLst>
+                                    <p:cond delay="0"/>
+                                  </p:stCondLst>
+                                  <p:childTnLst>
+                                    <p:set>
+                                      <p:cBhvr>
+                                        <p:cTn id="6" dur="1" fill="hold">
+                                          <p:stCondLst>
+                                            <p:cond delay="0"/>
+                                          </p:stCondLst>
+                                        </p:cTn>
+                                        <p:tgtEl>
+                                          <p:spTgt spid="6"/>
+                                        </p:tgtEl>
+                                        <p:attrNameLst>
+                                          <p:attrName>style.visibility</p:attrName>
+                                        </p:attrNameLst>
+                                      </p:cBhvr>
+                                      <p:to>
+                                        <p:strVal val="visible"/>
+                                      </p:to>
+                                    </p:set>
+                                    <p:anim calcmode="lin" valueType="num">
+                                      <p:cBhvr>
+                                        <p:cTn id="7" dur="500" fill="hold"/>
+                                        <p:tgtEl>
+                                          <p:spTgt spid="6"/>
+                                        </p:tgtEl>
+                                        <p:attrNameLst>
+                                          <p:attrName>ppt_w</p:attrName>
+                                        </p:attrNameLst>
+                                      </p:cBhvr>
+                                      <p:tavLst>
+                                        <p:tav tm="0">
+                                          <p:val>
+                                            <p:fltVal val="0"/>
+                                          </p:val>
+                                        </p:tav>
+                                        <p:tav tm="100000">
+                                          <p:val>
+                                            <p:strVal val="#ppt_w"/>
+                                          </p:val>
+                                        </p:tav>
+                                      </p:tavLst>
+                                    </p:anim>
+                                    <p:anim calcmode="lin" valueType="num">
+                                      <p:cBhvr>
+                                        <p:cTn id="8" dur="500" fill="hold"/>
+                                        <p:tgtEl>
+                                          <p:spTgt spid="6"/>
+                                        </p:tgtEl>
+                                        <p:attrNameLst>
+                                          <p:attrName>ppt_h</p:attrName>
+                                        </p:attrNameLst>
+                                      </p:cBhvr>
+                                      <p:tavLst>
+                                        <p:tav tm="0">
+                                          <p:val>
+                                            <p:fltVal val="0"/>
+                                          </p:val>
+                                        </p:tav>
+                                        <p:tav tm="100000">
+                                          <p:val>
+                                            <p:strVal val="#ppt_h"/>
+                                          </p:val>
+                                        </p:tav>
+                                      </p:tavLst>
+                                    </p:anim>
+                                    <p:animEffect transition="in" filter="fade">
+                                      <p:cBhvr>
+                                        <p:cTn id="9" dur="500"/>
+                                        <p:tgtEl>
+                                          <p:spTgt spid="6"/>
+                                        </p:tgtEl>
+                                      </p:cBhvr>
+                                    </p:animEffect>
+                                  </p:childTnLst>
+                                </p:cTn>
+                              </p:par>
+                            </p:childTnLst>
+                          </p:cTn>
+                        </p:par>
+                      </p:childTnLst>
+                    </p:cTn>
+                  </p:par>
+                  <p:par>
+                    <p:cTn id="10" fill="hold">
+                      <p:stCondLst>
+                        <p:cond delay="indefinite"/>
+                      </p:stCondLst>
+                      <p:childTnLst>
+                        <p:par>
+                          <p:cTn id="11" fill="hold">
+                            <p:stCondLst>
+                              <p:cond delay="0"/>
+                            </p:stCondLst>
+                            <p:childTnLst>
+                              <p:par>
+                                <p:cTn id="12" presetID="53" presetClass="exit" presetSubtype="32" fill="hold" nodeType="clickEffect">
+                                  <p:stCondLst>
+                                    <p:cond delay="0"/>
+                                  </p:stCondLst>
+                                  <p:childTnLst>
+                                    <p:anim calcmode="lin" valueType="num">
+                                      <p:cBhvr>
+                                        <p:cTn id="13" dur="500"/>
+                                        <p:tgtEl>
+                                          <p:spTgt spid="6"/>
+                                        </p:tgtEl>
+                                        <p:attrNameLst>
+                                          <p:attrName>ppt_w</p:attrName>
+                                        </p:attrNameLst>
+                                      </p:cBhvr>
+                                      <p:tavLst>
+                                        <p:tav tm="0">
+                                          <p:val>
+                                            <p:strVal val="ppt_w"/>
+                                          </p:val>
+                                        </p:tav>
+                                        <p:tav tm="100000">
+                                          <p:val>
+                                            <p:fltVal val="0"/>
+                                          </p:val>
+                                        </p:tav>
+                                      </p:tavLst>
+                                    </p:anim>
+                                    <p:anim calcmode="lin" valueType="num">
+                                      <p:cBhvr>
+                                        <p:cTn id="14" dur="500"/>
+                                        <p:tgtEl>
+                                          <p:spTgt spid="6"/>
+                                        </p:tgtEl>
+                                        <p:attrNameLst>
+                                          <p:attrName>ppt_h</p:attrName>
+                                        </p:attrNameLst>
+                                      </p:cBhvr>
+                                      <p:tavLst>
+                                        <p:tav tm="0">
+                                          <p:val>
+                                            <p:strVal val="ppt_h"/>
+                                          </p:val>
+                                        </p:tav>
+                                        <p:tav tm="100000">
+                                          <p:val>
+                                            <p:fltVal val="0"/>
+                                          </p:val>
+                                        </p:tav>
+                                      </p:tavLst>
+                                    </p:anim>
+                                    <p:animEffect transition="out" filter="fade">
+                                      <p:cBhvr>
+                                        <p:cTn id="15" dur="500"/>
+                                        <p:tgtEl>
+                                          <p:spTgt spid="6"/>
+                                        </p:tgtEl>
+                                      </p:cBhvr>
+                                    </p:animEffect>
+                                    <p:set>
+                                      <p:cBhvr>
+                                        <p:cTn id="16" dur="1" fill="hold">
+                                          <p:stCondLst>
+                                            <p:cond delay="499"/>
+                                          </p:stCondLst>
+                                        </p:cTn>
+                                        <p:tgtEl>
+                                          <p:spTgt spid="6"/>
+                                        </p:tgtEl>
+                                        <p:attrNameLst>
+                                          <p:attrName>style.visibility</p:attrName>
+                                        </p:attrNameLst>
+                                      </p:cBhvr>
+                                      <p:to>
+                                        <p:strVal val="hidden"/>
+                                      </p:to>
+                                    </p:set>
+                                  </p:childTnLst>
+                                </p:cTn>
+                              </p:par>
+                              <p:par>
+                                <p:cTn id="17" presetID="53" presetClass="entr" presetSubtype="16" fill="hold" nodeType="withEffect">
+                                  <p:stCondLst>
+                                    <p:cond delay="0"/>
+                                  </p:stCondLst>
+                                  <p:childTnLst>
+                                    <p:set>
+                                      <p:cBhvr>
+                                        <p:cTn id="18" dur="1" fill="hold">
+                                          <p:stCondLst>
+                                            <p:cond delay="0"/>
+                                          </p:stCondLst>
+                                        </p:cTn>
+                                        <p:tgtEl>
+                                          <p:spTgt spid="5"/>
+                                        </p:tgtEl>
+                                        <p:attrNameLst>
+                                          <p:attrName>style.visibility</p:attrName>
+                                        </p:attrNameLst>
+                                      </p:cBhvr>
+                                      <p:to>
+                                        <p:strVal val="visible"/>
+                                      </p:to>
+                                    </p:set>
+                                    <p:anim calcmode="lin" valueType="num">
+                                      <p:cBhvr>
+                                        <p:cTn id="19" dur="500" fill="hold"/>
+                                        <p:tgtEl>
+                                          <p:spTgt spid="5"/>
+                                        </p:tgtEl>
+                                        <p:attrNameLst>
+                                          <p:attrName>ppt_w</p:attrName>
+                                        </p:attrNameLst>
+                                      </p:cBhvr>
+                                      <p:tavLst>
+                                        <p:tav tm="0">
+                                          <p:val>
+                                            <p:fltVal val="0"/>
+                                          </p:val>
+                                        </p:tav>
+                                        <p:tav tm="100000">
+                                          <p:val>
+                                            <p:strVal val="#ppt_w"/>
+                                          </p:val>
+                                        </p:tav>
+                                      </p:tavLst>
+                                    </p:anim>
+                                    <p:anim calcmode="lin" valueType="num">
+                                      <p:cBhvr>
+                                        <p:cTn id="20" dur="500" fill="hold"/>
+                                        <p:tgtEl>
+                                          <p:spTgt spid="5"/>
+                                        </p:tgtEl>
+                                        <p:attrNameLst>
+                                          <p:attrName>ppt_h</p:attrName>
+                                        </p:attrNameLst>
+                                      </p:cBhvr>
+                                      <p:tavLst>
+                                        <p:tav tm="0">
+                                          <p:val>
+                                            <p:fltVal val="0"/>
+                                          </p:val>
+                                        </p:tav>
+                                        <p:tav tm="100000">
+                                          <p:val>
+                                            <p:strVal val="#ppt_h"/>
+                                          </p:val>
+                                        </p:tav>
+                                      </p:tavLst>
+                                    </p:anim>
+                                    <p:animEffect transition="in" filter="fade">
+                                      <p:cBhvr>
+                                        <p:cTn id="21" dur="500"/>
+                                        <p:tgtEl>
+                                          <p:spTgt spid="5"/>
+                                        </p:tgtEl>
+                                      </p:cBhvr>
+                                    </p:animEffect>
+                                  </p:childTnLst>
+                                </p:cTn>
+                              </p:par>
+                            </p:childTnLst>
+                          </p:cTn>
+                        </p:par>
+                      </p:childTnLst>
+                    </p:cTn>
+                  </p:par>
+                  <p:par>
+                    <p:cTn id="22" fill="hold">
+                      <p:stCondLst>
+                        <p:cond delay="indefinite"/>
+                      </p:stCondLst>
+                      <p:childTnLst>
+                        <p:par>
+                          <p:cTn id="23" fill="hold">
+                            <p:stCondLst>
+                              <p:cond delay="0"/>
+                            </p:stCondLst>
+                            <p:childTnLst>
+                              <p:par>
+                                <p:cTn id="24" presetID="53" presetClass="exit" presetSubtype="32" fill="hold" nodeType="clickEffect">
+                                  <p:stCondLst>
+                                    <p:cond delay="0"/>
+                                  </p:stCondLst>
+                                  <p:childTnLst>
+                                    <p:anim calcmode="lin" valueType="num">
+                                      <p:cBhvr>
+                                        <p:cTn id="25" dur="500"/>
+                                        <p:tgtEl>
+                                          <p:spTgt spid="5"/>
+                                        </p:tgtEl>
+                                        <p:attrNameLst>
+                                          <p:attrName>ppt_w</p:attrName>
+                                        </p:attrNameLst>
+                                      </p:cBhvr>
+                                      <p:tavLst>
+                                        <p:tav tm="0">
+                                          <p:val>
+                                            <p:strVal val="ppt_w"/>
+                                          </p:val>
+                                        </p:tav>
+                                        <p:tav tm="100000">
+                                          <p:val>
+                                            <p:fltVal val="0"/>
+                                          </p:val>
+                                        </p:tav>
+                                      </p:tavLst>
+                                    </p:anim>
+                                    <p:anim calcmode="lin" valueType="num">
+                                      <p:cBhvr>
+                                        <p:cTn id="26" dur="500"/>
+                                        <p:tgtEl>
+                                          <p:spTgt spid="5"/>
+                                        </p:tgtEl>
+                                        <p:attrNameLst>
+                                          <p:attrName>ppt_h</p:attrName>
+                                        </p:attrNameLst>
+                                      </p:cBhvr>
+                                      <p:tavLst>
+                                        <p:tav tm="0">
+                                          <p:val>
+                                            <p:strVal val="ppt_h"/>
+                                          </p:val>
+                                        </p:tav>
+                                        <p:tav tm="100000">
+                                          <p:val>
+                                            <p:fltVal val="0"/>
+                                          </p:val>
+                                        </p:tav>
+                                      </p:tavLst>
+                                    </p:anim>
+                                    <p:animEffect transition="out" filter="fade">
+                                      <p:cBhvr>
+                                        <p:cTn id="27" dur="500"/>
+                                        <p:tgtEl>
+                                          <p:spTgt spid="5"/>
+                                        </p:tgtEl>
+                                      </p:cBhvr>
+                                    </p:animEffect>
+                                    <p:set>
+                                      <p:cBhvr>
+                                        <p:cTn id="28" dur="1" fill="hold">
+                                          <p:stCondLst>
+                                            <p:cond delay="499"/>
+                                          </p:stCondLst>
+                                        </p:cTn>
+                                        <p:tgtEl>
+                                          <p:spTgt spid="5"/>
+                                        </p:tgtEl>
+                                        <p:attrNameLst>
+                                          <p:attrName>style.visibility</p:attrName>
+                                        </p:attrNameLst>
+                                      </p:cBhvr>
+                                      <p:to>
+                                        <p:strVal val="hidden"/>
+                                      </p:to>
+                                    </p:set>
+                                  </p:childTnLst>
+                                </p:cTn>
+                              </p:par>
+                            </p:childTnLst>
+                          </p:cTn>
+                        </p:par>
+                      </p:childTnLst>
+                    </p:cTn>
+                  </p:par>
+                </p:childTnLst>
+              </p:cTn>
+              <p:prevCondLst>
+                <p:cond evt="onPrev" delay="0">
+                  <p:tgtEl>
+                    <p:sldTgt/>
+                  </p:tgtEl>
+                </p:cond>
+              </p:prevCondLst>
+              <p:nextCondLst>
+                <p:cond evt="onNext" delay="0">
+                  <p:tgtEl>
+                    <p:sldTgt/>
+                  </p:tgtEl>
+                </p:cond>
+              </p:nextCondLst>
+            </p:seq>
+          </p:childTnLst>
+        </p:cTn>
+      </p:par>
+    </p:tnLst>
+  </p:timing>
 </p:sld>
 </file>
 

</xml_diff>